<commit_message>
Praesentation mit Annotationen hinzugefügt
</commit_message>
<xml_diff>
--- a/Praesentation/Designevaluierung Schwerpunkt.pptx
+++ b/Praesentation/Designevaluierung Schwerpunkt.pptx
@@ -5,7 +5,7 @@
     <p:sldMasterId id="2147483648" r:id="rId1"/>
   </p:sldMasterIdLst>
   <p:notesMasterIdLst>
-    <p:notesMasterId r:id="rId33"/>
+    <p:notesMasterId r:id="rId34"/>
   </p:notesMasterIdLst>
   <p:sldIdLst>
     <p:sldId id="256" r:id="rId2"/>
@@ -24,21 +24,22 @@
     <p:sldId id="262" r:id="rId15"/>
     <p:sldId id="263" r:id="rId16"/>
     <p:sldId id="264" r:id="rId17"/>
-    <p:sldId id="280" r:id="rId18"/>
-    <p:sldId id="278" r:id="rId19"/>
-    <p:sldId id="282" r:id="rId20"/>
-    <p:sldId id="279" r:id="rId21"/>
-    <p:sldId id="281" r:id="rId22"/>
-    <p:sldId id="289" r:id="rId23"/>
-    <p:sldId id="283" r:id="rId24"/>
-    <p:sldId id="284" r:id="rId25"/>
-    <p:sldId id="285" r:id="rId26"/>
-    <p:sldId id="286" r:id="rId27"/>
-    <p:sldId id="287" r:id="rId28"/>
-    <p:sldId id="288" r:id="rId29"/>
-    <p:sldId id="268" r:id="rId30"/>
-    <p:sldId id="277" r:id="rId31"/>
-    <p:sldId id="269" r:id="rId32"/>
+    <p:sldId id="290" r:id="rId18"/>
+    <p:sldId id="280" r:id="rId19"/>
+    <p:sldId id="278" r:id="rId20"/>
+    <p:sldId id="282" r:id="rId21"/>
+    <p:sldId id="279" r:id="rId22"/>
+    <p:sldId id="281" r:id="rId23"/>
+    <p:sldId id="289" r:id="rId24"/>
+    <p:sldId id="283" r:id="rId25"/>
+    <p:sldId id="284" r:id="rId26"/>
+    <p:sldId id="285" r:id="rId27"/>
+    <p:sldId id="286" r:id="rId28"/>
+    <p:sldId id="287" r:id="rId29"/>
+    <p:sldId id="288" r:id="rId30"/>
+    <p:sldId id="268" r:id="rId31"/>
+    <p:sldId id="277" r:id="rId32"/>
+    <p:sldId id="269" r:id="rId33"/>
   </p:sldIdLst>
   <p:sldSz cx="12192000" cy="6858000"/>
   <p:notesSz cx="6858000" cy="9144000"/>
@@ -140,6 +141,9 @@
   <p:extLst>
     <p:ext uri="{EFAFB233-063F-42B5-8137-9DF3F51BA10A}">
       <p15:sldGuideLst xmlns:p15="http://schemas.microsoft.com/office/powerpoint/2012/main"/>
+    </p:ext>
+    <p:ext uri="{2D200454-40CA-4A62-9FC3-DE9A4176ACB9}">
+      <p15:notesGuideLst xmlns:p15="http://schemas.microsoft.com/office/powerpoint/2012/main"/>
     </p:ext>
   </p:extLst>
 </p:presentation>
@@ -1614,84 +1618,6 @@
   </mc:AlternateContent>
   <c:chart>
     <c:title>
-      <c:tx>
-        <c:rich>
-          <a:bodyPr rot="0" spcFirstLastPara="1" vertOverflow="ellipsis" vert="horz" wrap="square" anchor="ctr" anchorCtr="1"/>
-          <a:lstStyle/>
-          <a:p>
-            <a:pPr marL="0" marR="0" lvl="0" indent="0" algn="ctr" defTabSz="914400" rtl="0" eaLnBrk="1" fontAlgn="auto" latinLnBrk="0" hangingPunct="1">
-              <a:lnSpc>
-                <a:spcPct val="100000"/>
-              </a:lnSpc>
-              <a:spcBef>
-                <a:spcPts val="0"/>
-              </a:spcBef>
-              <a:spcAft>
-                <a:spcPts val="0"/>
-              </a:spcAft>
-              <a:buClrTx/>
-              <a:buSzTx/>
-              <a:buFontTx/>
-              <a:buNone/>
-              <a:tabLst/>
-              <a:defRPr sz="1400" b="0" i="0" u="none" strike="noStrike" kern="1200" spc="0" baseline="0">
-                <a:solidFill>
-                  <a:sysClr val="windowText" lastClr="000000">
-                    <a:lumMod val="65000"/>
-                    <a:lumOff val="35000"/>
-                  </a:sysClr>
-                </a:solidFill>
-                <a:latin typeface="+mn-lt"/>
-                <a:ea typeface="+mn-ea"/>
-                <a:cs typeface="+mn-cs"/>
-              </a:defRPr>
-            </a:pPr>
-            <a:r>
-              <a:rPr lang="de-DE" sz="2000" b="1" dirty="0">
-                <a:effectLst/>
-                <a:latin typeface="Arial" panose="020B0604020202020204" pitchFamily="34" charset="0"/>
-                <a:cs typeface="Arial" panose="020B0604020202020204" pitchFamily="34" charset="0"/>
-              </a:rPr>
-              <a:t>„Optional – Welche Kategorie würden Sie als G Data Kunde auswählen &amp; warum?"</a:t>
-            </a:r>
-          </a:p>
-          <a:p>
-            <a:pPr marL="0" marR="0" lvl="0" indent="0" algn="ctr" defTabSz="914400" rtl="0" eaLnBrk="1" fontAlgn="auto" latinLnBrk="0" hangingPunct="1">
-              <a:lnSpc>
-                <a:spcPct val="100000"/>
-              </a:lnSpc>
-              <a:spcBef>
-                <a:spcPts val="0"/>
-              </a:spcBef>
-              <a:spcAft>
-                <a:spcPts val="0"/>
-              </a:spcAft>
-              <a:buClrTx/>
-              <a:buSzTx/>
-              <a:buFontTx/>
-              <a:buNone/>
-              <a:tabLst/>
-              <a:defRPr>
-                <a:solidFill>
-                  <a:sysClr val="windowText" lastClr="000000">
-                    <a:lumMod val="65000"/>
-                    <a:lumOff val="35000"/>
-                  </a:sysClr>
-                </a:solidFill>
-              </a:defRPr>
-            </a:pPr>
-            <a:endParaRPr lang="de-DE" sz="1400" dirty="0"/>
-          </a:p>
-        </c:rich>
-      </c:tx>
-      <c:layout>
-        <c:manualLayout>
-          <c:xMode val="edge"/>
-          <c:yMode val="edge"/>
-          <c:x val="0.14294039778970188"/>
-          <c:y val="0"/>
-        </c:manualLayout>
-      </c:layout>
       <c:overlay val="0"/>
       <c:spPr>
         <a:noFill/>
@@ -1704,27 +1630,13 @@
         <a:bodyPr rot="0" spcFirstLastPara="1" vertOverflow="ellipsis" vert="horz" wrap="square" anchor="ctr" anchorCtr="1"/>
         <a:lstStyle/>
         <a:p>
-          <a:pPr marL="0" marR="0" lvl="0" indent="0" algn="ctr" defTabSz="914400" rtl="0" eaLnBrk="1" fontAlgn="auto" latinLnBrk="0" hangingPunct="1">
-            <a:lnSpc>
-              <a:spcPct val="100000"/>
-            </a:lnSpc>
-            <a:spcBef>
-              <a:spcPts val="0"/>
-            </a:spcBef>
-            <a:spcAft>
-              <a:spcPts val="0"/>
-            </a:spcAft>
-            <a:buClrTx/>
-            <a:buSzTx/>
-            <a:buFontTx/>
-            <a:buNone/>
-            <a:tabLst/>
-            <a:defRPr sz="1400" b="0" i="0" u="none" strike="noStrike" kern="1200" spc="0" baseline="0">
+          <a:pPr>
+            <a:defRPr sz="1800" b="0" i="0" u="none" strike="noStrike" kern="1200" spc="0" baseline="0">
               <a:solidFill>
-                <a:sysClr val="windowText" lastClr="000000">
+                <a:schemeClr val="tx1">
                   <a:lumMod val="65000"/>
                   <a:lumOff val="35000"/>
-                </a:sysClr>
+                </a:schemeClr>
               </a:solidFill>
               <a:latin typeface="+mn-lt"/>
               <a:ea typeface="+mn-ea"/>
@@ -1737,7 +1649,17 @@
     </c:title>
     <c:autoTitleDeleted val="0"/>
     <c:plotArea>
-      <c:layout/>
+      <c:layout>
+        <c:manualLayout>
+          <c:layoutTarget val="inner"/>
+          <c:xMode val="edge"/>
+          <c:yMode val="edge"/>
+          <c:x val="0.2350879215627186"/>
+          <c:y val="0.19927300165497028"/>
+          <c:w val="0.3800222819349669"/>
+          <c:h val="0.71943554530278386"/>
+        </c:manualLayout>
+      </c:layout>
       <c:pieChart>
         <c:varyColors val="1"/>
         <c:ser>
@@ -1749,7 +1671,7 @@
               <c:strCache>
                 <c:ptCount val="1"/>
                 <c:pt idx="0">
-                  <c:v>Verkauf</c:v>
+                  <c:v>„Optional – Welche Kategorie würden Sie als G Data Kunde auswählen &amp; warum?"</c:v>
                 </c:pt>
               </c:strCache>
             </c:strRef>
@@ -1770,7 +1692,7 @@
             </c:spPr>
             <c:extLst>
               <c:ext xmlns:c16="http://schemas.microsoft.com/office/drawing/2014/chart" uri="{C3380CC4-5D6E-409C-BE32-E72D297353CC}">
-                <c16:uniqueId val="{00000001-EA73-4988-B2B7-92FD7AB4EE22}"/>
+                <c16:uniqueId val="{00000001-E01A-4E7B-9211-B28BD434964A}"/>
               </c:ext>
             </c:extLst>
           </c:dPt>
@@ -1790,7 +1712,7 @@
             </c:spPr>
             <c:extLst>
               <c:ext xmlns:c16="http://schemas.microsoft.com/office/drawing/2014/chart" uri="{C3380CC4-5D6E-409C-BE32-E72D297353CC}">
-                <c16:uniqueId val="{00000003-EA73-4988-B2B7-92FD7AB4EE22}"/>
+                <c16:uniqueId val="{00000003-E01A-4E7B-9211-B28BD434964A}"/>
               </c:ext>
             </c:extLst>
           </c:dPt>
@@ -1810,168 +1732,11 @@
             </c:spPr>
             <c:extLst>
               <c:ext xmlns:c16="http://schemas.microsoft.com/office/drawing/2014/chart" uri="{C3380CC4-5D6E-409C-BE32-E72D297353CC}">
-                <c16:uniqueId val="{00000005-EA73-4988-B2B7-92FD7AB4EE22}"/>
-              </c:ext>
-            </c:extLst>
-          </c:dPt>
-          <c:dPt>
-            <c:idx val="3"/>
-            <c:bubble3D val="0"/>
-            <c:spPr>
-              <a:solidFill>
-                <a:schemeClr val="accent4"/>
-              </a:solidFill>
-              <a:ln w="19050">
-                <a:solidFill>
-                  <a:schemeClr val="lt1"/>
-                </a:solidFill>
-              </a:ln>
-              <a:effectLst/>
-            </c:spPr>
-            <c:extLst>
-              <c:ext xmlns:c16="http://schemas.microsoft.com/office/drawing/2014/chart" uri="{C3380CC4-5D6E-409C-BE32-E72D297353CC}">
-                <c16:uniqueId val="{00000007-EA73-4988-B2B7-92FD7AB4EE22}"/>
-              </c:ext>
-            </c:extLst>
-          </c:dPt>
-          <c:dPt>
-            <c:idx val="4"/>
-            <c:bubble3D val="0"/>
-            <c:spPr>
-              <a:solidFill>
-                <a:schemeClr val="accent5"/>
-              </a:solidFill>
-              <a:ln w="19050">
-                <a:solidFill>
-                  <a:schemeClr val="lt1"/>
-                </a:solidFill>
-              </a:ln>
-              <a:effectLst/>
-            </c:spPr>
-            <c:extLst>
-              <c:ext xmlns:c16="http://schemas.microsoft.com/office/drawing/2014/chart" uri="{C3380CC4-5D6E-409C-BE32-E72D297353CC}">
-                <c16:uniqueId val="{00000009-EA73-4988-B2B7-92FD7AB4EE22}"/>
+                <c16:uniqueId val="{00000005-E01A-4E7B-9211-B28BD434964A}"/>
               </c:ext>
             </c:extLst>
           </c:dPt>
           <c:dLbls>
-            <c:dLbl>
-              <c:idx val="0"/>
-              <c:layout>
-                <c:manualLayout>
-                  <c:x val="1.5263662647042923E-2"/>
-                  <c:y val="0.10720755679100084"/>
-                </c:manualLayout>
-              </c:layout>
-              <c:dLblPos val="bestFit"/>
-              <c:showLegendKey val="0"/>
-              <c:showVal val="1"/>
-              <c:showCatName val="0"/>
-              <c:showSerName val="0"/>
-              <c:showPercent val="0"/>
-              <c:showBubbleSize val="0"/>
-              <c:extLst>
-                <c:ext xmlns:c15="http://schemas.microsoft.com/office/drawing/2012/chart" uri="{CE6537A1-D6FC-4f65-9D91-7224C49458BB}"/>
-                <c:ext xmlns:c16="http://schemas.microsoft.com/office/drawing/2014/chart" uri="{C3380CC4-5D6E-409C-BE32-E72D297353CC}">
-                  <c16:uniqueId val="{00000001-EA73-4988-B2B7-92FD7AB4EE22}"/>
-                </c:ext>
-              </c:extLst>
-            </c:dLbl>
-            <c:dLbl>
-              <c:idx val="1"/>
-              <c:layout>
-                <c:manualLayout>
-                  <c:x val="-2.1520291904330063E-2"/>
-                  <c:y val="-7.1405912380732239E-2"/>
-                </c:manualLayout>
-              </c:layout>
-              <c:dLblPos val="bestFit"/>
-              <c:showLegendKey val="0"/>
-              <c:showVal val="1"/>
-              <c:showCatName val="0"/>
-              <c:showSerName val="0"/>
-              <c:showPercent val="0"/>
-              <c:showBubbleSize val="0"/>
-              <c:extLst>
-                <c:ext xmlns:c15="http://schemas.microsoft.com/office/drawing/2012/chart" uri="{CE6537A1-D6FC-4f65-9D91-7224C49458BB}"/>
-                <c:ext xmlns:c16="http://schemas.microsoft.com/office/drawing/2014/chart" uri="{C3380CC4-5D6E-409C-BE32-E72D297353CC}">
-                  <c16:uniqueId val="{00000003-EA73-4988-B2B7-92FD7AB4EE22}"/>
-                </c:ext>
-              </c:extLst>
-            </c:dLbl>
-            <c:dLbl>
-              <c:idx val="2"/>
-              <c:layout>
-                <c:manualLayout>
-                  <c:x val="6.293558931765383E-3"/>
-                  <c:y val="1.1010598598107808E-2"/>
-                </c:manualLayout>
-              </c:layout>
-              <c:dLblPos val="bestFit"/>
-              <c:showLegendKey val="0"/>
-              <c:showVal val="1"/>
-              <c:showCatName val="0"/>
-              <c:showSerName val="0"/>
-              <c:showPercent val="0"/>
-              <c:showBubbleSize val="0"/>
-              <c:extLst>
-                <c:ext xmlns:c15="http://schemas.microsoft.com/office/drawing/2012/chart" uri="{CE6537A1-D6FC-4f65-9D91-7224C49458BB}"/>
-                <c:ext xmlns:c16="http://schemas.microsoft.com/office/drawing/2014/chart" uri="{C3380CC4-5D6E-409C-BE32-E72D297353CC}">
-                  <c16:uniqueId val="{00000005-EA73-4988-B2B7-92FD7AB4EE22}"/>
-                </c:ext>
-              </c:extLst>
-            </c:dLbl>
-            <c:dLbl>
-              <c:idx val="3"/>
-              <c:layout>
-                <c:manualLayout>
-                  <c:x val="2.1522766573238396E-2"/>
-                  <c:y val="6.7699815875694068E-3"/>
-                </c:manualLayout>
-              </c:layout>
-              <c:spPr>
-                <a:noFill/>
-                <a:ln>
-                  <a:noFill/>
-                </a:ln>
-                <a:effectLst/>
-              </c:spPr>
-              <c:txPr>
-                <a:bodyPr rot="0" spcFirstLastPara="1" vertOverflow="ellipsis" vert="horz" wrap="square" lIns="38100" tIns="19050" rIns="38100" bIns="19050" anchor="ctr" anchorCtr="1">
-                  <a:spAutoFit/>
-                </a:bodyPr>
-                <a:lstStyle/>
-                <a:p>
-                  <a:pPr>
-                    <a:defRPr sz="1600" b="0" i="0" u="none" strike="noStrike" kern="1200" baseline="0">
-                      <a:solidFill>
-                        <a:schemeClr val="tx1">
-                          <a:lumMod val="75000"/>
-                          <a:lumOff val="25000"/>
-                        </a:schemeClr>
-                      </a:solidFill>
-                      <a:latin typeface="+mn-lt"/>
-                      <a:ea typeface="+mn-ea"/>
-                      <a:cs typeface="+mn-cs"/>
-                    </a:defRPr>
-                  </a:pPr>
-                  <a:endParaRPr lang="de-DE"/>
-                </a:p>
-              </c:txPr>
-              <c:dLblPos val="bestFit"/>
-              <c:showLegendKey val="0"/>
-              <c:showVal val="1"/>
-              <c:showCatName val="0"/>
-              <c:showSerName val="0"/>
-              <c:showPercent val="0"/>
-              <c:showBubbleSize val="0"/>
-              <c:extLst>
-                <c:ext xmlns:c15="http://schemas.microsoft.com/office/drawing/2012/chart" uri="{CE6537A1-D6FC-4f65-9D91-7224C49458BB}"/>
-                <c:ext xmlns:c16="http://schemas.microsoft.com/office/drawing/2014/chart" uri="{C3380CC4-5D6E-409C-BE32-E72D297353CC}">
-                  <c16:uniqueId val="{00000007-EA73-4988-B2B7-92FD7AB4EE22}"/>
-                </c:ext>
-              </c:extLst>
-            </c:dLbl>
             <c:spPr>
               <a:noFill/>
               <a:ln>
@@ -1986,7 +1751,7 @@
               <a:lstStyle/>
               <a:p>
                 <a:pPr>
-                  <a:defRPr sz="1800" b="0" i="0" u="none" strike="noStrike" kern="1200" baseline="0">
+                  <a:defRPr sz="1400" b="0" i="0" u="none" strike="noStrike" kern="1200" baseline="0">
                     <a:solidFill>
                       <a:schemeClr val="tx1">
                         <a:lumMod val="75000"/>
@@ -2029,19 +1794,16 @@
           </c:dLbls>
           <c:cat>
             <c:strRef>
-              <c:f>Tabelle1!$A$2:$A$6</c:f>
+              <c:f>Tabelle1!$A$2:$A$4</c:f>
               <c:strCache>
-                <c:ptCount val="4"/>
+                <c:ptCount val="3"/>
                 <c:pt idx="0">
                   <c:v>Zugangsdaten eingeben</c:v>
                 </c:pt>
                 <c:pt idx="1">
-                  <c:v>Keine Antwort -&gt; Keine G Data Kunden</c:v>
+                  <c:v>Später aktivieren</c:v>
                 </c:pt>
                 <c:pt idx="2">
-                  <c:v>Später aktivieren</c:v>
-                </c:pt>
-                <c:pt idx="3">
                   <c:v>Registriernummer eingeben</c:v>
                 </c:pt>
               </c:strCache>
@@ -2049,28 +1811,25 @@
           </c:cat>
           <c:val>
             <c:numRef>
-              <c:f>Tabelle1!$B$2:$B$6</c:f>
+              <c:f>Tabelle1!$B$2:$B$4</c:f>
               <c:numCache>
                 <c:formatCode>0.00%</c:formatCode>
-                <c:ptCount val="5"/>
+                <c:ptCount val="3"/>
                 <c:pt idx="0">
-                  <c:v>0.34610000000000002</c:v>
+                  <c:v>0.64259999999999995</c:v>
                 </c:pt>
                 <c:pt idx="1">
-                  <c:v>0.46150000000000002</c:v>
+                  <c:v>0.2142</c:v>
                 </c:pt>
                 <c:pt idx="2">
-                  <c:v>0.1154</c:v>
-                </c:pt>
-                <c:pt idx="3">
-                  <c:v>7.6999999999999999E-2</c:v>
+                  <c:v>0.14280000000000001</c:v>
                 </c:pt>
               </c:numCache>
             </c:numRef>
           </c:val>
           <c:extLst>
             <c:ext xmlns:c16="http://schemas.microsoft.com/office/drawing/2014/chart" uri="{C3380CC4-5D6E-409C-BE32-E72D297353CC}">
-              <c16:uniqueId val="{0000000A-EA73-4988-B2B7-92FD7AB4EE22}"/>
+              <c16:uniqueId val="{00000006-E01A-4E7B-9211-B28BD434964A}"/>
             </c:ext>
           </c:extLst>
         </c:ser>
@@ -2096,18 +1855,14 @@
     </c:plotArea>
     <c:legend>
       <c:legendPos val="b"/>
-      <c:legendEntry>
-        <c:idx val="4"/>
-        <c:delete val="1"/>
-      </c:legendEntry>
       <c:layout>
         <c:manualLayout>
           <c:xMode val="edge"/>
           <c:yMode val="edge"/>
-          <c:x val="0.14809037414709583"/>
-          <c:y val="0.80574699148452922"/>
-          <c:w val="0.7014016905415108"/>
-          <c:h val="0.17874776654314697"/>
+          <c:x val="0.71146187909462899"/>
+          <c:y val="0.33017574379116044"/>
+          <c:w val="0.26447345991724941"/>
+          <c:h val="0.39995065703578447"/>
         </c:manualLayout>
       </c:layout>
       <c:overlay val="0"/>
@@ -2123,7 +1878,7 @@
         <a:lstStyle/>
         <a:p>
           <a:pPr>
-            <a:defRPr sz="1600" b="0" i="0" u="none" strike="noStrike" kern="1200" baseline="0">
+            <a:defRPr sz="1200" b="0" i="0" u="none" strike="noStrike" kern="1200" baseline="0">
               <a:solidFill>
                 <a:schemeClr val="tx1">
                   <a:lumMod val="65000"/>
@@ -4618,13 +4373,42 @@
 </file>
 
 <file path=ppt/charts/colors3.xml><?xml version="1.0" encoding="utf-8"?>
-<cs:colorStyle xmlns:cs="http://schemas.microsoft.com/office/drawing/2012/chartStyle" xmlns:a="http://schemas.openxmlformats.org/drawingml/2006/main" meth="acrossLinear" id="2">
+<cs:colorStyle xmlns:cs="http://schemas.microsoft.com/office/drawing/2012/chartStyle" xmlns:a="http://schemas.openxmlformats.org/drawingml/2006/main" meth="cycle" id="10">
   <a:schemeClr val="accent1"/>
   <a:schemeClr val="accent2"/>
   <a:schemeClr val="accent3"/>
   <a:schemeClr val="accent4"/>
   <a:schemeClr val="accent5"/>
   <a:schemeClr val="accent6"/>
+  <cs:variation/>
+  <cs:variation>
+    <a:lumMod val="60000"/>
+  </cs:variation>
+  <cs:variation>
+    <a:lumMod val="80000"/>
+    <a:lumOff val="20000"/>
+  </cs:variation>
+  <cs:variation>
+    <a:lumMod val="80000"/>
+  </cs:variation>
+  <cs:variation>
+    <a:lumMod val="60000"/>
+    <a:lumOff val="40000"/>
+  </cs:variation>
+  <cs:variation>
+    <a:lumMod val="50000"/>
+  </cs:variation>
+  <cs:variation>
+    <a:lumMod val="70000"/>
+    <a:lumOff val="30000"/>
+  </cs:variation>
+  <cs:variation>
+    <a:lumMod val="70000"/>
+  </cs:variation>
+  <cs:variation>
+    <a:lumMod val="50000"/>
+    <a:lumOff val="50000"/>
+  </cs:variation>
 </cs:colorStyle>
 </file>
 
@@ -10111,7 +9895,7 @@
           <a:p>
             <a:fld id="{8024422E-0BC0-45A6-B338-B338D590139F}" type="datetimeFigureOut">
               <a:rPr lang="de-DE" smtClean="0"/>
-              <a:t>06.12.2021</a:t>
+              <a:t>07.12.2021</a:t>
             </a:fld>
             <a:endParaRPr lang="de-DE"/>
           </a:p>
@@ -10525,7 +10309,7 @@
           <a:p>
             <a:fld id="{5FB1B6A9-E8C7-4B18-913B-2C302261310A}" type="datetime1">
               <a:rPr lang="de-DE" smtClean="0"/>
-              <a:t>06.12.2021</a:t>
+              <a:t>07.12.2021</a:t>
             </a:fld>
             <a:endParaRPr lang="de-DE"/>
           </a:p>
@@ -10735,7 +10519,7 @@
           <a:p>
             <a:fld id="{4E19B94D-E69E-4393-AC18-D836C8E220A1}" type="datetime1">
               <a:rPr lang="de-DE" smtClean="0"/>
-              <a:t>06.12.2021</a:t>
+              <a:t>07.12.2021</a:t>
             </a:fld>
             <a:endParaRPr lang="de-DE"/>
           </a:p>
@@ -10947,7 +10731,7 @@
           <a:p>
             <a:fld id="{DF11AB63-FE27-42AB-A659-19DBB01DD9BF}" type="datetime1">
               <a:rPr lang="de-DE" smtClean="0"/>
-              <a:t>06.12.2021</a:t>
+              <a:t>07.12.2021</a:t>
             </a:fld>
             <a:endParaRPr lang="de-DE"/>
           </a:p>
@@ -11092,7 +10876,7 @@
           <a:p>
             <a:fld id="{A28B77B1-7C5D-43D6-B795-2D36937CD892}" type="datetime1">
               <a:rPr lang="de-DE" smtClean="0"/>
-              <a:t>06.12.2021</a:t>
+              <a:t>07.12.2021</a:t>
             </a:fld>
             <a:endParaRPr lang="de-DE" dirty="0"/>
           </a:p>
@@ -11294,7 +11078,7 @@
           <a:p>
             <a:fld id="{645F39B9-3809-467E-8B5B-945AE22FF124}" type="datetime1">
               <a:rPr lang="de-DE" smtClean="0"/>
-              <a:t>06.12.2021</a:t>
+              <a:t>07.12.2021</a:t>
             </a:fld>
             <a:endParaRPr lang="de-DE"/>
           </a:p>
@@ -11573,7 +11357,7 @@
           <a:p>
             <a:fld id="{41DC567F-3214-41F4-9C1C-FE8D09BD132A}" type="datetime1">
               <a:rPr lang="de-DE" smtClean="0"/>
-              <a:t>06.12.2021</a:t>
+              <a:t>07.12.2021</a:t>
             </a:fld>
             <a:endParaRPr lang="de-DE"/>
           </a:p>
@@ -11842,7 +11626,7 @@
           <a:p>
             <a:fld id="{9949B707-072E-4C1D-AE51-078DEC55C1F2}" type="datetime1">
               <a:rPr lang="de-DE" smtClean="0"/>
-              <a:t>06.12.2021</a:t>
+              <a:t>07.12.2021</a:t>
             </a:fld>
             <a:endParaRPr lang="de-DE"/>
           </a:p>
@@ -12258,7 +12042,7 @@
           <a:p>
             <a:fld id="{9B7C69FD-89D8-4602-9683-CCF5AAAEF0B0}" type="datetime1">
               <a:rPr lang="de-DE" smtClean="0"/>
-              <a:t>06.12.2021</a:t>
+              <a:t>07.12.2021</a:t>
             </a:fld>
             <a:endParaRPr lang="de-DE"/>
           </a:p>
@@ -12403,7 +12187,7 @@
           <a:p>
             <a:fld id="{26B4F9A3-A9FF-4F97-94A7-8D0D82B155D8}" type="datetime1">
               <a:rPr lang="de-DE" smtClean="0"/>
-              <a:t>06.12.2021</a:t>
+              <a:t>07.12.2021</a:t>
             </a:fld>
             <a:endParaRPr lang="de-DE"/>
           </a:p>
@@ -12520,7 +12304,7 @@
           <a:p>
             <a:fld id="{B822EE1C-7C13-4E86-B5A0-740A8764B8BA}" type="datetime1">
               <a:rPr lang="de-DE" smtClean="0"/>
-              <a:t>06.12.2021</a:t>
+              <a:t>07.12.2021</a:t>
             </a:fld>
             <a:endParaRPr lang="de-DE"/>
           </a:p>
@@ -12835,7 +12619,7 @@
           <a:p>
             <a:fld id="{FFE63506-DBC3-45F7-B384-0CCC21FDC164}" type="datetime1">
               <a:rPr lang="de-DE" smtClean="0"/>
-              <a:t>06.12.2021</a:t>
+              <a:t>07.12.2021</a:t>
             </a:fld>
             <a:endParaRPr lang="de-DE"/>
           </a:p>
@@ -13127,7 +12911,7 @@
           <a:p>
             <a:fld id="{815CDFE3-C5D0-4E8D-A2C8-36C02DE3F35C}" type="datetime1">
               <a:rPr lang="de-DE" smtClean="0"/>
-              <a:t>06.12.2021</a:t>
+              <a:t>07.12.2021</a:t>
             </a:fld>
             <a:endParaRPr lang="de-DE"/>
           </a:p>
@@ -13372,7 +13156,7 @@
           <a:p>
             <a:fld id="{4963E9B0-F7F7-4296-8354-894968D03883}" type="datetime1">
               <a:rPr lang="de-DE" smtClean="0"/>
-              <a:t>06.12.2021</a:t>
+              <a:t>07.12.2021</a:t>
             </a:fld>
             <a:endParaRPr lang="de-DE" dirty="0"/>
           </a:p>
@@ -13524,106 +13308,6 @@
           </a:fontRef>
         </p:style>
       </p:cxnSp>
-      <p:pic>
-        <p:nvPicPr>
-          <p:cNvPr id="11" name="Picture 9">
-            <a:extLst>
-              <a:ext uri="{FF2B5EF4-FFF2-40B4-BE49-F238E27FC236}">
-                <a16:creationId xmlns:a16="http://schemas.microsoft.com/office/drawing/2014/main" id="{F5DEDAE3-1683-498D-B122-7742FA4E9821}"/>
-              </a:ext>
-            </a:extLst>
-          </p:cNvPr>
-          <p:cNvPicPr>
-            <a:picLocks noChangeAspect="1" noChangeArrowheads="1"/>
-          </p:cNvPicPr>
-          <p:nvPr userDrawn="1"/>
-        </p:nvPicPr>
-        <p:blipFill>
-          <a:blip r:embed="rId14">
-            <a:extLst>
-              <a:ext uri="{28A0092B-C50C-407E-A947-70E740481C1C}">
-                <a14:useLocalDpi xmlns:a14="http://schemas.microsoft.com/office/drawing/2010/main" val="0"/>
-              </a:ext>
-            </a:extLst>
-          </a:blip>
-          <a:srcRect/>
-          <a:stretch>
-            <a:fillRect/>
-          </a:stretch>
-        </p:blipFill>
-        <p:spPr bwMode="auto">
-          <a:xfrm>
-            <a:off x="8485454" y="6105969"/>
-            <a:ext cx="1042987" cy="665162"/>
-          </a:xfrm>
-          <a:prstGeom prst="rect">
-            <a:avLst/>
-          </a:prstGeom>
-          <a:noFill/>
-          <a:ln>
-            <a:noFill/>
-          </a:ln>
-          <a:effectLst/>
-          <a:extLst>
-            <a:ext uri="{909E8E84-426E-40DD-AFC4-6F175D3DCCD1}">
-              <a14:hiddenFill xmlns:a14="http://schemas.microsoft.com/office/drawing/2010/main">
-                <a:solidFill>
-                  <a:schemeClr val="accent1"/>
-                </a:solidFill>
-              </a14:hiddenFill>
-            </a:ext>
-            <a:ext uri="{91240B29-F687-4F45-9708-019B960494DF}">
-              <a14:hiddenLine xmlns:a14="http://schemas.microsoft.com/office/drawing/2010/main" w="9525">
-                <a:solidFill>
-                  <a:schemeClr val="tx1"/>
-                </a:solidFill>
-                <a:miter lim="800000"/>
-                <a:headEnd/>
-                <a:tailEnd/>
-              </a14:hiddenLine>
-            </a:ext>
-            <a:ext uri="{AF507438-7753-43E0-B8FC-AC1667EBCBE1}">
-              <a14:hiddenEffects xmlns:a14="http://schemas.microsoft.com/office/drawing/2010/main">
-                <a:effectLst>
-                  <a:outerShdw dist="35921" dir="2700000" algn="ctr" rotWithShape="0">
-                    <a:schemeClr val="bg2"/>
-                  </a:outerShdw>
-                </a:effectLst>
-              </a14:hiddenEffects>
-            </a:ext>
-          </a:extLst>
-        </p:spPr>
-      </p:pic>
-      <p:pic>
-        <p:nvPicPr>
-          <p:cNvPr id="8" name="Grafik 7">
-            <a:extLst>
-              <a:ext uri="{FF2B5EF4-FFF2-40B4-BE49-F238E27FC236}">
-                <a16:creationId xmlns:a16="http://schemas.microsoft.com/office/drawing/2014/main" id="{74CB1CE3-29C4-4520-909A-45E1A3E14600}"/>
-              </a:ext>
-            </a:extLst>
-          </p:cNvPr>
-          <p:cNvPicPr>
-            <a:picLocks noChangeAspect="1"/>
-          </p:cNvPicPr>
-          <p:nvPr userDrawn="1"/>
-        </p:nvPicPr>
-        <p:blipFill>
-          <a:blip r:embed="rId15"/>
-          <a:stretch>
-            <a:fillRect/>
-          </a:stretch>
-        </p:blipFill>
-        <p:spPr>
-          <a:xfrm>
-            <a:off x="9860495" y="6105969"/>
-            <a:ext cx="1258609" cy="678447"/>
-          </a:xfrm>
-          <a:prstGeom prst="rect">
-            <a:avLst/>
-          </a:prstGeom>
-        </p:spPr>
-      </p:pic>
     </p:spTree>
     <p:extLst>
       <p:ext uri="{BB962C8B-B14F-4D97-AF65-F5344CB8AC3E}">
@@ -14008,7 +13692,7 @@
           <a:p>
             <a:fld id="{B2232C3E-751E-4EEE-AB30-8023EE82C447}" type="datetime1">
               <a:rPr lang="de-DE" smtClean="0"/>
-              <a:t>06.12.2021</a:t>
+              <a:t>07.12.2021</a:t>
             </a:fld>
             <a:endParaRPr lang="de-DE"/>
           </a:p>
@@ -14032,8 +13716,8 @@
         </p:nvSpPr>
         <p:spPr>
           <a:xfrm>
-            <a:off x="1902235" y="6118894"/>
-            <a:ext cx="6242304" cy="615505"/>
+            <a:off x="2004784" y="6255521"/>
+            <a:ext cx="6242304" cy="465956"/>
           </a:xfrm>
         </p:spPr>
         <p:txBody>
@@ -14160,6 +13844,78 @@
           </a:p>
         </p:txBody>
       </p:sp>
+      <p:pic>
+        <p:nvPicPr>
+          <p:cNvPr id="7" name="Grafik 6">
+            <a:extLst>
+              <a:ext uri="{FF2B5EF4-FFF2-40B4-BE49-F238E27FC236}">
+                <a16:creationId xmlns:a16="http://schemas.microsoft.com/office/drawing/2014/main" id="{475A43BD-B752-4BDA-A7A9-7C6CA24BE1F0}"/>
+              </a:ext>
+            </a:extLst>
+          </p:cNvPr>
+          <p:cNvPicPr>
+            <a:picLocks noChangeAspect="1"/>
+          </p:cNvPicPr>
+          <p:nvPr/>
+        </p:nvPicPr>
+        <p:blipFill>
+          <a:blip r:embed="rId3">
+            <a:extLst>
+              <a:ext uri="{28A0092B-C50C-407E-A947-70E740481C1C}">
+                <a14:useLocalDpi xmlns:a14="http://schemas.microsoft.com/office/drawing/2010/main" val="0"/>
+              </a:ext>
+            </a:extLst>
+          </a:blip>
+          <a:stretch>
+            <a:fillRect/>
+          </a:stretch>
+        </p:blipFill>
+        <p:spPr>
+          <a:xfrm>
+            <a:off x="9313226" y="6096828"/>
+            <a:ext cx="1181052" cy="751579"/>
+          </a:xfrm>
+          <a:prstGeom prst="rect">
+            <a:avLst/>
+          </a:prstGeom>
+        </p:spPr>
+      </p:pic>
+      <p:pic>
+        <p:nvPicPr>
+          <p:cNvPr id="10" name="Grafik 9">
+            <a:extLst>
+              <a:ext uri="{FF2B5EF4-FFF2-40B4-BE49-F238E27FC236}">
+                <a16:creationId xmlns:a16="http://schemas.microsoft.com/office/drawing/2014/main" id="{6A03CD30-C3FC-4CFA-A855-2CAD9B549B9E}"/>
+              </a:ext>
+            </a:extLst>
+          </p:cNvPr>
+          <p:cNvPicPr>
+            <a:picLocks noChangeAspect="1"/>
+          </p:cNvPicPr>
+          <p:nvPr/>
+        </p:nvPicPr>
+        <p:blipFill>
+          <a:blip r:embed="rId4">
+            <a:extLst>
+              <a:ext uri="{28A0092B-C50C-407E-A947-70E740481C1C}">
+                <a14:useLocalDpi xmlns:a14="http://schemas.microsoft.com/office/drawing/2010/main" val="0"/>
+              </a:ext>
+            </a:extLst>
+          </a:blip>
+          <a:stretch>
+            <a:fillRect/>
+          </a:stretch>
+        </p:blipFill>
+        <p:spPr>
+          <a:xfrm>
+            <a:off x="10704590" y="6083823"/>
+            <a:ext cx="1308516" cy="764584"/>
+          </a:xfrm>
+          <a:prstGeom prst="rect">
+            <a:avLst/>
+          </a:prstGeom>
+        </p:spPr>
+      </p:pic>
     </p:spTree>
     <p:extLst>
       <p:ext uri="{BB962C8B-B14F-4D97-AF65-F5344CB8AC3E}">
@@ -14466,7 +14222,7 @@
                   <a:spcPts val="600"/>
                 </a:spcAft>
               </a:pPr>
-              <a:t>06.12.2021</a:t>
+              <a:t>07.12.2021</a:t>
             </a:fld>
             <a:endParaRPr lang="de-DE">
               <a:solidFill>
@@ -14507,7 +14263,7 @@
           </a:bodyPr>
           <a:lstStyle/>
           <a:p>
-            <a:pPr>
+            <a:pPr algn="l">
               <a:lnSpc>
                 <a:spcPct val="90000"/>
               </a:lnSpc>
@@ -14516,7 +14272,7 @@
               </a:spcAft>
             </a:pPr>
             <a:r>
-              <a:rPr lang="de-DE" sz="900">
+              <a:rPr lang="de-DE" sz="900" dirty="0">
                 <a:solidFill>
                   <a:schemeClr val="tx1">
                     <a:lumMod val="50000"/>
@@ -14524,7 +14280,29 @@
                   </a:schemeClr>
                 </a:solidFill>
               </a:rPr>
-              <a:t>Leah Röser und Ann-Sofie Witfeld Studentinnen der Technischen Hochschule Köln In zusammenarbeit mit der G DATA Cyber Defense AG </a:t>
+              <a:t>Leah Röser und Ann-Sofie Witfeld Studentinnen der Technischen Hochschule Köln in Zusammenarbeit mit der G DATA </a:t>
+            </a:r>
+            <a:r>
+              <a:rPr lang="de-DE" sz="900" dirty="0" err="1">
+                <a:solidFill>
+                  <a:schemeClr val="tx1">
+                    <a:lumMod val="50000"/>
+                    <a:lumOff val="50000"/>
+                  </a:schemeClr>
+                </a:solidFill>
+              </a:rPr>
+              <a:t>Cyber</a:t>
+            </a:r>
+            <a:r>
+              <a:rPr lang="de-DE" sz="900" dirty="0">
+                <a:solidFill>
+                  <a:schemeClr val="tx1">
+                    <a:lumMod val="50000"/>
+                    <a:lumOff val="50000"/>
+                  </a:schemeClr>
+                </a:solidFill>
+              </a:rPr>
+              <a:t> Defense AG </a:t>
             </a:r>
           </a:p>
         </p:txBody>
@@ -14591,10 +14369,10 @@
       </p:sp>
       <p:graphicFrame>
         <p:nvGraphicFramePr>
-          <p:cNvPr id="7" name="Inhaltsplatzhalter 6">
+          <p:cNvPr id="11" name="Inhaltsplatzhalter 10">
             <a:extLst>
               <a:ext uri="{FF2B5EF4-FFF2-40B4-BE49-F238E27FC236}">
-                <a16:creationId xmlns:a16="http://schemas.microsoft.com/office/drawing/2014/main" id="{C3681128-3B0D-453C-A3D0-150F607C1102}"/>
+                <a16:creationId xmlns:a16="http://schemas.microsoft.com/office/drawing/2014/main" id="{516A863F-3619-4B5B-A79D-12627B675302}"/>
               </a:ext>
             </a:extLst>
           </p:cNvPr>
@@ -14605,14 +14383,14 @@
             <p:ph idx="1"/>
             <p:extLst>
               <p:ext uri="{D42A27DB-BD31-4B8C-83A1-F6EECF244321}">
-                <p14:modId xmlns:p14="http://schemas.microsoft.com/office/powerpoint/2010/main" val="3215399694"/>
+                <p14:modId xmlns:p14="http://schemas.microsoft.com/office/powerpoint/2010/main" val="2635122748"/>
               </p:ext>
             </p:extLst>
           </p:nvPr>
         </p:nvGraphicFramePr>
         <p:xfrm>
-          <a:off x="841248" y="556181"/>
-          <a:ext cx="10506456" cy="4914467"/>
+          <a:off x="841248" y="417619"/>
+          <a:ext cx="10512552" cy="5552970"/>
         </p:xfrm>
         <a:graphic>
           <a:graphicData uri="http://schemas.openxmlformats.org/drawingml/2006/chart">
@@ -15237,7 +15015,7 @@
                   <a:spcPts val="600"/>
                 </a:spcAft>
               </a:pPr>
-              <a:t>06.12.2021</a:t>
+              <a:t>07.12.2021</a:t>
             </a:fld>
             <a:endParaRPr lang="de-DE"/>
           </a:p>
@@ -15271,7 +15049,7 @@
           </a:bodyPr>
           <a:lstStyle/>
           <a:p>
-            <a:pPr>
+            <a:pPr algn="l">
               <a:lnSpc>
                 <a:spcPct val="90000"/>
               </a:lnSpc>
@@ -15280,8 +15058,16 @@
               </a:spcAft>
             </a:pPr>
             <a:r>
-              <a:rPr lang="de-DE" sz="900"/>
-              <a:t>Leah Röser und Ann-Sofie Witfeld Studentinnen der Technischen Hochschule Köln In zusammenarbeit mit der G DATA Cyber Defense AG </a:t>
+              <a:rPr lang="de-DE" sz="900" dirty="0"/>
+              <a:t>Leah Röser und Ann-Sofie Witfeld Studentinnen der Technischen Hochschule Köln in Zusammenarbeit mit der G DATA </a:t>
+            </a:r>
+            <a:r>
+              <a:rPr lang="de-DE" sz="900" dirty="0" err="1"/>
+              <a:t>Cyber</a:t>
+            </a:r>
+            <a:r>
+              <a:rPr lang="de-DE" sz="900" dirty="0"/>
+              <a:t> Defense AG </a:t>
             </a:r>
           </a:p>
         </p:txBody>
@@ -15631,7 +15417,7 @@
                   <a:spcPts val="600"/>
                 </a:spcAft>
               </a:pPr>
-              <a:t>06.12.2021</a:t>
+              <a:t>07.12.2021</a:t>
             </a:fld>
             <a:endParaRPr lang="de-DE" dirty="0"/>
           </a:p>
@@ -16320,7 +16106,7 @@
                   <a:spcPts val="600"/>
                 </a:spcAft>
               </a:pPr>
-              <a:t>06.12.2021</a:t>
+              <a:t>07.12.2021</a:t>
             </a:fld>
             <a:endParaRPr lang="de-DE"/>
           </a:p>
@@ -17044,7 +16830,7 @@
                   <a:spcPts val="600"/>
                 </a:spcAft>
               </a:pPr>
-              <a:t>12/6/2021</a:t>
+              <a:t>12/7/2021</a:t>
             </a:fld>
             <a:endParaRPr lang="en-US">
               <a:latin typeface="+mn-lt"/>
@@ -17842,7 +17628,7 @@
                   <a:spcPts val="600"/>
                 </a:spcAft>
               </a:pPr>
-              <a:t>06.12.2021</a:t>
+              <a:t>07.12.2021</a:t>
             </a:fld>
             <a:endParaRPr lang="de-DE"/>
           </a:p>
@@ -18533,7 +18319,7 @@
                   <a:spcPts val="600"/>
                 </a:spcAft>
               </a:pPr>
-              <a:t>06.12.2021</a:t>
+              <a:t>07.12.2021</a:t>
             </a:fld>
             <a:endParaRPr lang="de-DE"/>
           </a:p>
@@ -18712,7 +18498,7 @@
       </p:grpSpPr>
       <p:sp useBgFill="1">
         <p:nvSpPr>
-          <p:cNvPr id="11" name="Rectangle 10">
+          <p:cNvPr id="19" name="Rectangle 14">
             <a:extLst>
               <a:ext uri="{FF2B5EF4-FFF2-40B4-BE49-F238E27FC236}">
                 <a16:creationId xmlns:a16="http://schemas.microsoft.com/office/drawing/2014/main" id="{777A147A-9ED8-46B4-8660-1B3C2AA880B5}"/>
@@ -18772,10 +18558,10 @@
       </p:sp>
       <p:sp>
         <p:nvSpPr>
-          <p:cNvPr id="2" name="Titel 1">
+          <p:cNvPr id="9" name="Titel 8">
             <a:extLst>
               <a:ext uri="{FF2B5EF4-FFF2-40B4-BE49-F238E27FC236}">
-                <a16:creationId xmlns:a16="http://schemas.microsoft.com/office/drawing/2014/main" id="{93F6F8D5-1C3D-4316-8E58-D9AAF2BA7925}"/>
+                <a16:creationId xmlns:a16="http://schemas.microsoft.com/office/drawing/2014/main" id="{02628A13-8D95-4F7C-AA4D-C2C1815F44B1}"/>
               </a:ext>
             </a:extLst>
           </p:cNvPr>
@@ -18788,7 +18574,7 @@
         </p:nvSpPr>
         <p:spPr>
           <a:xfrm>
-            <a:off x="838200" y="548640"/>
+            <a:off x="841248" y="548640"/>
             <a:ext cx="3600860" cy="5431536"/>
           </a:xfrm>
         </p:spPr>
@@ -18801,14 +18587,14 @@
             <a:pPr algn="ctr"/>
             <a:r>
               <a:rPr lang="de-DE" sz="3200" dirty="0"/>
-              <a:t>Nach der Installation</a:t>
+              <a:t>Design</a:t>
             </a:r>
           </a:p>
         </p:txBody>
       </p:sp>
       <p:sp>
         <p:nvSpPr>
-          <p:cNvPr id="13" name="sketch line">
+          <p:cNvPr id="20" name="sketch line">
             <a:extLst>
               <a:ext uri="{FF2B5EF4-FFF2-40B4-BE49-F238E27FC236}">
                 <a16:creationId xmlns:a16="http://schemas.microsoft.com/office/drawing/2014/main" id="{5D6C15A0-C087-4593-8414-2B4EC1CDC3DE}"/>
@@ -19149,47 +18935,53 @@
           </a:p>
         </p:txBody>
       </p:sp>
-      <p:pic>
-        <p:nvPicPr>
-          <p:cNvPr id="8" name="Inhaltsplatzhalter 7">
+      <p:sp>
+        <p:nvSpPr>
+          <p:cNvPr id="10" name="Inhaltsplatzhalter 9">
             <a:extLst>
               <a:ext uri="{FF2B5EF4-FFF2-40B4-BE49-F238E27FC236}">
-                <a16:creationId xmlns:a16="http://schemas.microsoft.com/office/drawing/2014/main" id="{BE628963-98EB-4876-BE13-7729DE4386B7}"/>
+                <a16:creationId xmlns:a16="http://schemas.microsoft.com/office/drawing/2014/main" id="{8D8CD884-C633-47AF-8649-7472ED40E6D5}"/>
               </a:ext>
             </a:extLst>
           </p:cNvPr>
-          <p:cNvPicPr>
-            <a:picLocks noGrp="1" noChangeAspect="1"/>
-          </p:cNvPicPr>
+          <p:cNvSpPr>
+            <a:spLocks noGrp="1"/>
+          </p:cNvSpPr>
           <p:nvPr>
             <p:ph idx="1"/>
           </p:nvPr>
-        </p:nvPicPr>
-        <p:blipFill>
-          <a:blip r:embed="rId2">
-            <a:extLst>
-              <a:ext uri="{28A0092B-C50C-407E-A947-70E740481C1C}">
-                <a14:useLocalDpi xmlns:a14="http://schemas.microsoft.com/office/drawing/2010/main" val="0"/>
-              </a:ext>
-            </a:extLst>
-          </a:blip>
-          <a:stretch>
-            <a:fillRect/>
-          </a:stretch>
-        </p:blipFill>
+        </p:nvSpPr>
         <p:spPr>
           <a:xfrm>
-            <a:off x="5244817" y="1284919"/>
-            <a:ext cx="6492724" cy="3958977"/>
+            <a:off x="5126418" y="552091"/>
+            <a:ext cx="6224335" cy="5431536"/>
           </a:xfrm>
         </p:spPr>
-      </p:pic>
+        <p:txBody>
+          <a:bodyPr anchor="ctr">
+            <a:normAutofit/>
+          </a:bodyPr>
+          <a:lstStyle/>
+          <a:p>
+            <a:r>
+              <a:rPr lang="de-DE" sz="2200" dirty="0"/>
+              <a:t>Charakteristik der Software</a:t>
+            </a:r>
+          </a:p>
+          <a:p>
+            <a:r>
+              <a:rPr lang="de-DE" sz="2200" dirty="0"/>
+              <a:t>Interaktionsbedarf</a:t>
+            </a:r>
+          </a:p>
+        </p:txBody>
+      </p:sp>
       <p:sp>
         <p:nvSpPr>
           <p:cNvPr id="4" name="Datumsplatzhalter 3">
             <a:extLst>
               <a:ext uri="{FF2B5EF4-FFF2-40B4-BE49-F238E27FC236}">
-                <a16:creationId xmlns:a16="http://schemas.microsoft.com/office/drawing/2014/main" id="{A4756669-DF1D-4454-A792-20C15A619B8E}"/>
+                <a16:creationId xmlns:a16="http://schemas.microsoft.com/office/drawing/2014/main" id="{89F2F9C1-0D17-438F-AB53-80F681883412}"/>
               </a:ext>
             </a:extLst>
           </p:cNvPr>
@@ -19224,7 +19016,7 @@
                   <a:spcPts val="600"/>
                 </a:spcAft>
               </a:pPr>
-              <a:t>06.12.2021</a:t>
+              <a:t>07.12.2021</a:t>
             </a:fld>
             <a:endParaRPr lang="de-DE"/>
           </a:p>
@@ -19235,7 +19027,7 @@
           <p:cNvPr id="5" name="Fußzeilenplatzhalter 4">
             <a:extLst>
               <a:ext uri="{FF2B5EF4-FFF2-40B4-BE49-F238E27FC236}">
-                <a16:creationId xmlns:a16="http://schemas.microsoft.com/office/drawing/2014/main" id="{63D121E0-8F4A-4897-AEEE-2DBE07012A18}"/>
+                <a16:creationId xmlns:a16="http://schemas.microsoft.com/office/drawing/2014/main" id="{75C1DFBB-39FF-4DA8-95C1-837727004A4C}"/>
               </a:ext>
             </a:extLst>
           </p:cNvPr>
@@ -19286,7 +19078,7 @@
           <p:cNvPr id="6" name="Foliennummernplatzhalter 5">
             <a:extLst>
               <a:ext uri="{FF2B5EF4-FFF2-40B4-BE49-F238E27FC236}">
-                <a16:creationId xmlns:a16="http://schemas.microsoft.com/office/drawing/2014/main" id="{C7DCC790-9E98-4665-A32B-E8BF746165E0}"/>
+                <a16:creationId xmlns:a16="http://schemas.microsoft.com/office/drawing/2014/main" id="{E3B42829-B130-4263-9D7D-729BE086A713}"/>
               </a:ext>
             </a:extLst>
           </p:cNvPr>
@@ -19323,14 +19115,14 @@
               </a:pPr>
               <a:t>17</a:t>
             </a:fld>
-            <a:endParaRPr lang="de-DE"/>
+            <a:endParaRPr lang="de-DE" dirty="0"/>
           </a:p>
         </p:txBody>
       </p:sp>
     </p:spTree>
     <p:extLst>
       <p:ext uri="{BB962C8B-B14F-4D97-AF65-F5344CB8AC3E}">
-        <p14:creationId xmlns:p14="http://schemas.microsoft.com/office/powerpoint/2010/main" val="925150362"/>
+        <p14:creationId xmlns:p14="http://schemas.microsoft.com/office/powerpoint/2010/main" val="2468456704"/>
       </p:ext>
     </p:extLst>
   </p:cSld>
@@ -19430,7 +19222,7 @@
           <p:cNvPr id="2" name="Titel 1">
             <a:extLst>
               <a:ext uri="{FF2B5EF4-FFF2-40B4-BE49-F238E27FC236}">
-                <a16:creationId xmlns:a16="http://schemas.microsoft.com/office/drawing/2014/main" id="{7E0C23FC-E63B-406E-B04A-F115CA41ACD0}"/>
+                <a16:creationId xmlns:a16="http://schemas.microsoft.com/office/drawing/2014/main" id="{93F6F8D5-1C3D-4316-8E58-D9AAF2BA7925}"/>
               </a:ext>
             </a:extLst>
           </p:cNvPr>
@@ -19443,7 +19235,7 @@
         </p:nvSpPr>
         <p:spPr>
           <a:xfrm>
-            <a:off x="841248" y="548640"/>
+            <a:off x="838200" y="548640"/>
             <a:ext cx="3600860" cy="5431536"/>
           </a:xfrm>
         </p:spPr>
@@ -19456,7 +19248,7 @@
             <a:pPr algn="ctr"/>
             <a:r>
               <a:rPr lang="de-DE" sz="3200" dirty="0"/>
-              <a:t>Security Center</a:t>
+              <a:t>Nach der Installation</a:t>
             </a:r>
           </a:p>
         </p:txBody>
@@ -19804,12 +19596,47 @@
           </a:p>
         </p:txBody>
       </p:sp>
+      <p:pic>
+        <p:nvPicPr>
+          <p:cNvPr id="8" name="Inhaltsplatzhalter 7">
+            <a:extLst>
+              <a:ext uri="{FF2B5EF4-FFF2-40B4-BE49-F238E27FC236}">
+                <a16:creationId xmlns:a16="http://schemas.microsoft.com/office/drawing/2014/main" id="{BE628963-98EB-4876-BE13-7729DE4386B7}"/>
+              </a:ext>
+            </a:extLst>
+          </p:cNvPr>
+          <p:cNvPicPr>
+            <a:picLocks noGrp="1" noChangeAspect="1"/>
+          </p:cNvPicPr>
+          <p:nvPr>
+            <p:ph idx="1"/>
+          </p:nvPr>
+        </p:nvPicPr>
+        <p:blipFill>
+          <a:blip r:embed="rId2">
+            <a:extLst>
+              <a:ext uri="{28A0092B-C50C-407E-A947-70E740481C1C}">
+                <a14:useLocalDpi xmlns:a14="http://schemas.microsoft.com/office/drawing/2010/main" val="0"/>
+              </a:ext>
+            </a:extLst>
+          </a:blip>
+          <a:stretch>
+            <a:fillRect/>
+          </a:stretch>
+        </p:blipFill>
+        <p:spPr>
+          <a:xfrm>
+            <a:off x="5244817" y="1284919"/>
+            <a:ext cx="6492724" cy="3958977"/>
+          </a:xfrm>
+        </p:spPr>
+      </p:pic>
       <p:sp>
         <p:nvSpPr>
           <p:cNvPr id="4" name="Datumsplatzhalter 3">
             <a:extLst>
               <a:ext uri="{FF2B5EF4-FFF2-40B4-BE49-F238E27FC236}">
-                <a16:creationId xmlns:a16="http://schemas.microsoft.com/office/drawing/2014/main" id="{C6952BBD-3580-4B88-8A57-ACD44A948AE0}"/>
+                <a16:creationId xmlns:a16="http://schemas.microsoft.com/office/drawing/2014/main" id="{A4756669-DF1D-4454-A792-20C15A619B8E}"/>
               </a:ext>
             </a:extLst>
           </p:cNvPr>
@@ -19844,7 +19671,7 @@
                   <a:spcPts val="600"/>
                 </a:spcAft>
               </a:pPr>
-              <a:t>06.12.2021</a:t>
+              <a:t>07.12.2021</a:t>
             </a:fld>
             <a:endParaRPr lang="de-DE"/>
           </a:p>
@@ -19855,7 +19682,7 @@
           <p:cNvPr id="5" name="Fußzeilenplatzhalter 4">
             <a:extLst>
               <a:ext uri="{FF2B5EF4-FFF2-40B4-BE49-F238E27FC236}">
-                <a16:creationId xmlns:a16="http://schemas.microsoft.com/office/drawing/2014/main" id="{7A1827F1-0829-4ABF-89F7-A8CAD4E0CDBC}"/>
+                <a16:creationId xmlns:a16="http://schemas.microsoft.com/office/drawing/2014/main" id="{63D121E0-8F4A-4897-AEEE-2DBE07012A18}"/>
               </a:ext>
             </a:extLst>
           </p:cNvPr>
@@ -19906,7 +19733,7 @@
           <p:cNvPr id="6" name="Foliennummernplatzhalter 5">
             <a:extLst>
               <a:ext uri="{FF2B5EF4-FFF2-40B4-BE49-F238E27FC236}">
-                <a16:creationId xmlns:a16="http://schemas.microsoft.com/office/drawing/2014/main" id="{FB0EFD9E-21EC-44D0-9690-7DB4FEC1A42B}"/>
+                <a16:creationId xmlns:a16="http://schemas.microsoft.com/office/drawing/2014/main" id="{C7DCC790-9E98-4665-A32B-E8BF746165E0}"/>
               </a:ext>
             </a:extLst>
           </p:cNvPr>
@@ -19947,45 +19774,10 @@
           </a:p>
         </p:txBody>
       </p:sp>
-      <p:pic>
-        <p:nvPicPr>
-          <p:cNvPr id="7" name="Inhaltsplatzhalter 6">
-            <a:extLst>
-              <a:ext uri="{FF2B5EF4-FFF2-40B4-BE49-F238E27FC236}">
-                <a16:creationId xmlns:a16="http://schemas.microsoft.com/office/drawing/2014/main" id="{76469D09-CE7E-4C44-90D5-79F74A4EE7E1}"/>
-              </a:ext>
-            </a:extLst>
-          </p:cNvPr>
-          <p:cNvPicPr>
-            <a:picLocks noGrp="1" noChangeAspect="1"/>
-          </p:cNvPicPr>
-          <p:nvPr>
-            <p:ph idx="1"/>
-          </p:nvPr>
-        </p:nvPicPr>
-        <p:blipFill>
-          <a:blip r:embed="rId2">
-            <a:extLst>
-              <a:ext uri="{28A0092B-C50C-407E-A947-70E740481C1C}">
-                <a14:useLocalDpi xmlns:a14="http://schemas.microsoft.com/office/drawing/2010/main" val="0"/>
-              </a:ext>
-            </a:extLst>
-          </a:blip>
-          <a:stretch>
-            <a:fillRect/>
-          </a:stretch>
-        </p:blipFill>
-        <p:spPr>
-          <a:xfrm>
-            <a:off x="5124972" y="1153139"/>
-            <a:ext cx="6924964" cy="4222538"/>
-          </a:xfrm>
-        </p:spPr>
-      </p:pic>
     </p:spTree>
     <p:extLst>
       <p:ext uri="{BB962C8B-B14F-4D97-AF65-F5344CB8AC3E}">
-        <p14:creationId xmlns:p14="http://schemas.microsoft.com/office/powerpoint/2010/main" val="803378971"/>
+        <p14:creationId xmlns:p14="http://schemas.microsoft.com/office/powerpoint/2010/main" val="925150362"/>
       </p:ext>
     </p:extLst>
   </p:cSld>
@@ -20085,7 +19877,7 @@
           <p:cNvPr id="2" name="Titel 1">
             <a:extLst>
               <a:ext uri="{FF2B5EF4-FFF2-40B4-BE49-F238E27FC236}">
-                <a16:creationId xmlns:a16="http://schemas.microsoft.com/office/drawing/2014/main" id="{19DF17A4-A172-4B5D-B74F-704938AED756}"/>
+                <a16:creationId xmlns:a16="http://schemas.microsoft.com/office/drawing/2014/main" id="{7E0C23FC-E63B-406E-B04A-F115CA41ACD0}"/>
               </a:ext>
             </a:extLst>
           </p:cNvPr>
@@ -20098,7 +19890,7 @@
         </p:nvSpPr>
         <p:spPr>
           <a:xfrm>
-            <a:off x="838200" y="548640"/>
+            <a:off x="841248" y="548640"/>
             <a:ext cx="3600860" cy="5431536"/>
           </a:xfrm>
         </p:spPr>
@@ -20111,7 +19903,7 @@
             <a:pPr algn="ctr"/>
             <a:r>
               <a:rPr lang="de-DE" sz="3200" dirty="0"/>
-              <a:t>Menü</a:t>
+              <a:t>Security Center</a:t>
             </a:r>
           </a:p>
         </p:txBody>
@@ -20459,47 +20251,12 @@
           </a:p>
         </p:txBody>
       </p:sp>
-      <p:pic>
-        <p:nvPicPr>
-          <p:cNvPr id="8" name="Inhaltsplatzhalter 7">
-            <a:extLst>
-              <a:ext uri="{FF2B5EF4-FFF2-40B4-BE49-F238E27FC236}">
-                <a16:creationId xmlns:a16="http://schemas.microsoft.com/office/drawing/2014/main" id="{5380FC4C-BF13-4DA4-8096-73F6ED472126}"/>
-              </a:ext>
-            </a:extLst>
-          </p:cNvPr>
-          <p:cNvPicPr>
-            <a:picLocks noGrp="1" noChangeAspect="1"/>
-          </p:cNvPicPr>
-          <p:nvPr>
-            <p:ph idx="1"/>
-          </p:nvPr>
-        </p:nvPicPr>
-        <p:blipFill>
-          <a:blip r:embed="rId2">
-            <a:extLst>
-              <a:ext uri="{28A0092B-C50C-407E-A947-70E740481C1C}">
-                <a14:useLocalDpi xmlns:a14="http://schemas.microsoft.com/office/drawing/2010/main" val="0"/>
-              </a:ext>
-            </a:extLst>
-          </a:blip>
-          <a:stretch>
-            <a:fillRect/>
-          </a:stretch>
-        </p:blipFill>
-        <p:spPr>
-          <a:xfrm>
-            <a:off x="5126418" y="1282152"/>
-            <a:ext cx="6538929" cy="3987151"/>
-          </a:xfrm>
-        </p:spPr>
-      </p:pic>
       <p:sp>
         <p:nvSpPr>
           <p:cNvPr id="4" name="Datumsplatzhalter 3">
             <a:extLst>
               <a:ext uri="{FF2B5EF4-FFF2-40B4-BE49-F238E27FC236}">
-                <a16:creationId xmlns:a16="http://schemas.microsoft.com/office/drawing/2014/main" id="{662F5976-5C8C-4B20-AC9A-122A78B4BF20}"/>
+                <a16:creationId xmlns:a16="http://schemas.microsoft.com/office/drawing/2014/main" id="{C6952BBD-3580-4B88-8A57-ACD44A948AE0}"/>
               </a:ext>
             </a:extLst>
           </p:cNvPr>
@@ -20534,7 +20291,7 @@
                   <a:spcPts val="600"/>
                 </a:spcAft>
               </a:pPr>
-              <a:t>06.12.2021</a:t>
+              <a:t>07.12.2021</a:t>
             </a:fld>
             <a:endParaRPr lang="de-DE"/>
           </a:p>
@@ -20545,7 +20302,7 @@
           <p:cNvPr id="5" name="Fußzeilenplatzhalter 4">
             <a:extLst>
               <a:ext uri="{FF2B5EF4-FFF2-40B4-BE49-F238E27FC236}">
-                <a16:creationId xmlns:a16="http://schemas.microsoft.com/office/drawing/2014/main" id="{006CD623-F503-4F63-B4E7-4BA716A460AA}"/>
+                <a16:creationId xmlns:a16="http://schemas.microsoft.com/office/drawing/2014/main" id="{7A1827F1-0829-4ABF-89F7-A8CAD4E0CDBC}"/>
               </a:ext>
             </a:extLst>
           </p:cNvPr>
@@ -20596,7 +20353,7 @@
           <p:cNvPr id="6" name="Foliennummernplatzhalter 5">
             <a:extLst>
               <a:ext uri="{FF2B5EF4-FFF2-40B4-BE49-F238E27FC236}">
-                <a16:creationId xmlns:a16="http://schemas.microsoft.com/office/drawing/2014/main" id="{FDDA8B31-3877-4182-95EA-7F20D86E5D35}"/>
+                <a16:creationId xmlns:a16="http://schemas.microsoft.com/office/drawing/2014/main" id="{FB0EFD9E-21EC-44D0-9690-7DB4FEC1A42B}"/>
               </a:ext>
             </a:extLst>
           </p:cNvPr>
@@ -20637,10 +20394,45 @@
           </a:p>
         </p:txBody>
       </p:sp>
+      <p:pic>
+        <p:nvPicPr>
+          <p:cNvPr id="7" name="Inhaltsplatzhalter 6">
+            <a:extLst>
+              <a:ext uri="{FF2B5EF4-FFF2-40B4-BE49-F238E27FC236}">
+                <a16:creationId xmlns:a16="http://schemas.microsoft.com/office/drawing/2014/main" id="{76469D09-CE7E-4C44-90D5-79F74A4EE7E1}"/>
+              </a:ext>
+            </a:extLst>
+          </p:cNvPr>
+          <p:cNvPicPr>
+            <a:picLocks noGrp="1" noChangeAspect="1"/>
+          </p:cNvPicPr>
+          <p:nvPr>
+            <p:ph idx="1"/>
+          </p:nvPr>
+        </p:nvPicPr>
+        <p:blipFill>
+          <a:blip r:embed="rId2">
+            <a:extLst>
+              <a:ext uri="{28A0092B-C50C-407E-A947-70E740481C1C}">
+                <a14:useLocalDpi xmlns:a14="http://schemas.microsoft.com/office/drawing/2010/main" val="0"/>
+              </a:ext>
+            </a:extLst>
+          </a:blip>
+          <a:stretch>
+            <a:fillRect/>
+          </a:stretch>
+        </p:blipFill>
+        <p:spPr>
+          <a:xfrm>
+            <a:off x="5124972" y="1153139"/>
+            <a:ext cx="6924964" cy="4222538"/>
+          </a:xfrm>
+        </p:spPr>
+      </p:pic>
     </p:spTree>
     <p:extLst>
       <p:ext uri="{BB962C8B-B14F-4D97-AF65-F5344CB8AC3E}">
-        <p14:creationId xmlns:p14="http://schemas.microsoft.com/office/powerpoint/2010/main" val="38656497"/>
+        <p14:creationId xmlns:p14="http://schemas.microsoft.com/office/powerpoint/2010/main" val="803378971"/>
       </p:ext>
     </p:extLst>
   </p:cSld>
@@ -20793,7 +20585,7 @@
           <a:p>
             <a:fld id="{3B67833A-1DD4-43AC-8283-6A25D2836683}" type="datetime1">
               <a:rPr lang="de-DE" smtClean="0"/>
-              <a:t>06.12.2021</a:t>
+              <a:t>07.12.2021</a:t>
             </a:fld>
             <a:endParaRPr lang="de-DE"/>
           </a:p>
@@ -20820,6 +20612,7 @@
           <a:bodyPr/>
           <a:lstStyle/>
           <a:p>
+            <a:pPr algn="l"/>
             <a:r>
               <a:rPr lang="de-DE" dirty="0"/>
               <a:t>Leah Röser und Ann-Sofie </a:t>
@@ -20834,23 +20627,17 @@
             </a:r>
           </a:p>
           <a:p>
+            <a:pPr algn="l"/>
             <a:r>
               <a:rPr lang="de-DE" dirty="0"/>
               <a:t>Studentinnen der Technischen Hochschule Köln</a:t>
             </a:r>
           </a:p>
           <a:p>
+            <a:pPr algn="l"/>
             <a:r>
               <a:rPr lang="de-DE" dirty="0"/>
-              <a:t>In </a:t>
-            </a:r>
-            <a:r>
-              <a:rPr lang="de-DE" dirty="0" err="1"/>
-              <a:t>zusammenarbeit</a:t>
-            </a:r>
-            <a:r>
-              <a:rPr lang="de-DE" dirty="0"/>
-              <a:t> mit der G DATA </a:t>
+              <a:t>in Zusammenarbeit mit der G DATA </a:t>
             </a:r>
             <a:r>
               <a:rPr lang="de-DE" dirty="0" err="1"/>
@@ -20892,6 +20679,78 @@
           </a:p>
         </p:txBody>
       </p:sp>
+      <p:pic>
+        <p:nvPicPr>
+          <p:cNvPr id="12" name="Grafik 11">
+            <a:extLst>
+              <a:ext uri="{FF2B5EF4-FFF2-40B4-BE49-F238E27FC236}">
+                <a16:creationId xmlns:a16="http://schemas.microsoft.com/office/drawing/2014/main" id="{27F4E62D-738D-4709-A0BD-A0392F66C5A6}"/>
+              </a:ext>
+            </a:extLst>
+          </p:cNvPr>
+          <p:cNvPicPr>
+            <a:picLocks noChangeAspect="1"/>
+          </p:cNvPicPr>
+          <p:nvPr/>
+        </p:nvPicPr>
+        <p:blipFill>
+          <a:blip r:embed="rId2">
+            <a:extLst>
+              <a:ext uri="{28A0092B-C50C-407E-A947-70E740481C1C}">
+                <a14:useLocalDpi xmlns:a14="http://schemas.microsoft.com/office/drawing/2010/main" val="0"/>
+              </a:ext>
+            </a:extLst>
+          </a:blip>
+          <a:stretch>
+            <a:fillRect/>
+          </a:stretch>
+        </p:blipFill>
+        <p:spPr>
+          <a:xfrm>
+            <a:off x="9278100" y="6075869"/>
+            <a:ext cx="1229063" cy="782131"/>
+          </a:xfrm>
+          <a:prstGeom prst="rect">
+            <a:avLst/>
+          </a:prstGeom>
+        </p:spPr>
+      </p:pic>
+      <p:pic>
+        <p:nvPicPr>
+          <p:cNvPr id="14" name="Grafik 13">
+            <a:extLst>
+              <a:ext uri="{FF2B5EF4-FFF2-40B4-BE49-F238E27FC236}">
+                <a16:creationId xmlns:a16="http://schemas.microsoft.com/office/drawing/2014/main" id="{A01AA48C-B151-489B-999C-29851389246C}"/>
+              </a:ext>
+            </a:extLst>
+          </p:cNvPr>
+          <p:cNvPicPr>
+            <a:picLocks noChangeAspect="1"/>
+          </p:cNvPicPr>
+          <p:nvPr/>
+        </p:nvPicPr>
+        <p:blipFill>
+          <a:blip r:embed="rId3">
+            <a:extLst>
+              <a:ext uri="{28A0092B-C50C-407E-A947-70E740481C1C}">
+                <a14:useLocalDpi xmlns:a14="http://schemas.microsoft.com/office/drawing/2010/main" val="0"/>
+              </a:ext>
+            </a:extLst>
+          </a:blip>
+          <a:stretch>
+            <a:fillRect/>
+          </a:stretch>
+        </p:blipFill>
+        <p:spPr>
+          <a:xfrm>
+            <a:off x="10680887" y="6075869"/>
+            <a:ext cx="1338546" cy="782131"/>
+          </a:xfrm>
+          <a:prstGeom prst="rect">
+            <a:avLst/>
+          </a:prstGeom>
+        </p:spPr>
+      </p:pic>
     </p:spTree>
     <p:extLst>
       <p:ext uri="{BB962C8B-B14F-4D97-AF65-F5344CB8AC3E}">
@@ -20995,7 +20854,7 @@
           <p:cNvPr id="2" name="Titel 1">
             <a:extLst>
               <a:ext uri="{FF2B5EF4-FFF2-40B4-BE49-F238E27FC236}">
-                <a16:creationId xmlns:a16="http://schemas.microsoft.com/office/drawing/2014/main" id="{391A9339-17CE-4D9C-8BB3-E22B68B1E737}"/>
+                <a16:creationId xmlns:a16="http://schemas.microsoft.com/office/drawing/2014/main" id="{19DF17A4-A172-4B5D-B74F-704938AED756}"/>
               </a:ext>
             </a:extLst>
           </p:cNvPr>
@@ -21008,7 +20867,7 @@
         </p:nvSpPr>
         <p:spPr>
           <a:xfrm>
-            <a:off x="841248" y="548640"/>
+            <a:off x="838200" y="548640"/>
             <a:ext cx="3600860" cy="5431536"/>
           </a:xfrm>
         </p:spPr>
@@ -21021,7 +20880,7 @@
             <a:pPr algn="ctr"/>
             <a:r>
               <a:rPr lang="de-DE" sz="3200" dirty="0"/>
-              <a:t>Account</a:t>
+              <a:t>Menü</a:t>
             </a:r>
           </a:p>
         </p:txBody>
@@ -21374,7 +21233,7 @@
           <p:cNvPr id="8" name="Inhaltsplatzhalter 7">
             <a:extLst>
               <a:ext uri="{FF2B5EF4-FFF2-40B4-BE49-F238E27FC236}">
-                <a16:creationId xmlns:a16="http://schemas.microsoft.com/office/drawing/2014/main" id="{326A5440-1918-4BD2-B850-5FA7A53B1C71}"/>
+                <a16:creationId xmlns:a16="http://schemas.microsoft.com/office/drawing/2014/main" id="{5380FC4C-BF13-4DA4-8096-73F6ED472126}"/>
               </a:ext>
             </a:extLst>
           </p:cNvPr>
@@ -21399,8 +21258,8 @@
         </p:blipFill>
         <p:spPr>
           <a:xfrm>
-            <a:off x="5097995" y="1195393"/>
-            <a:ext cx="6786369" cy="4138029"/>
+            <a:off x="5126418" y="1282152"/>
+            <a:ext cx="6538929" cy="3987151"/>
           </a:xfrm>
         </p:spPr>
       </p:pic>
@@ -21409,7 +21268,7 @@
           <p:cNvPr id="4" name="Datumsplatzhalter 3">
             <a:extLst>
               <a:ext uri="{FF2B5EF4-FFF2-40B4-BE49-F238E27FC236}">
-                <a16:creationId xmlns:a16="http://schemas.microsoft.com/office/drawing/2014/main" id="{084935C6-8B2F-4BA7-851F-FE464190B4D4}"/>
+                <a16:creationId xmlns:a16="http://schemas.microsoft.com/office/drawing/2014/main" id="{662F5976-5C8C-4B20-AC9A-122A78B4BF20}"/>
               </a:ext>
             </a:extLst>
           </p:cNvPr>
@@ -21444,7 +21303,7 @@
                   <a:spcPts val="600"/>
                 </a:spcAft>
               </a:pPr>
-              <a:t>06.12.2021</a:t>
+              <a:t>07.12.2021</a:t>
             </a:fld>
             <a:endParaRPr lang="de-DE"/>
           </a:p>
@@ -21455,7 +21314,7 @@
           <p:cNvPr id="5" name="Fußzeilenplatzhalter 4">
             <a:extLst>
               <a:ext uri="{FF2B5EF4-FFF2-40B4-BE49-F238E27FC236}">
-                <a16:creationId xmlns:a16="http://schemas.microsoft.com/office/drawing/2014/main" id="{1EFB61AA-9D44-41D2-BA52-3E4517E0136C}"/>
+                <a16:creationId xmlns:a16="http://schemas.microsoft.com/office/drawing/2014/main" id="{006CD623-F503-4F63-B4E7-4BA716A460AA}"/>
               </a:ext>
             </a:extLst>
           </p:cNvPr>
@@ -21506,7 +21365,7 @@
           <p:cNvPr id="6" name="Foliennummernplatzhalter 5">
             <a:extLst>
               <a:ext uri="{FF2B5EF4-FFF2-40B4-BE49-F238E27FC236}">
-                <a16:creationId xmlns:a16="http://schemas.microsoft.com/office/drawing/2014/main" id="{5CDF83A1-23F7-4DB9-9DAC-2E7FC10C6ACF}"/>
+                <a16:creationId xmlns:a16="http://schemas.microsoft.com/office/drawing/2014/main" id="{FDDA8B31-3877-4182-95EA-7F20D86E5D35}"/>
               </a:ext>
             </a:extLst>
           </p:cNvPr>
@@ -21550,7 +21409,7 @@
     </p:spTree>
     <p:extLst>
       <p:ext uri="{BB962C8B-B14F-4D97-AF65-F5344CB8AC3E}">
-        <p14:creationId xmlns:p14="http://schemas.microsoft.com/office/powerpoint/2010/main" val="783727517"/>
+        <p14:creationId xmlns:p14="http://schemas.microsoft.com/office/powerpoint/2010/main" val="38656497"/>
       </p:ext>
     </p:extLst>
   </p:cSld>
@@ -21650,7 +21509,7 @@
           <p:cNvPr id="2" name="Titel 1">
             <a:extLst>
               <a:ext uri="{FF2B5EF4-FFF2-40B4-BE49-F238E27FC236}">
-                <a16:creationId xmlns:a16="http://schemas.microsoft.com/office/drawing/2014/main" id="{05C0AAD8-5CCD-421B-8EDD-CC8A83992BB2}"/>
+                <a16:creationId xmlns:a16="http://schemas.microsoft.com/office/drawing/2014/main" id="{391A9339-17CE-4D9C-8BB3-E22B68B1E737}"/>
               </a:ext>
             </a:extLst>
           </p:cNvPr>
@@ -21676,7 +21535,7 @@
             <a:pPr algn="ctr"/>
             <a:r>
               <a:rPr lang="de-DE" sz="3200" dirty="0"/>
-              <a:t>Einstellungen</a:t>
+              <a:t>Account</a:t>
             </a:r>
           </a:p>
         </p:txBody>
@@ -22026,10 +21885,10 @@
       </p:sp>
       <p:pic>
         <p:nvPicPr>
-          <p:cNvPr id="8" name="Inhaltsplatzhalter 7" descr="Ein Bild, das Text enthält.&#10;&#10;Automatisch generierte Beschreibung">
+          <p:cNvPr id="8" name="Inhaltsplatzhalter 7">
             <a:extLst>
               <a:ext uri="{FF2B5EF4-FFF2-40B4-BE49-F238E27FC236}">
-                <a16:creationId xmlns:a16="http://schemas.microsoft.com/office/drawing/2014/main" id="{28116031-6452-4578-A38C-35C6B7875FEB}"/>
+                <a16:creationId xmlns:a16="http://schemas.microsoft.com/office/drawing/2014/main" id="{326A5440-1918-4BD2-B850-5FA7A53B1C71}"/>
               </a:ext>
             </a:extLst>
           </p:cNvPr>
@@ -22054,8 +21913,8 @@
         </p:blipFill>
         <p:spPr>
           <a:xfrm>
-            <a:off x="5126418" y="1282045"/>
-            <a:ext cx="6523644" cy="3977831"/>
+            <a:off x="5097995" y="1195393"/>
+            <a:ext cx="6786369" cy="4138029"/>
           </a:xfrm>
         </p:spPr>
       </p:pic>
@@ -22064,7 +21923,7 @@
           <p:cNvPr id="4" name="Datumsplatzhalter 3">
             <a:extLst>
               <a:ext uri="{FF2B5EF4-FFF2-40B4-BE49-F238E27FC236}">
-                <a16:creationId xmlns:a16="http://schemas.microsoft.com/office/drawing/2014/main" id="{50C92B28-1CCF-45DB-ABFD-B8FE83E5E09E}"/>
+                <a16:creationId xmlns:a16="http://schemas.microsoft.com/office/drawing/2014/main" id="{084935C6-8B2F-4BA7-851F-FE464190B4D4}"/>
               </a:ext>
             </a:extLst>
           </p:cNvPr>
@@ -22099,7 +21958,662 @@
                   <a:spcPts val="600"/>
                 </a:spcAft>
               </a:pPr>
-              <a:t>06.12.2021</a:t>
+              <a:t>07.12.2021</a:t>
+            </a:fld>
+            <a:endParaRPr lang="de-DE"/>
+          </a:p>
+        </p:txBody>
+      </p:sp>
+      <p:sp>
+        <p:nvSpPr>
+          <p:cNvPr id="5" name="Fußzeilenplatzhalter 4">
+            <a:extLst>
+              <a:ext uri="{FF2B5EF4-FFF2-40B4-BE49-F238E27FC236}">
+                <a16:creationId xmlns:a16="http://schemas.microsoft.com/office/drawing/2014/main" id="{1EFB61AA-9D44-41D2-BA52-3E4517E0136C}"/>
+              </a:ext>
+            </a:extLst>
+          </p:cNvPr>
+          <p:cNvSpPr>
+            <a:spLocks noGrp="1"/>
+          </p:cNvSpPr>
+          <p:nvPr>
+            <p:ph type="ftr" sz="quarter" idx="11"/>
+          </p:nvPr>
+        </p:nvSpPr>
+        <p:spPr>
+          <a:xfrm>
+            <a:off x="4038600" y="6356350"/>
+            <a:ext cx="4114800" cy="365125"/>
+          </a:xfrm>
+        </p:spPr>
+        <p:txBody>
+          <a:bodyPr>
+            <a:normAutofit/>
+          </a:bodyPr>
+          <a:lstStyle/>
+          <a:p>
+            <a:pPr algn="l">
+              <a:lnSpc>
+                <a:spcPct val="90000"/>
+              </a:lnSpc>
+              <a:spcAft>
+                <a:spcPts val="600"/>
+              </a:spcAft>
+            </a:pPr>
+            <a:r>
+              <a:rPr lang="de-DE" sz="900" dirty="0"/>
+              <a:t>Leah Röser und Ann-Sofie Witfeld Studentinnen der Technischen Hochschule Köln in Zusammenarbeit mit der G DATA </a:t>
+            </a:r>
+            <a:r>
+              <a:rPr lang="de-DE" sz="900" dirty="0" err="1"/>
+              <a:t>Cyber</a:t>
+            </a:r>
+            <a:r>
+              <a:rPr lang="de-DE" sz="900" dirty="0"/>
+              <a:t> Defense AG </a:t>
+            </a:r>
+          </a:p>
+        </p:txBody>
+      </p:sp>
+      <p:sp>
+        <p:nvSpPr>
+          <p:cNvPr id="6" name="Foliennummernplatzhalter 5">
+            <a:extLst>
+              <a:ext uri="{FF2B5EF4-FFF2-40B4-BE49-F238E27FC236}">
+                <a16:creationId xmlns:a16="http://schemas.microsoft.com/office/drawing/2014/main" id="{5CDF83A1-23F7-4DB9-9DAC-2E7FC10C6ACF}"/>
+              </a:ext>
+            </a:extLst>
+          </p:cNvPr>
+          <p:cNvSpPr>
+            <a:spLocks noGrp="1"/>
+          </p:cNvSpPr>
+          <p:nvPr>
+            <p:ph type="sldNum" sz="quarter" idx="12"/>
+          </p:nvPr>
+        </p:nvSpPr>
+        <p:spPr>
+          <a:xfrm>
+            <a:off x="8610600" y="6356350"/>
+            <a:ext cx="2743200" cy="365125"/>
+          </a:xfrm>
+        </p:spPr>
+        <p:txBody>
+          <a:bodyPr>
+            <a:normAutofit/>
+          </a:bodyPr>
+          <a:lstStyle/>
+          <a:p>
+            <a:pPr>
+              <a:spcAft>
+                <a:spcPts val="600"/>
+              </a:spcAft>
+            </a:pPr>
+            <a:fld id="{BA339110-3B6D-47C9-BD11-4F5D57F3A5D0}" type="slidenum">
+              <a:rPr lang="de-DE" smtClean="0"/>
+              <a:pPr>
+                <a:spcAft>
+                  <a:spcPts val="600"/>
+                </a:spcAft>
+              </a:pPr>
+              <a:t>21</a:t>
+            </a:fld>
+            <a:endParaRPr lang="de-DE"/>
+          </a:p>
+        </p:txBody>
+      </p:sp>
+    </p:spTree>
+    <p:extLst>
+      <p:ext uri="{BB962C8B-B14F-4D97-AF65-F5344CB8AC3E}">
+        <p14:creationId xmlns:p14="http://schemas.microsoft.com/office/powerpoint/2010/main" val="783727517"/>
+      </p:ext>
+    </p:extLst>
+  </p:cSld>
+  <p:clrMapOvr>
+    <a:masterClrMapping/>
+  </p:clrMapOvr>
+</p:sld>
+</file>
+
+<file path=ppt/slides/slide22.xml><?xml version="1.0" encoding="utf-8"?>
+<p:sld xmlns:a="http://schemas.openxmlformats.org/drawingml/2006/main" xmlns:r="http://schemas.openxmlformats.org/officeDocument/2006/relationships" xmlns:p="http://schemas.openxmlformats.org/presentationml/2006/main">
+  <p:cSld>
+    <p:bg>
+      <p:bgPr>
+        <a:solidFill>
+          <a:schemeClr val="bg1"/>
+        </a:solidFill>
+        <a:effectLst/>
+      </p:bgPr>
+    </p:bg>
+    <p:spTree>
+      <p:nvGrpSpPr>
+        <p:cNvPr id="1" name=""/>
+        <p:cNvGrpSpPr/>
+        <p:nvPr/>
+      </p:nvGrpSpPr>
+      <p:grpSpPr>
+        <a:xfrm>
+          <a:off x="0" y="0"/>
+          <a:ext cx="0" cy="0"/>
+          <a:chOff x="0" y="0"/>
+          <a:chExt cx="0" cy="0"/>
+        </a:xfrm>
+      </p:grpSpPr>
+      <p:sp useBgFill="1">
+        <p:nvSpPr>
+          <p:cNvPr id="11" name="Rectangle 10">
+            <a:extLst>
+              <a:ext uri="{FF2B5EF4-FFF2-40B4-BE49-F238E27FC236}">
+                <a16:creationId xmlns:a16="http://schemas.microsoft.com/office/drawing/2014/main" id="{777A147A-9ED8-46B4-8660-1B3C2AA880B5}"/>
+              </a:ext>
+              <a:ext uri="{C183D7F6-B498-43B3-948B-1728B52AA6E4}">
+                <adec:decorative xmlns:adec="http://schemas.microsoft.com/office/drawing/2017/decorative" val="1"/>
+              </a:ext>
+            </a:extLst>
+          </p:cNvPr>
+          <p:cNvSpPr>
+            <a:spLocks noGrp="1" noRot="1" noChangeAspect="1" noMove="1" noResize="1" noEditPoints="1" noAdjustHandles="1" noChangeArrowheads="1" noChangeShapeType="1" noTextEdit="1"/>
+          </p:cNvSpPr>
+          <p:nvPr>
+            <p:extLst>
+              <p:ext uri="{386F3935-93C4-4BCD-93E2-E3B085C9AB24}">
+                <p16:designElem xmlns:p16="http://schemas.microsoft.com/office/powerpoint/2015/main" val="1"/>
+              </p:ext>
+            </p:extLst>
+          </p:nvPr>
+        </p:nvSpPr>
+        <p:spPr>
+          <a:xfrm>
+            <a:off x="0" y="0"/>
+            <a:ext cx="12188952" cy="6858000"/>
+          </a:xfrm>
+          <a:prstGeom prst="rect">
+            <a:avLst/>
+          </a:prstGeom>
+          <a:ln>
+            <a:noFill/>
+          </a:ln>
+        </p:spPr>
+        <p:style>
+          <a:lnRef idx="2">
+            <a:schemeClr val="accent1">
+              <a:shade val="50000"/>
+            </a:schemeClr>
+          </a:lnRef>
+          <a:fillRef idx="1">
+            <a:schemeClr val="accent1"/>
+          </a:fillRef>
+          <a:effectRef idx="0">
+            <a:schemeClr val="accent1"/>
+          </a:effectRef>
+          <a:fontRef idx="minor">
+            <a:schemeClr val="lt1"/>
+          </a:fontRef>
+        </p:style>
+        <p:txBody>
+          <a:bodyPr rtlCol="0" anchor="ctr"/>
+          <a:lstStyle/>
+          <a:p>
+            <a:pPr algn="ctr"/>
+            <a:endParaRPr lang="en-US"/>
+          </a:p>
+        </p:txBody>
+      </p:sp>
+      <p:sp>
+        <p:nvSpPr>
+          <p:cNvPr id="2" name="Titel 1">
+            <a:extLst>
+              <a:ext uri="{FF2B5EF4-FFF2-40B4-BE49-F238E27FC236}">
+                <a16:creationId xmlns:a16="http://schemas.microsoft.com/office/drawing/2014/main" id="{05C0AAD8-5CCD-421B-8EDD-CC8A83992BB2}"/>
+              </a:ext>
+            </a:extLst>
+          </p:cNvPr>
+          <p:cNvSpPr>
+            <a:spLocks noGrp="1"/>
+          </p:cNvSpPr>
+          <p:nvPr>
+            <p:ph type="title"/>
+          </p:nvPr>
+        </p:nvSpPr>
+        <p:spPr>
+          <a:xfrm>
+            <a:off x="841248" y="548640"/>
+            <a:ext cx="3600860" cy="5431536"/>
+          </a:xfrm>
+        </p:spPr>
+        <p:txBody>
+          <a:bodyPr>
+            <a:normAutofit/>
+          </a:bodyPr>
+          <a:lstStyle/>
+          <a:p>
+            <a:pPr algn="ctr"/>
+            <a:r>
+              <a:rPr lang="de-DE" sz="3200" dirty="0"/>
+              <a:t>Einstellungen</a:t>
+            </a:r>
+          </a:p>
+        </p:txBody>
+      </p:sp>
+      <p:sp>
+        <p:nvSpPr>
+          <p:cNvPr id="13" name="sketch line">
+            <a:extLst>
+              <a:ext uri="{FF2B5EF4-FFF2-40B4-BE49-F238E27FC236}">
+                <a16:creationId xmlns:a16="http://schemas.microsoft.com/office/drawing/2014/main" id="{5D6C15A0-C087-4593-8414-2B4EC1CDC3DE}"/>
+              </a:ext>
+              <a:ext uri="{C183D7F6-B498-43B3-948B-1728B52AA6E4}">
+                <adec:decorative xmlns:adec="http://schemas.microsoft.com/office/drawing/2017/decorative" val="1"/>
+              </a:ext>
+            </a:extLst>
+          </p:cNvPr>
+          <p:cNvSpPr>
+            <a:spLocks noGrp="1" noRot="1" noChangeAspect="1" noMove="1" noResize="1" noEditPoints="1" noAdjustHandles="1" noChangeArrowheads="1" noChangeShapeType="1" noTextEdit="1"/>
+          </p:cNvSpPr>
+          <p:nvPr>
+            <p:extLst>
+              <p:ext uri="{386F3935-93C4-4BCD-93E2-E3B085C9AB24}">
+                <p16:designElem xmlns:p16="http://schemas.microsoft.com/office/powerpoint/2015/main" val="1"/>
+              </p:ext>
+            </p:extLst>
+          </p:nvPr>
+        </p:nvSpPr>
+        <p:spPr>
+          <a:xfrm rot="5400000">
+            <a:off x="2543983" y="3258715"/>
+            <a:ext cx="4480560" cy="18288"/>
+          </a:xfrm>
+          <a:custGeom>
+            <a:avLst/>
+            <a:gdLst>
+              <a:gd name="connsiteX0" fmla="*/ 0 w 4480560"/>
+              <a:gd name="connsiteY0" fmla="*/ 0 h 18288"/>
+              <a:gd name="connsiteX1" fmla="*/ 595274 w 4480560"/>
+              <a:gd name="connsiteY1" fmla="*/ 0 h 18288"/>
+              <a:gd name="connsiteX2" fmla="*/ 1100938 w 4480560"/>
+              <a:gd name="connsiteY2" fmla="*/ 0 h 18288"/>
+              <a:gd name="connsiteX3" fmla="*/ 1651406 w 4480560"/>
+              <a:gd name="connsiteY3" fmla="*/ 0 h 18288"/>
+              <a:gd name="connsiteX4" fmla="*/ 2336292 w 4480560"/>
+              <a:gd name="connsiteY4" fmla="*/ 0 h 18288"/>
+              <a:gd name="connsiteX5" fmla="*/ 2931566 w 4480560"/>
+              <a:gd name="connsiteY5" fmla="*/ 0 h 18288"/>
+              <a:gd name="connsiteX6" fmla="*/ 3482035 w 4480560"/>
+              <a:gd name="connsiteY6" fmla="*/ 0 h 18288"/>
+              <a:gd name="connsiteX7" fmla="*/ 4480560 w 4480560"/>
+              <a:gd name="connsiteY7" fmla="*/ 0 h 18288"/>
+              <a:gd name="connsiteX8" fmla="*/ 4480560 w 4480560"/>
+              <a:gd name="connsiteY8" fmla="*/ 18288 h 18288"/>
+              <a:gd name="connsiteX9" fmla="*/ 3840480 w 4480560"/>
+              <a:gd name="connsiteY9" fmla="*/ 18288 h 18288"/>
+              <a:gd name="connsiteX10" fmla="*/ 3290011 w 4480560"/>
+              <a:gd name="connsiteY10" fmla="*/ 18288 h 18288"/>
+              <a:gd name="connsiteX11" fmla="*/ 2560320 w 4480560"/>
+              <a:gd name="connsiteY11" fmla="*/ 18288 h 18288"/>
+              <a:gd name="connsiteX12" fmla="*/ 1965046 w 4480560"/>
+              <a:gd name="connsiteY12" fmla="*/ 18288 h 18288"/>
+              <a:gd name="connsiteX13" fmla="*/ 1459382 w 4480560"/>
+              <a:gd name="connsiteY13" fmla="*/ 18288 h 18288"/>
+              <a:gd name="connsiteX14" fmla="*/ 774497 w 4480560"/>
+              <a:gd name="connsiteY14" fmla="*/ 18288 h 18288"/>
+              <a:gd name="connsiteX15" fmla="*/ 0 w 4480560"/>
+              <a:gd name="connsiteY15" fmla="*/ 18288 h 18288"/>
+              <a:gd name="connsiteX16" fmla="*/ 0 w 4480560"/>
+              <a:gd name="connsiteY16" fmla="*/ 0 h 18288"/>
+            </a:gdLst>
+            <a:ahLst/>
+            <a:cxnLst>
+              <a:cxn ang="0">
+                <a:pos x="connsiteX0" y="connsiteY0"/>
+              </a:cxn>
+              <a:cxn ang="0">
+                <a:pos x="connsiteX1" y="connsiteY1"/>
+              </a:cxn>
+              <a:cxn ang="0">
+                <a:pos x="connsiteX2" y="connsiteY2"/>
+              </a:cxn>
+              <a:cxn ang="0">
+                <a:pos x="connsiteX3" y="connsiteY3"/>
+              </a:cxn>
+              <a:cxn ang="0">
+                <a:pos x="connsiteX4" y="connsiteY4"/>
+              </a:cxn>
+              <a:cxn ang="0">
+                <a:pos x="connsiteX5" y="connsiteY5"/>
+              </a:cxn>
+              <a:cxn ang="0">
+                <a:pos x="connsiteX6" y="connsiteY6"/>
+              </a:cxn>
+              <a:cxn ang="0">
+                <a:pos x="connsiteX7" y="connsiteY7"/>
+              </a:cxn>
+              <a:cxn ang="0">
+                <a:pos x="connsiteX8" y="connsiteY8"/>
+              </a:cxn>
+              <a:cxn ang="0">
+                <a:pos x="connsiteX9" y="connsiteY9"/>
+              </a:cxn>
+              <a:cxn ang="0">
+                <a:pos x="connsiteX10" y="connsiteY10"/>
+              </a:cxn>
+              <a:cxn ang="0">
+                <a:pos x="connsiteX11" y="connsiteY11"/>
+              </a:cxn>
+              <a:cxn ang="0">
+                <a:pos x="connsiteX12" y="connsiteY12"/>
+              </a:cxn>
+              <a:cxn ang="0">
+                <a:pos x="connsiteX13" y="connsiteY13"/>
+              </a:cxn>
+              <a:cxn ang="0">
+                <a:pos x="connsiteX14" y="connsiteY14"/>
+              </a:cxn>
+              <a:cxn ang="0">
+                <a:pos x="connsiteX15" y="connsiteY15"/>
+              </a:cxn>
+              <a:cxn ang="0">
+                <a:pos x="connsiteX16" y="connsiteY16"/>
+              </a:cxn>
+            </a:cxnLst>
+            <a:rect l="l" t="t" r="r" b="b"/>
+            <a:pathLst>
+              <a:path w="4480560" h="18288" fill="none" extrusionOk="0">
+                <a:moveTo>
+                  <a:pt x="0" y="0"/>
+                </a:moveTo>
+                <a:cubicBezTo>
+                  <a:pt x="267821" y="8731"/>
+                  <a:pt x="334105" y="2629"/>
+                  <a:pt x="595274" y="0"/>
+                </a:cubicBezTo>
+                <a:cubicBezTo>
+                  <a:pt x="856443" y="-2629"/>
+                  <a:pt x="863808" y="-13353"/>
+                  <a:pt x="1100938" y="0"/>
+                </a:cubicBezTo>
+                <a:cubicBezTo>
+                  <a:pt x="1338068" y="13353"/>
+                  <a:pt x="1431663" y="-25862"/>
+                  <a:pt x="1651406" y="0"/>
+                </a:cubicBezTo>
+                <a:cubicBezTo>
+                  <a:pt x="1871149" y="25862"/>
+                  <a:pt x="2173163" y="23827"/>
+                  <a:pt x="2336292" y="0"/>
+                </a:cubicBezTo>
+                <a:cubicBezTo>
+                  <a:pt x="2499421" y="-23827"/>
+                  <a:pt x="2720589" y="28148"/>
+                  <a:pt x="2931566" y="0"/>
+                </a:cubicBezTo>
+                <a:cubicBezTo>
+                  <a:pt x="3142543" y="-28148"/>
+                  <a:pt x="3323630" y="27022"/>
+                  <a:pt x="3482035" y="0"/>
+                </a:cubicBezTo>
+                <a:cubicBezTo>
+                  <a:pt x="3640440" y="-27022"/>
+                  <a:pt x="4012110" y="-20118"/>
+                  <a:pt x="4480560" y="0"/>
+                </a:cubicBezTo>
+                <a:cubicBezTo>
+                  <a:pt x="4480958" y="7429"/>
+                  <a:pt x="4480540" y="10822"/>
+                  <a:pt x="4480560" y="18288"/>
+                </a:cubicBezTo>
+                <a:cubicBezTo>
+                  <a:pt x="4314132" y="14924"/>
+                  <a:pt x="4028383" y="36632"/>
+                  <a:pt x="3840480" y="18288"/>
+                </a:cubicBezTo>
+                <a:cubicBezTo>
+                  <a:pt x="3652577" y="-56"/>
+                  <a:pt x="3547615" y="2848"/>
+                  <a:pt x="3290011" y="18288"/>
+                </a:cubicBezTo>
+                <a:cubicBezTo>
+                  <a:pt x="3032407" y="33728"/>
+                  <a:pt x="2830268" y="8719"/>
+                  <a:pt x="2560320" y="18288"/>
+                </a:cubicBezTo>
+                <a:cubicBezTo>
+                  <a:pt x="2290372" y="27857"/>
+                  <a:pt x="2147422" y="6728"/>
+                  <a:pt x="1965046" y="18288"/>
+                </a:cubicBezTo>
+                <a:cubicBezTo>
+                  <a:pt x="1782670" y="29848"/>
+                  <a:pt x="1689791" y="40680"/>
+                  <a:pt x="1459382" y="18288"/>
+                </a:cubicBezTo>
+                <a:cubicBezTo>
+                  <a:pt x="1228973" y="-4104"/>
+                  <a:pt x="915486" y="36501"/>
+                  <a:pt x="774497" y="18288"/>
+                </a:cubicBezTo>
+                <a:cubicBezTo>
+                  <a:pt x="633508" y="75"/>
+                  <a:pt x="361442" y="-11107"/>
+                  <a:pt x="0" y="18288"/>
+                </a:cubicBezTo>
+                <a:cubicBezTo>
+                  <a:pt x="-591" y="13205"/>
+                  <a:pt x="-663" y="6329"/>
+                  <a:pt x="0" y="0"/>
+                </a:cubicBezTo>
+                <a:close/>
+              </a:path>
+              <a:path w="4480560" h="18288" stroke="0" extrusionOk="0">
+                <a:moveTo>
+                  <a:pt x="0" y="0"/>
+                </a:moveTo>
+                <a:cubicBezTo>
+                  <a:pt x="285465" y="225"/>
+                  <a:pt x="322691" y="16223"/>
+                  <a:pt x="595274" y="0"/>
+                </a:cubicBezTo>
+                <a:cubicBezTo>
+                  <a:pt x="867857" y="-16223"/>
+                  <a:pt x="989129" y="-11242"/>
+                  <a:pt x="1100938" y="0"/>
+                </a:cubicBezTo>
+                <a:cubicBezTo>
+                  <a:pt x="1212747" y="11242"/>
+                  <a:pt x="1574350" y="-36410"/>
+                  <a:pt x="1830629" y="0"/>
+                </a:cubicBezTo>
+                <a:cubicBezTo>
+                  <a:pt x="2086908" y="36410"/>
+                  <a:pt x="2180922" y="4645"/>
+                  <a:pt x="2425903" y="0"/>
+                </a:cubicBezTo>
+                <a:cubicBezTo>
+                  <a:pt x="2670884" y="-4645"/>
+                  <a:pt x="2782024" y="22929"/>
+                  <a:pt x="3021178" y="0"/>
+                </a:cubicBezTo>
+                <a:cubicBezTo>
+                  <a:pt x="3260332" y="-22929"/>
+                  <a:pt x="3456982" y="-1586"/>
+                  <a:pt x="3750869" y="0"/>
+                </a:cubicBezTo>
+                <a:cubicBezTo>
+                  <a:pt x="4044756" y="1586"/>
+                  <a:pt x="4302726" y="17043"/>
+                  <a:pt x="4480560" y="0"/>
+                </a:cubicBezTo>
+                <a:cubicBezTo>
+                  <a:pt x="4479674" y="5429"/>
+                  <a:pt x="4481381" y="14046"/>
+                  <a:pt x="4480560" y="18288"/>
+                </a:cubicBezTo>
+                <a:cubicBezTo>
+                  <a:pt x="4279652" y="-6850"/>
+                  <a:pt x="4200762" y="41566"/>
+                  <a:pt x="3930091" y="18288"/>
+                </a:cubicBezTo>
+                <a:cubicBezTo>
+                  <a:pt x="3659420" y="-4990"/>
+                  <a:pt x="3456052" y="22294"/>
+                  <a:pt x="3290011" y="18288"/>
+                </a:cubicBezTo>
+                <a:cubicBezTo>
+                  <a:pt x="3123970" y="14282"/>
+                  <a:pt x="2882392" y="32818"/>
+                  <a:pt x="2649931" y="18288"/>
+                </a:cubicBezTo>
+                <a:cubicBezTo>
+                  <a:pt x="2417470" y="3758"/>
+                  <a:pt x="2238426" y="7337"/>
+                  <a:pt x="2054657" y="18288"/>
+                </a:cubicBezTo>
+                <a:cubicBezTo>
+                  <a:pt x="1870888" y="29239"/>
+                  <a:pt x="1566368" y="45040"/>
+                  <a:pt x="1324966" y="18288"/>
+                </a:cubicBezTo>
+                <a:cubicBezTo>
+                  <a:pt x="1083564" y="-8464"/>
+                  <a:pt x="787410" y="10946"/>
+                  <a:pt x="595274" y="18288"/>
+                </a:cubicBezTo>
+                <a:cubicBezTo>
+                  <a:pt x="403138" y="25630"/>
+                  <a:pt x="169622" y="10499"/>
+                  <a:pt x="0" y="18288"/>
+                </a:cubicBezTo>
+                <a:cubicBezTo>
+                  <a:pt x="668" y="13665"/>
+                  <a:pt x="578" y="5675"/>
+                  <a:pt x="0" y="0"/>
+                </a:cubicBezTo>
+                <a:close/>
+              </a:path>
+            </a:pathLst>
+          </a:custGeom>
+          <a:solidFill>
+            <a:schemeClr val="accent2"/>
+          </a:solidFill>
+          <a:ln w="41275" cap="rnd">
+            <a:solidFill>
+              <a:schemeClr val="accent2"/>
+            </a:solidFill>
+            <a:round/>
+            <a:extLst>
+              <a:ext uri="{C807C97D-BFC1-408E-A445-0C87EB9F89A2}">
+                <ask:lineSketchStyleProps xmlns:ask="http://schemas.microsoft.com/office/drawing/2018/sketchyshapes" sd="1219033472">
+                  <a:prstGeom prst="rect">
+                    <a:avLst/>
+                  </a:prstGeom>
+                  <ask:type>
+                    <ask:lineSketchFreehand/>
+                  </ask:type>
+                </ask:lineSketchStyleProps>
+              </a:ext>
+            </a:extLst>
+          </a:ln>
+        </p:spPr>
+        <p:style>
+          <a:lnRef idx="2">
+            <a:schemeClr val="accent1">
+              <a:shade val="50000"/>
+            </a:schemeClr>
+          </a:lnRef>
+          <a:fillRef idx="1">
+            <a:schemeClr val="accent1"/>
+          </a:fillRef>
+          <a:effectRef idx="0">
+            <a:schemeClr val="accent1"/>
+          </a:effectRef>
+          <a:fontRef idx="minor">
+            <a:schemeClr val="lt1"/>
+          </a:fontRef>
+        </p:style>
+        <p:txBody>
+          <a:bodyPr rtlCol="0" anchor="ctr"/>
+          <a:lstStyle/>
+          <a:p>
+            <a:pPr algn="ctr"/>
+            <a:endParaRPr lang="en-US"/>
+          </a:p>
+        </p:txBody>
+      </p:sp>
+      <p:pic>
+        <p:nvPicPr>
+          <p:cNvPr id="8" name="Inhaltsplatzhalter 7" descr="Ein Bild, das Text enthält.&#10;&#10;Automatisch generierte Beschreibung">
+            <a:extLst>
+              <a:ext uri="{FF2B5EF4-FFF2-40B4-BE49-F238E27FC236}">
+                <a16:creationId xmlns:a16="http://schemas.microsoft.com/office/drawing/2014/main" id="{28116031-6452-4578-A38C-35C6B7875FEB}"/>
+              </a:ext>
+            </a:extLst>
+          </p:cNvPr>
+          <p:cNvPicPr>
+            <a:picLocks noGrp="1" noChangeAspect="1"/>
+          </p:cNvPicPr>
+          <p:nvPr>
+            <p:ph idx="1"/>
+          </p:nvPr>
+        </p:nvPicPr>
+        <p:blipFill>
+          <a:blip r:embed="rId2">
+            <a:extLst>
+              <a:ext uri="{28A0092B-C50C-407E-A947-70E740481C1C}">
+                <a14:useLocalDpi xmlns:a14="http://schemas.microsoft.com/office/drawing/2010/main" val="0"/>
+              </a:ext>
+            </a:extLst>
+          </a:blip>
+          <a:stretch>
+            <a:fillRect/>
+          </a:stretch>
+        </p:blipFill>
+        <p:spPr>
+          <a:xfrm>
+            <a:off x="5126418" y="1282045"/>
+            <a:ext cx="6523644" cy="3977831"/>
+          </a:xfrm>
+        </p:spPr>
+      </p:pic>
+      <p:sp>
+        <p:nvSpPr>
+          <p:cNvPr id="4" name="Datumsplatzhalter 3">
+            <a:extLst>
+              <a:ext uri="{FF2B5EF4-FFF2-40B4-BE49-F238E27FC236}">
+                <a16:creationId xmlns:a16="http://schemas.microsoft.com/office/drawing/2014/main" id="{50C92B28-1CCF-45DB-ABFD-B8FE83E5E09E}"/>
+              </a:ext>
+            </a:extLst>
+          </p:cNvPr>
+          <p:cNvSpPr>
+            <a:spLocks noGrp="1"/>
+          </p:cNvSpPr>
+          <p:nvPr>
+            <p:ph type="dt" sz="half" idx="10"/>
+          </p:nvPr>
+        </p:nvSpPr>
+        <p:spPr>
+          <a:xfrm>
+            <a:off x="838200" y="6356350"/>
+            <a:ext cx="2743200" cy="365125"/>
+          </a:xfrm>
+        </p:spPr>
+        <p:txBody>
+          <a:bodyPr>
+            <a:normAutofit/>
+          </a:bodyPr>
+          <a:lstStyle/>
+          <a:p>
+            <a:pPr>
+              <a:spcAft>
+                <a:spcPts val="600"/>
+              </a:spcAft>
+            </a:pPr>
+            <a:fld id="{645F39B9-3809-467E-8B5B-945AE22FF124}" type="datetime1">
+              <a:rPr lang="de-DE" smtClean="0"/>
+              <a:pPr>
+                <a:spcAft>
+                  <a:spcPts val="600"/>
+                </a:spcAft>
+              </a:pPr>
+              <a:t>07.12.2021</a:t>
             </a:fld>
             <a:endParaRPr lang="de-DE"/>
           </a:p>
@@ -22196,7 +22710,7 @@
                   <a:spcPts val="600"/>
                 </a:spcAft>
               </a:pPr>
-              <a:t>21</a:t>
+              <a:t>22</a:t>
             </a:fld>
             <a:endParaRPr lang="de-DE"/>
           </a:p>
@@ -22215,7 +22729,7 @@
 </p:sld>
 </file>
 
-<file path=ppt/slides/slide22.xml><?xml version="1.0" encoding="utf-8"?>
+<file path=ppt/slides/slide23.xml><?xml version="1.0" encoding="utf-8"?>
 <p:sld xmlns:a="http://schemas.openxmlformats.org/drawingml/2006/main" xmlns:r="http://schemas.openxmlformats.org/officeDocument/2006/relationships" xmlns:p="http://schemas.openxmlformats.org/presentationml/2006/main">
   <p:cSld>
     <p:bg>
@@ -23227,7 +23741,7 @@
                   <a:spcPts val="600"/>
                 </a:spcAft>
               </a:pPr>
-              <a:t>06.12.2021</a:t>
+              <a:t>07.12.2021</a:t>
             </a:fld>
             <a:endParaRPr lang="de-DE"/>
           </a:p>
@@ -23488,7 +24002,7 @@
 </p:sld>
 </file>
 
-<file path=ppt/slides/slide23.xml><?xml version="1.0" encoding="utf-8"?>
+<file path=ppt/slides/slide24.xml><?xml version="1.0" encoding="utf-8"?>
 <p:sld xmlns:a="http://schemas.openxmlformats.org/drawingml/2006/main" xmlns:r="http://schemas.openxmlformats.org/officeDocument/2006/relationships" xmlns:p="http://schemas.openxmlformats.org/presentationml/2006/main">
   <p:cSld>
     <p:bg>
@@ -24034,7 +24548,7 @@
                   <a:spcPts val="600"/>
                 </a:spcAft>
               </a:pPr>
-              <a:t>06.12.2021</a:t>
+              <a:t>07.12.2021</a:t>
             </a:fld>
             <a:endParaRPr lang="de-DE"/>
           </a:p>
@@ -24131,7 +24645,7 @@
                   <a:spcPts val="600"/>
                 </a:spcAft>
               </a:pPr>
-              <a:t>23</a:t>
+              <a:t>24</a:t>
             </a:fld>
             <a:endParaRPr lang="de-DE"/>
           </a:p>
@@ -24150,7 +24664,7 @@
 </p:sld>
 </file>
 
-<file path=ppt/slides/slide24.xml><?xml version="1.0" encoding="utf-8"?>
+<file path=ppt/slides/slide25.xml><?xml version="1.0" encoding="utf-8"?>
 <p:sld xmlns:a="http://schemas.openxmlformats.org/drawingml/2006/main" xmlns:r="http://schemas.openxmlformats.org/officeDocument/2006/relationships" xmlns:p="http://schemas.openxmlformats.org/presentationml/2006/main">
   <p:cSld>
     <p:spTree>
@@ -24190,7 +24704,7 @@
           <a:p>
             <a:fld id="{9949B707-072E-4C1D-AE51-078DEC55C1F2}" type="datetime1">
               <a:rPr lang="de-DE" smtClean="0"/>
-              <a:t>06.12.2021</a:t>
+              <a:t>07.12.2021</a:t>
             </a:fld>
             <a:endParaRPr lang="de-DE"/>
           </a:p>
@@ -24212,16 +24726,36 @@
             <p:ph type="ftr" sz="quarter" idx="11"/>
           </p:nvPr>
         </p:nvSpPr>
-        <p:spPr/>
+        <p:spPr>
+          <a:xfrm>
+            <a:off x="2930652" y="6035378"/>
+            <a:ext cx="6178296" cy="615506"/>
+          </a:xfrm>
+        </p:spPr>
         <p:txBody>
           <a:bodyPr/>
           <a:lstStyle/>
           <a:p>
             <a:r>
-              <a:rPr lang="de-DE"/>
-              <a:t>Leah Röser und Ann-Sofie Witfeld Studentinnen der Technischen Hochschule Köln In zusammenarbeit mit der G DATA Cyber Defense AG </a:t>
+              <a:rPr lang="de-DE" dirty="0"/>
+              <a:t>Leah Röser und Ann-Sofie Witfeld Studentinnen der Technischen Hochschule Köln In </a:t>
             </a:r>
-            <a:endParaRPr lang="de-DE" dirty="0"/>
+            <a:r>
+              <a:rPr lang="de-DE" dirty="0" err="1"/>
+              <a:t>zusammenarbeit</a:t>
+            </a:r>
+            <a:r>
+              <a:rPr lang="de-DE" dirty="0"/>
+              <a:t> mit der G DATA </a:t>
+            </a:r>
+            <a:r>
+              <a:rPr lang="de-DE" dirty="0" err="1"/>
+              <a:t>Cyber</a:t>
+            </a:r>
+            <a:r>
+              <a:rPr lang="de-DE" dirty="0"/>
+              <a:t> Defense AG </a:t>
+            </a:r>
           </a:p>
         </p:txBody>
       </p:sp>
@@ -24248,7 +24782,7 @@
           <a:p>
             <a:fld id="{BA339110-3B6D-47C9-BD11-4F5D57F3A5D0}" type="slidenum">
               <a:rPr lang="de-DE" smtClean="0"/>
-              <a:t>24</a:t>
+              <a:t>25</a:t>
             </a:fld>
             <a:endParaRPr lang="de-DE"/>
           </a:p>
@@ -24739,7 +25273,7 @@
 </p:sld>
 </file>
 
-<file path=ppt/slides/slide25.xml><?xml version="1.0" encoding="utf-8"?>
+<file path=ppt/slides/slide26.xml><?xml version="1.0" encoding="utf-8"?>
 <p:sld xmlns:a="http://schemas.openxmlformats.org/drawingml/2006/main" xmlns:r="http://schemas.openxmlformats.org/officeDocument/2006/relationships" xmlns:p="http://schemas.openxmlformats.org/presentationml/2006/main">
   <p:cSld>
     <p:bg>
@@ -25282,7 +25816,7 @@
                   <a:spcPts val="600"/>
                 </a:spcAft>
               </a:pPr>
-              <a:t>06.12.2021</a:t>
+              <a:t>07.12.2021</a:t>
             </a:fld>
             <a:endParaRPr lang="de-DE"/>
           </a:p>
@@ -25316,7 +25850,7 @@
           </a:bodyPr>
           <a:lstStyle/>
           <a:p>
-            <a:pPr>
+            <a:pPr algn="l">
               <a:lnSpc>
                 <a:spcPct val="90000"/>
               </a:lnSpc>
@@ -25325,8 +25859,16 @@
               </a:spcAft>
             </a:pPr>
             <a:r>
-              <a:rPr lang="de-DE" sz="900"/>
-              <a:t>Leah Röser und Ann-Sofie Witfeld Studentinnen der Technischen Hochschule Köln In zusammenarbeit mit der G DATA Cyber Defense AG </a:t>
+              <a:rPr lang="de-DE" sz="900" dirty="0"/>
+              <a:t>Leah Röser und Ann-Sofie Witfeld Studentinnen der Technischen Hochschule Köln in Zusammenarbeit mit der G DATA </a:t>
+            </a:r>
+            <a:r>
+              <a:rPr lang="de-DE" sz="900" dirty="0" err="1"/>
+              <a:t>Cyber</a:t>
+            </a:r>
+            <a:r>
+              <a:rPr lang="de-DE" sz="900" dirty="0"/>
+              <a:t> Defense AG </a:t>
             </a:r>
           </a:p>
         </p:txBody>
@@ -25371,7 +25913,7 @@
                   <a:spcPts val="600"/>
                 </a:spcAft>
               </a:pPr>
-              <a:t>25</a:t>
+              <a:t>26</a:t>
             </a:fld>
             <a:endParaRPr lang="de-DE"/>
           </a:p>
@@ -25390,7 +25932,7 @@
 </p:sld>
 </file>
 
-<file path=ppt/slides/slide26.xml><?xml version="1.0" encoding="utf-8"?>
+<file path=ppt/slides/slide27.xml><?xml version="1.0" encoding="utf-8"?>
 <p:sld xmlns:a="http://schemas.openxmlformats.org/drawingml/2006/main" xmlns:r="http://schemas.openxmlformats.org/officeDocument/2006/relationships" xmlns:p="http://schemas.openxmlformats.org/presentationml/2006/main">
   <p:cSld>
     <p:spTree>
@@ -25568,7 +26110,7 @@
           <a:p>
             <a:fld id="{9B7C69FD-89D8-4602-9683-CCF5AAAEF0B0}" type="datetime1">
               <a:rPr lang="de-DE" smtClean="0"/>
-              <a:t>06.12.2021</a:t>
+              <a:t>07.12.2021</a:t>
             </a:fld>
             <a:endParaRPr lang="de-DE"/>
           </a:p>
@@ -25590,16 +26132,29 @@
             <p:ph type="ftr" sz="quarter" idx="11"/>
           </p:nvPr>
         </p:nvSpPr>
-        <p:spPr/>
+        <p:spPr>
+          <a:xfrm>
+            <a:off x="3006852" y="6000402"/>
+            <a:ext cx="6178296" cy="615506"/>
+          </a:xfrm>
+        </p:spPr>
         <p:txBody>
           <a:bodyPr/>
           <a:lstStyle/>
           <a:p>
+            <a:pPr algn="l"/>
             <a:r>
-              <a:rPr lang="de-DE"/>
-              <a:t>Leah Röser und Ann-Sofie Witfeld Studentinnen der Technischen Hochschule Köln In zusammenarbeit mit der G DATA Cyber Defense AG </a:t>
+              <a:rPr lang="de-DE" dirty="0"/>
+              <a:t>Leah Röser und Ann-Sofie Witfeld Studentinnen der Technischen Hochschule Köln in Zusammenarbeit mit der G DATA </a:t>
             </a:r>
-            <a:endParaRPr lang="de-DE" dirty="0"/>
+            <a:r>
+              <a:rPr lang="de-DE" dirty="0" err="1"/>
+              <a:t>Cyber</a:t>
+            </a:r>
+            <a:r>
+              <a:rPr lang="de-DE" dirty="0"/>
+              <a:t> Defense AG </a:t>
+            </a:r>
           </a:p>
         </p:txBody>
       </p:sp>
@@ -25626,7 +26181,7 @@
           <a:p>
             <a:fld id="{BA339110-3B6D-47C9-BD11-4F5D57F3A5D0}" type="slidenum">
               <a:rPr lang="de-DE" smtClean="0"/>
-              <a:t>26</a:t>
+              <a:t>27</a:t>
             </a:fld>
             <a:endParaRPr lang="de-DE"/>
           </a:p>
@@ -25645,7 +26200,7 @@
 </p:sld>
 </file>
 
-<file path=ppt/slides/slide27.xml><?xml version="1.0" encoding="utf-8"?>
+<file path=ppt/slides/slide28.xml><?xml version="1.0" encoding="utf-8"?>
 <p:sld xmlns:a="http://schemas.openxmlformats.org/drawingml/2006/main" xmlns:r="http://schemas.openxmlformats.org/officeDocument/2006/relationships" xmlns:p="http://schemas.openxmlformats.org/presentationml/2006/main">
   <p:cSld>
     <p:bg>
@@ -26187,7 +26742,7 @@
                   <a:spcPts val="600"/>
                 </a:spcAft>
               </a:pPr>
-              <a:t>06.12.2021</a:t>
+              <a:t>07.12.2021</a:t>
             </a:fld>
             <a:endParaRPr lang="de-DE"/>
           </a:p>
@@ -26221,7 +26776,7 @@
           </a:bodyPr>
           <a:lstStyle/>
           <a:p>
-            <a:pPr>
+            <a:pPr algn="l">
               <a:lnSpc>
                 <a:spcPct val="90000"/>
               </a:lnSpc>
@@ -26230,8 +26785,16 @@
               </a:spcAft>
             </a:pPr>
             <a:r>
-              <a:rPr lang="de-DE" sz="900"/>
-              <a:t>Leah Röser und Ann-Sofie Witfeld Studentinnen der Technischen Hochschule Köln In zusammenarbeit mit der G DATA Cyber Defense AG </a:t>
+              <a:rPr lang="de-DE" sz="900" dirty="0"/>
+              <a:t>Leah Röser und Ann-Sofie Witfeld Studentinnen der Technischen Hochschule Köln in Zusammenarbeit mit der G DATA </a:t>
+            </a:r>
+            <a:r>
+              <a:rPr lang="de-DE" sz="900" dirty="0" err="1"/>
+              <a:t>Cyber</a:t>
+            </a:r>
+            <a:r>
+              <a:rPr lang="de-DE" sz="900" dirty="0"/>
+              <a:t> Defense AG </a:t>
             </a:r>
           </a:p>
         </p:txBody>
@@ -26276,7 +26839,7 @@
                   <a:spcPts val="600"/>
                 </a:spcAft>
               </a:pPr>
-              <a:t>27</a:t>
+              <a:t>28</a:t>
             </a:fld>
             <a:endParaRPr lang="de-DE"/>
           </a:p>
@@ -26295,7 +26858,7 @@
 </p:sld>
 </file>
 
-<file path=ppt/slides/slide28.xml><?xml version="1.0" encoding="utf-8"?>
+<file path=ppt/slides/slide29.xml><?xml version="1.0" encoding="utf-8"?>
 <p:sld xmlns:a="http://schemas.openxmlformats.org/drawingml/2006/main" xmlns:r="http://schemas.openxmlformats.org/officeDocument/2006/relationships" xmlns:p="http://schemas.openxmlformats.org/presentationml/2006/main">
   <p:cSld>
     <p:spTree>
@@ -26417,7 +26980,7 @@
           <a:p>
             <a:fld id="{9B7C69FD-89D8-4602-9683-CCF5AAAEF0B0}" type="datetime1">
               <a:rPr lang="de-DE" smtClean="0"/>
-              <a:t>06.12.2021</a:t>
+              <a:t>07.12.2021</a:t>
             </a:fld>
             <a:endParaRPr lang="de-DE"/>
           </a:p>
@@ -26439,16 +27002,29 @@
             <p:ph type="ftr" sz="quarter" idx="11"/>
           </p:nvPr>
         </p:nvSpPr>
-        <p:spPr/>
+        <p:spPr>
+          <a:xfrm>
+            <a:off x="3006852" y="6118894"/>
+            <a:ext cx="6178296" cy="615506"/>
+          </a:xfrm>
+        </p:spPr>
         <p:txBody>
           <a:bodyPr/>
           <a:lstStyle/>
           <a:p>
+            <a:pPr algn="l"/>
             <a:r>
-              <a:rPr lang="de-DE"/>
-              <a:t>Leah Röser und Ann-Sofie Witfeld Studentinnen der Technischen Hochschule Köln In zusammenarbeit mit der G DATA Cyber Defense AG </a:t>
+              <a:rPr lang="de-DE" dirty="0"/>
+              <a:t>Leah Röser und Ann-Sofie Witfeld Studentinnen der Technischen Hochschule Köln in Zusammenarbeit mit der G DATA </a:t>
             </a:r>
-            <a:endParaRPr lang="de-DE" dirty="0"/>
+            <a:r>
+              <a:rPr lang="de-DE" dirty="0" err="1"/>
+              <a:t>Cyber</a:t>
+            </a:r>
+            <a:r>
+              <a:rPr lang="de-DE" dirty="0"/>
+              <a:t> Defense AG </a:t>
+            </a:r>
           </a:p>
         </p:txBody>
       </p:sp>
@@ -26475,7 +27051,7 @@
           <a:p>
             <a:fld id="{BA339110-3B6D-47C9-BD11-4F5D57F3A5D0}" type="slidenum">
               <a:rPr lang="de-DE" smtClean="0"/>
-              <a:t>28</a:t>
+              <a:t>29</a:t>
             </a:fld>
             <a:endParaRPr lang="de-DE"/>
           </a:p>
@@ -26556,7 +27132,7 @@
 </p:sld>
 </file>
 
-<file path=ppt/slides/slide29.xml><?xml version="1.0" encoding="utf-8"?>
+<file path=ppt/slides/slide3.xml><?xml version="1.0" encoding="utf-8"?>
 <p:sld xmlns:a="http://schemas.openxmlformats.org/drawingml/2006/main" xmlns:r="http://schemas.openxmlformats.org/officeDocument/2006/relationships" xmlns:p="http://schemas.openxmlformats.org/presentationml/2006/main">
   <p:cSld>
     <p:bg>
@@ -26646,7 +27222,7 @@
           <p:cNvPr id="2" name="Titel 1">
             <a:extLst>
               <a:ext uri="{FF2B5EF4-FFF2-40B4-BE49-F238E27FC236}">
-                <a16:creationId xmlns:a16="http://schemas.microsoft.com/office/drawing/2014/main" id="{E2394AAA-CF58-4105-8166-E0960FCDE873}"/>
+                <a16:creationId xmlns:a16="http://schemas.microsoft.com/office/drawing/2014/main" id="{7FA88C59-C232-4587-9B1C-CACF6E531FE6}"/>
               </a:ext>
             </a:extLst>
           </p:cNvPr>
@@ -26659,7 +27235,7 @@
         </p:nvSpPr>
         <p:spPr>
           <a:xfrm>
-            <a:off x="841248" y="548640"/>
+            <a:off x="838200" y="552091"/>
             <a:ext cx="3600860" cy="5431536"/>
           </a:xfrm>
         </p:spPr>
@@ -26672,7 +27248,7 @@
             <a:pPr algn="ctr"/>
             <a:r>
               <a:rPr lang="de-DE" sz="3200" dirty="0"/>
-              <a:t>Forschungsfrage</a:t>
+              <a:t>Motivation</a:t>
             </a:r>
           </a:p>
         </p:txBody>
@@ -27025,657 +27601,6 @@
           <p:cNvPr id="3" name="Inhaltsplatzhalter 2">
             <a:extLst>
               <a:ext uri="{FF2B5EF4-FFF2-40B4-BE49-F238E27FC236}">
-                <a16:creationId xmlns:a16="http://schemas.microsoft.com/office/drawing/2014/main" id="{7EB93276-DBB2-4062-97CC-D191153F8BD0}"/>
-              </a:ext>
-            </a:extLst>
-          </p:cNvPr>
-          <p:cNvSpPr>
-            <a:spLocks noGrp="1"/>
-          </p:cNvSpPr>
-          <p:nvPr>
-            <p:ph idx="1"/>
-          </p:nvPr>
-        </p:nvSpPr>
-        <p:spPr>
-          <a:xfrm>
-            <a:off x="5126418" y="552091"/>
-            <a:ext cx="6224335" cy="5431536"/>
-          </a:xfrm>
-        </p:spPr>
-        <p:txBody>
-          <a:bodyPr anchor="ctr">
-            <a:normAutofit/>
-          </a:bodyPr>
-          <a:lstStyle/>
-          <a:p>
-            <a:pPr marL="0" indent="0">
-              <a:buNone/>
-            </a:pPr>
-            <a:r>
-              <a:rPr lang="de-DE" sz="1800" dirty="0"/>
-              <a:t>„Wie könnte sich ein neues Design für die G DATA Windows Software, unter der Berücksichtigung von User Experience auf die User auswirken?“</a:t>
-            </a:r>
-            <a:endParaRPr lang="de-DE" sz="2400" dirty="0"/>
-          </a:p>
-        </p:txBody>
-      </p:sp>
-      <p:sp>
-        <p:nvSpPr>
-          <p:cNvPr id="4" name="Datumsplatzhalter 3">
-            <a:extLst>
-              <a:ext uri="{FF2B5EF4-FFF2-40B4-BE49-F238E27FC236}">
-                <a16:creationId xmlns:a16="http://schemas.microsoft.com/office/drawing/2014/main" id="{28FF7BEA-AAAD-4B58-ACC6-632A2CB62A4E}"/>
-              </a:ext>
-            </a:extLst>
-          </p:cNvPr>
-          <p:cNvSpPr>
-            <a:spLocks noGrp="1"/>
-          </p:cNvSpPr>
-          <p:nvPr>
-            <p:ph type="dt" sz="half" idx="10"/>
-          </p:nvPr>
-        </p:nvSpPr>
-        <p:spPr>
-          <a:xfrm>
-            <a:off x="838200" y="6356350"/>
-            <a:ext cx="2743200" cy="365125"/>
-          </a:xfrm>
-        </p:spPr>
-        <p:txBody>
-          <a:bodyPr>
-            <a:normAutofit/>
-          </a:bodyPr>
-          <a:lstStyle/>
-          <a:p>
-            <a:pPr>
-              <a:spcAft>
-                <a:spcPts val="600"/>
-              </a:spcAft>
-            </a:pPr>
-            <a:fld id="{645F39B9-3809-467E-8B5B-945AE22FF124}" type="datetime1">
-              <a:rPr lang="de-DE" smtClean="0"/>
-              <a:pPr>
-                <a:spcAft>
-                  <a:spcPts val="600"/>
-                </a:spcAft>
-              </a:pPr>
-              <a:t>06.12.2021</a:t>
-            </a:fld>
-            <a:endParaRPr lang="de-DE"/>
-          </a:p>
-        </p:txBody>
-      </p:sp>
-      <p:sp>
-        <p:nvSpPr>
-          <p:cNvPr id="5" name="Fußzeilenplatzhalter 4">
-            <a:extLst>
-              <a:ext uri="{FF2B5EF4-FFF2-40B4-BE49-F238E27FC236}">
-                <a16:creationId xmlns:a16="http://schemas.microsoft.com/office/drawing/2014/main" id="{36088364-DCD4-47B6-BE2A-81705D4D0EC9}"/>
-              </a:ext>
-            </a:extLst>
-          </p:cNvPr>
-          <p:cNvSpPr>
-            <a:spLocks noGrp="1"/>
-          </p:cNvSpPr>
-          <p:nvPr>
-            <p:ph type="ftr" sz="quarter" idx="11"/>
-          </p:nvPr>
-        </p:nvSpPr>
-        <p:spPr>
-          <a:xfrm>
-            <a:off x="4038600" y="6356350"/>
-            <a:ext cx="4114800" cy="365125"/>
-          </a:xfrm>
-        </p:spPr>
-        <p:txBody>
-          <a:bodyPr>
-            <a:normAutofit/>
-          </a:bodyPr>
-          <a:lstStyle/>
-          <a:p>
-            <a:pPr>
-              <a:lnSpc>
-                <a:spcPct val="90000"/>
-              </a:lnSpc>
-              <a:spcAft>
-                <a:spcPts val="600"/>
-              </a:spcAft>
-            </a:pPr>
-            <a:r>
-              <a:rPr lang="de-DE" sz="900"/>
-              <a:t>Leah Röser und Ann-Sofie Witfeld Studentinnen der Technischen Hochschule Köln In zusammenarbeit mit der G DATA Cyber Defense AG </a:t>
-            </a:r>
-          </a:p>
-        </p:txBody>
-      </p:sp>
-      <p:sp>
-        <p:nvSpPr>
-          <p:cNvPr id="6" name="Foliennummernplatzhalter 5">
-            <a:extLst>
-              <a:ext uri="{FF2B5EF4-FFF2-40B4-BE49-F238E27FC236}">
-                <a16:creationId xmlns:a16="http://schemas.microsoft.com/office/drawing/2014/main" id="{83BB511F-B9A8-437B-AF29-DDB62E4A9B77}"/>
-              </a:ext>
-            </a:extLst>
-          </p:cNvPr>
-          <p:cNvSpPr>
-            <a:spLocks noGrp="1"/>
-          </p:cNvSpPr>
-          <p:nvPr>
-            <p:ph type="sldNum" sz="quarter" idx="12"/>
-          </p:nvPr>
-        </p:nvSpPr>
-        <p:spPr>
-          <a:xfrm>
-            <a:off x="8610600" y="6356350"/>
-            <a:ext cx="2743200" cy="365125"/>
-          </a:xfrm>
-        </p:spPr>
-        <p:txBody>
-          <a:bodyPr>
-            <a:normAutofit/>
-          </a:bodyPr>
-          <a:lstStyle/>
-          <a:p>
-            <a:pPr>
-              <a:spcAft>
-                <a:spcPts val="600"/>
-              </a:spcAft>
-            </a:pPr>
-            <a:fld id="{BA339110-3B6D-47C9-BD11-4F5D57F3A5D0}" type="slidenum">
-              <a:rPr lang="de-DE" smtClean="0"/>
-              <a:pPr>
-                <a:spcAft>
-                  <a:spcPts val="600"/>
-                </a:spcAft>
-              </a:pPr>
-              <a:t>29</a:t>
-            </a:fld>
-            <a:endParaRPr lang="de-DE"/>
-          </a:p>
-        </p:txBody>
-      </p:sp>
-    </p:spTree>
-    <p:extLst>
-      <p:ext uri="{BB962C8B-B14F-4D97-AF65-F5344CB8AC3E}">
-        <p14:creationId xmlns:p14="http://schemas.microsoft.com/office/powerpoint/2010/main" val="2053000094"/>
-      </p:ext>
-    </p:extLst>
-  </p:cSld>
-  <p:clrMapOvr>
-    <a:masterClrMapping/>
-  </p:clrMapOvr>
-</p:sld>
-</file>
-
-<file path=ppt/slides/slide3.xml><?xml version="1.0" encoding="utf-8"?>
-<p:sld xmlns:a="http://schemas.openxmlformats.org/drawingml/2006/main" xmlns:r="http://schemas.openxmlformats.org/officeDocument/2006/relationships" xmlns:p="http://schemas.openxmlformats.org/presentationml/2006/main">
-  <p:cSld>
-    <p:bg>
-      <p:bgPr>
-        <a:solidFill>
-          <a:schemeClr val="bg1"/>
-        </a:solidFill>
-        <a:effectLst/>
-      </p:bgPr>
-    </p:bg>
-    <p:spTree>
-      <p:nvGrpSpPr>
-        <p:cNvPr id="1" name=""/>
-        <p:cNvGrpSpPr/>
-        <p:nvPr/>
-      </p:nvGrpSpPr>
-      <p:grpSpPr>
-        <a:xfrm>
-          <a:off x="0" y="0"/>
-          <a:ext cx="0" cy="0"/>
-          <a:chOff x="0" y="0"/>
-          <a:chExt cx="0" cy="0"/>
-        </a:xfrm>
-      </p:grpSpPr>
-      <p:sp useBgFill="1">
-        <p:nvSpPr>
-          <p:cNvPr id="11" name="Rectangle 10">
-            <a:extLst>
-              <a:ext uri="{FF2B5EF4-FFF2-40B4-BE49-F238E27FC236}">
-                <a16:creationId xmlns:a16="http://schemas.microsoft.com/office/drawing/2014/main" id="{777A147A-9ED8-46B4-8660-1B3C2AA880B5}"/>
-              </a:ext>
-              <a:ext uri="{C183D7F6-B498-43B3-948B-1728B52AA6E4}">
-                <adec:decorative xmlns:adec="http://schemas.microsoft.com/office/drawing/2017/decorative" val="1"/>
-              </a:ext>
-            </a:extLst>
-          </p:cNvPr>
-          <p:cNvSpPr>
-            <a:spLocks noGrp="1" noRot="1" noChangeAspect="1" noMove="1" noResize="1" noEditPoints="1" noAdjustHandles="1" noChangeArrowheads="1" noChangeShapeType="1" noTextEdit="1"/>
-          </p:cNvSpPr>
-          <p:nvPr>
-            <p:extLst>
-              <p:ext uri="{386F3935-93C4-4BCD-93E2-E3B085C9AB24}">
-                <p16:designElem xmlns:p16="http://schemas.microsoft.com/office/powerpoint/2015/main" val="1"/>
-              </p:ext>
-            </p:extLst>
-          </p:nvPr>
-        </p:nvSpPr>
-        <p:spPr>
-          <a:xfrm>
-            <a:off x="0" y="0"/>
-            <a:ext cx="12188952" cy="6858000"/>
-          </a:xfrm>
-          <a:prstGeom prst="rect">
-            <a:avLst/>
-          </a:prstGeom>
-          <a:ln>
-            <a:noFill/>
-          </a:ln>
-        </p:spPr>
-        <p:style>
-          <a:lnRef idx="2">
-            <a:schemeClr val="accent1">
-              <a:shade val="50000"/>
-            </a:schemeClr>
-          </a:lnRef>
-          <a:fillRef idx="1">
-            <a:schemeClr val="accent1"/>
-          </a:fillRef>
-          <a:effectRef idx="0">
-            <a:schemeClr val="accent1"/>
-          </a:effectRef>
-          <a:fontRef idx="minor">
-            <a:schemeClr val="lt1"/>
-          </a:fontRef>
-        </p:style>
-        <p:txBody>
-          <a:bodyPr rtlCol="0" anchor="ctr"/>
-          <a:lstStyle/>
-          <a:p>
-            <a:pPr algn="ctr"/>
-            <a:endParaRPr lang="en-US"/>
-          </a:p>
-        </p:txBody>
-      </p:sp>
-      <p:sp>
-        <p:nvSpPr>
-          <p:cNvPr id="2" name="Titel 1">
-            <a:extLst>
-              <a:ext uri="{FF2B5EF4-FFF2-40B4-BE49-F238E27FC236}">
-                <a16:creationId xmlns:a16="http://schemas.microsoft.com/office/drawing/2014/main" id="{7FA88C59-C232-4587-9B1C-CACF6E531FE6}"/>
-              </a:ext>
-            </a:extLst>
-          </p:cNvPr>
-          <p:cNvSpPr>
-            <a:spLocks noGrp="1"/>
-          </p:cNvSpPr>
-          <p:nvPr>
-            <p:ph type="title"/>
-          </p:nvPr>
-        </p:nvSpPr>
-        <p:spPr>
-          <a:xfrm>
-            <a:off x="838200" y="552091"/>
-            <a:ext cx="3600860" cy="5431536"/>
-          </a:xfrm>
-        </p:spPr>
-        <p:txBody>
-          <a:bodyPr>
-            <a:normAutofit/>
-          </a:bodyPr>
-          <a:lstStyle/>
-          <a:p>
-            <a:pPr algn="ctr"/>
-            <a:r>
-              <a:rPr lang="de-DE" sz="3200" dirty="0"/>
-              <a:t>Motivation</a:t>
-            </a:r>
-          </a:p>
-        </p:txBody>
-      </p:sp>
-      <p:sp>
-        <p:nvSpPr>
-          <p:cNvPr id="13" name="sketch line">
-            <a:extLst>
-              <a:ext uri="{FF2B5EF4-FFF2-40B4-BE49-F238E27FC236}">
-                <a16:creationId xmlns:a16="http://schemas.microsoft.com/office/drawing/2014/main" id="{5D6C15A0-C087-4593-8414-2B4EC1CDC3DE}"/>
-              </a:ext>
-              <a:ext uri="{C183D7F6-B498-43B3-948B-1728B52AA6E4}">
-                <adec:decorative xmlns:adec="http://schemas.microsoft.com/office/drawing/2017/decorative" val="1"/>
-              </a:ext>
-            </a:extLst>
-          </p:cNvPr>
-          <p:cNvSpPr>
-            <a:spLocks noGrp="1" noRot="1" noChangeAspect="1" noMove="1" noResize="1" noEditPoints="1" noAdjustHandles="1" noChangeArrowheads="1" noChangeShapeType="1" noTextEdit="1"/>
-          </p:cNvSpPr>
-          <p:nvPr>
-            <p:extLst>
-              <p:ext uri="{386F3935-93C4-4BCD-93E2-E3B085C9AB24}">
-                <p16:designElem xmlns:p16="http://schemas.microsoft.com/office/powerpoint/2015/main" val="1"/>
-              </p:ext>
-            </p:extLst>
-          </p:nvPr>
-        </p:nvSpPr>
-        <p:spPr>
-          <a:xfrm rot="5400000">
-            <a:off x="2543983" y="3258715"/>
-            <a:ext cx="4480560" cy="18288"/>
-          </a:xfrm>
-          <a:custGeom>
-            <a:avLst/>
-            <a:gdLst>
-              <a:gd name="connsiteX0" fmla="*/ 0 w 4480560"/>
-              <a:gd name="connsiteY0" fmla="*/ 0 h 18288"/>
-              <a:gd name="connsiteX1" fmla="*/ 595274 w 4480560"/>
-              <a:gd name="connsiteY1" fmla="*/ 0 h 18288"/>
-              <a:gd name="connsiteX2" fmla="*/ 1100938 w 4480560"/>
-              <a:gd name="connsiteY2" fmla="*/ 0 h 18288"/>
-              <a:gd name="connsiteX3" fmla="*/ 1651406 w 4480560"/>
-              <a:gd name="connsiteY3" fmla="*/ 0 h 18288"/>
-              <a:gd name="connsiteX4" fmla="*/ 2336292 w 4480560"/>
-              <a:gd name="connsiteY4" fmla="*/ 0 h 18288"/>
-              <a:gd name="connsiteX5" fmla="*/ 2931566 w 4480560"/>
-              <a:gd name="connsiteY5" fmla="*/ 0 h 18288"/>
-              <a:gd name="connsiteX6" fmla="*/ 3482035 w 4480560"/>
-              <a:gd name="connsiteY6" fmla="*/ 0 h 18288"/>
-              <a:gd name="connsiteX7" fmla="*/ 4480560 w 4480560"/>
-              <a:gd name="connsiteY7" fmla="*/ 0 h 18288"/>
-              <a:gd name="connsiteX8" fmla="*/ 4480560 w 4480560"/>
-              <a:gd name="connsiteY8" fmla="*/ 18288 h 18288"/>
-              <a:gd name="connsiteX9" fmla="*/ 3840480 w 4480560"/>
-              <a:gd name="connsiteY9" fmla="*/ 18288 h 18288"/>
-              <a:gd name="connsiteX10" fmla="*/ 3290011 w 4480560"/>
-              <a:gd name="connsiteY10" fmla="*/ 18288 h 18288"/>
-              <a:gd name="connsiteX11" fmla="*/ 2560320 w 4480560"/>
-              <a:gd name="connsiteY11" fmla="*/ 18288 h 18288"/>
-              <a:gd name="connsiteX12" fmla="*/ 1965046 w 4480560"/>
-              <a:gd name="connsiteY12" fmla="*/ 18288 h 18288"/>
-              <a:gd name="connsiteX13" fmla="*/ 1459382 w 4480560"/>
-              <a:gd name="connsiteY13" fmla="*/ 18288 h 18288"/>
-              <a:gd name="connsiteX14" fmla="*/ 774497 w 4480560"/>
-              <a:gd name="connsiteY14" fmla="*/ 18288 h 18288"/>
-              <a:gd name="connsiteX15" fmla="*/ 0 w 4480560"/>
-              <a:gd name="connsiteY15" fmla="*/ 18288 h 18288"/>
-              <a:gd name="connsiteX16" fmla="*/ 0 w 4480560"/>
-              <a:gd name="connsiteY16" fmla="*/ 0 h 18288"/>
-            </a:gdLst>
-            <a:ahLst/>
-            <a:cxnLst>
-              <a:cxn ang="0">
-                <a:pos x="connsiteX0" y="connsiteY0"/>
-              </a:cxn>
-              <a:cxn ang="0">
-                <a:pos x="connsiteX1" y="connsiteY1"/>
-              </a:cxn>
-              <a:cxn ang="0">
-                <a:pos x="connsiteX2" y="connsiteY2"/>
-              </a:cxn>
-              <a:cxn ang="0">
-                <a:pos x="connsiteX3" y="connsiteY3"/>
-              </a:cxn>
-              <a:cxn ang="0">
-                <a:pos x="connsiteX4" y="connsiteY4"/>
-              </a:cxn>
-              <a:cxn ang="0">
-                <a:pos x="connsiteX5" y="connsiteY5"/>
-              </a:cxn>
-              <a:cxn ang="0">
-                <a:pos x="connsiteX6" y="connsiteY6"/>
-              </a:cxn>
-              <a:cxn ang="0">
-                <a:pos x="connsiteX7" y="connsiteY7"/>
-              </a:cxn>
-              <a:cxn ang="0">
-                <a:pos x="connsiteX8" y="connsiteY8"/>
-              </a:cxn>
-              <a:cxn ang="0">
-                <a:pos x="connsiteX9" y="connsiteY9"/>
-              </a:cxn>
-              <a:cxn ang="0">
-                <a:pos x="connsiteX10" y="connsiteY10"/>
-              </a:cxn>
-              <a:cxn ang="0">
-                <a:pos x="connsiteX11" y="connsiteY11"/>
-              </a:cxn>
-              <a:cxn ang="0">
-                <a:pos x="connsiteX12" y="connsiteY12"/>
-              </a:cxn>
-              <a:cxn ang="0">
-                <a:pos x="connsiteX13" y="connsiteY13"/>
-              </a:cxn>
-              <a:cxn ang="0">
-                <a:pos x="connsiteX14" y="connsiteY14"/>
-              </a:cxn>
-              <a:cxn ang="0">
-                <a:pos x="connsiteX15" y="connsiteY15"/>
-              </a:cxn>
-              <a:cxn ang="0">
-                <a:pos x="connsiteX16" y="connsiteY16"/>
-              </a:cxn>
-            </a:cxnLst>
-            <a:rect l="l" t="t" r="r" b="b"/>
-            <a:pathLst>
-              <a:path w="4480560" h="18288" fill="none" extrusionOk="0">
-                <a:moveTo>
-                  <a:pt x="0" y="0"/>
-                </a:moveTo>
-                <a:cubicBezTo>
-                  <a:pt x="267821" y="8731"/>
-                  <a:pt x="334105" y="2629"/>
-                  <a:pt x="595274" y="0"/>
-                </a:cubicBezTo>
-                <a:cubicBezTo>
-                  <a:pt x="856443" y="-2629"/>
-                  <a:pt x="863808" y="-13353"/>
-                  <a:pt x="1100938" y="0"/>
-                </a:cubicBezTo>
-                <a:cubicBezTo>
-                  <a:pt x="1338068" y="13353"/>
-                  <a:pt x="1431663" y="-25862"/>
-                  <a:pt x="1651406" y="0"/>
-                </a:cubicBezTo>
-                <a:cubicBezTo>
-                  <a:pt x="1871149" y="25862"/>
-                  <a:pt x="2173163" y="23827"/>
-                  <a:pt x="2336292" y="0"/>
-                </a:cubicBezTo>
-                <a:cubicBezTo>
-                  <a:pt x="2499421" y="-23827"/>
-                  <a:pt x="2720589" y="28148"/>
-                  <a:pt x="2931566" y="0"/>
-                </a:cubicBezTo>
-                <a:cubicBezTo>
-                  <a:pt x="3142543" y="-28148"/>
-                  <a:pt x="3323630" y="27022"/>
-                  <a:pt x="3482035" y="0"/>
-                </a:cubicBezTo>
-                <a:cubicBezTo>
-                  <a:pt x="3640440" y="-27022"/>
-                  <a:pt x="4012110" y="-20118"/>
-                  <a:pt x="4480560" y="0"/>
-                </a:cubicBezTo>
-                <a:cubicBezTo>
-                  <a:pt x="4480958" y="7429"/>
-                  <a:pt x="4480540" y="10822"/>
-                  <a:pt x="4480560" y="18288"/>
-                </a:cubicBezTo>
-                <a:cubicBezTo>
-                  <a:pt x="4314132" y="14924"/>
-                  <a:pt x="4028383" y="36632"/>
-                  <a:pt x="3840480" y="18288"/>
-                </a:cubicBezTo>
-                <a:cubicBezTo>
-                  <a:pt x="3652577" y="-56"/>
-                  <a:pt x="3547615" y="2848"/>
-                  <a:pt x="3290011" y="18288"/>
-                </a:cubicBezTo>
-                <a:cubicBezTo>
-                  <a:pt x="3032407" y="33728"/>
-                  <a:pt x="2830268" y="8719"/>
-                  <a:pt x="2560320" y="18288"/>
-                </a:cubicBezTo>
-                <a:cubicBezTo>
-                  <a:pt x="2290372" y="27857"/>
-                  <a:pt x="2147422" y="6728"/>
-                  <a:pt x="1965046" y="18288"/>
-                </a:cubicBezTo>
-                <a:cubicBezTo>
-                  <a:pt x="1782670" y="29848"/>
-                  <a:pt x="1689791" y="40680"/>
-                  <a:pt x="1459382" y="18288"/>
-                </a:cubicBezTo>
-                <a:cubicBezTo>
-                  <a:pt x="1228973" y="-4104"/>
-                  <a:pt x="915486" y="36501"/>
-                  <a:pt x="774497" y="18288"/>
-                </a:cubicBezTo>
-                <a:cubicBezTo>
-                  <a:pt x="633508" y="75"/>
-                  <a:pt x="361442" y="-11107"/>
-                  <a:pt x="0" y="18288"/>
-                </a:cubicBezTo>
-                <a:cubicBezTo>
-                  <a:pt x="-591" y="13205"/>
-                  <a:pt x="-663" y="6329"/>
-                  <a:pt x="0" y="0"/>
-                </a:cubicBezTo>
-                <a:close/>
-              </a:path>
-              <a:path w="4480560" h="18288" stroke="0" extrusionOk="0">
-                <a:moveTo>
-                  <a:pt x="0" y="0"/>
-                </a:moveTo>
-                <a:cubicBezTo>
-                  <a:pt x="285465" y="225"/>
-                  <a:pt x="322691" y="16223"/>
-                  <a:pt x="595274" y="0"/>
-                </a:cubicBezTo>
-                <a:cubicBezTo>
-                  <a:pt x="867857" y="-16223"/>
-                  <a:pt x="989129" y="-11242"/>
-                  <a:pt x="1100938" y="0"/>
-                </a:cubicBezTo>
-                <a:cubicBezTo>
-                  <a:pt x="1212747" y="11242"/>
-                  <a:pt x="1574350" y="-36410"/>
-                  <a:pt x="1830629" y="0"/>
-                </a:cubicBezTo>
-                <a:cubicBezTo>
-                  <a:pt x="2086908" y="36410"/>
-                  <a:pt x="2180922" y="4645"/>
-                  <a:pt x="2425903" y="0"/>
-                </a:cubicBezTo>
-                <a:cubicBezTo>
-                  <a:pt x="2670884" y="-4645"/>
-                  <a:pt x="2782024" y="22929"/>
-                  <a:pt x="3021178" y="0"/>
-                </a:cubicBezTo>
-                <a:cubicBezTo>
-                  <a:pt x="3260332" y="-22929"/>
-                  <a:pt x="3456982" y="-1586"/>
-                  <a:pt x="3750869" y="0"/>
-                </a:cubicBezTo>
-                <a:cubicBezTo>
-                  <a:pt x="4044756" y="1586"/>
-                  <a:pt x="4302726" y="17043"/>
-                  <a:pt x="4480560" y="0"/>
-                </a:cubicBezTo>
-                <a:cubicBezTo>
-                  <a:pt x="4479674" y="5429"/>
-                  <a:pt x="4481381" y="14046"/>
-                  <a:pt x="4480560" y="18288"/>
-                </a:cubicBezTo>
-                <a:cubicBezTo>
-                  <a:pt x="4279652" y="-6850"/>
-                  <a:pt x="4200762" y="41566"/>
-                  <a:pt x="3930091" y="18288"/>
-                </a:cubicBezTo>
-                <a:cubicBezTo>
-                  <a:pt x="3659420" y="-4990"/>
-                  <a:pt x="3456052" y="22294"/>
-                  <a:pt x="3290011" y="18288"/>
-                </a:cubicBezTo>
-                <a:cubicBezTo>
-                  <a:pt x="3123970" y="14282"/>
-                  <a:pt x="2882392" y="32818"/>
-                  <a:pt x="2649931" y="18288"/>
-                </a:cubicBezTo>
-                <a:cubicBezTo>
-                  <a:pt x="2417470" y="3758"/>
-                  <a:pt x="2238426" y="7337"/>
-                  <a:pt x="2054657" y="18288"/>
-                </a:cubicBezTo>
-                <a:cubicBezTo>
-                  <a:pt x="1870888" y="29239"/>
-                  <a:pt x="1566368" y="45040"/>
-                  <a:pt x="1324966" y="18288"/>
-                </a:cubicBezTo>
-                <a:cubicBezTo>
-                  <a:pt x="1083564" y="-8464"/>
-                  <a:pt x="787410" y="10946"/>
-                  <a:pt x="595274" y="18288"/>
-                </a:cubicBezTo>
-                <a:cubicBezTo>
-                  <a:pt x="403138" y="25630"/>
-                  <a:pt x="169622" y="10499"/>
-                  <a:pt x="0" y="18288"/>
-                </a:cubicBezTo>
-                <a:cubicBezTo>
-                  <a:pt x="668" y="13665"/>
-                  <a:pt x="578" y="5675"/>
-                  <a:pt x="0" y="0"/>
-                </a:cubicBezTo>
-                <a:close/>
-              </a:path>
-            </a:pathLst>
-          </a:custGeom>
-          <a:solidFill>
-            <a:schemeClr val="accent2"/>
-          </a:solidFill>
-          <a:ln w="41275" cap="rnd">
-            <a:solidFill>
-              <a:schemeClr val="accent2"/>
-            </a:solidFill>
-            <a:round/>
-            <a:extLst>
-              <a:ext uri="{C807C97D-BFC1-408E-A445-0C87EB9F89A2}">
-                <ask:lineSketchStyleProps xmlns:ask="http://schemas.microsoft.com/office/drawing/2018/sketchyshapes" sd="1219033472">
-                  <a:prstGeom prst="rect">
-                    <a:avLst/>
-                  </a:prstGeom>
-                  <ask:type>
-                    <ask:lineSketchFreehand/>
-                  </ask:type>
-                </ask:lineSketchStyleProps>
-              </a:ext>
-            </a:extLst>
-          </a:ln>
-        </p:spPr>
-        <p:style>
-          <a:lnRef idx="2">
-            <a:schemeClr val="accent1">
-              <a:shade val="50000"/>
-            </a:schemeClr>
-          </a:lnRef>
-          <a:fillRef idx="1">
-            <a:schemeClr val="accent1"/>
-          </a:fillRef>
-          <a:effectRef idx="0">
-            <a:schemeClr val="accent1"/>
-          </a:effectRef>
-          <a:fontRef idx="minor">
-            <a:schemeClr val="lt1"/>
-          </a:fontRef>
-        </p:style>
-        <p:txBody>
-          <a:bodyPr rtlCol="0" anchor="ctr"/>
-          <a:lstStyle/>
-          <a:p>
-            <a:pPr algn="ctr"/>
-            <a:endParaRPr lang="en-US"/>
-          </a:p>
-        </p:txBody>
-      </p:sp>
-      <p:sp>
-        <p:nvSpPr>
-          <p:cNvPr id="3" name="Inhaltsplatzhalter 2">
-            <a:extLst>
-              <a:ext uri="{FF2B5EF4-FFF2-40B4-BE49-F238E27FC236}">
                 <a16:creationId xmlns:a16="http://schemas.microsoft.com/office/drawing/2014/main" id="{AE74BC54-2090-4C83-A85E-D64F60768AEA}"/>
               </a:ext>
             </a:extLst>
@@ -27764,7 +27689,7 @@
                   <a:spcPts val="600"/>
                 </a:spcAft>
               </a:pPr>
-              <a:t>06.12.2021</a:t>
+              <a:t>07.12.2021</a:t>
             </a:fld>
             <a:endParaRPr lang="de-DE"/>
           </a:p>
@@ -27798,7 +27723,7 @@
           </a:bodyPr>
           <a:lstStyle/>
           <a:p>
-            <a:pPr>
+            <a:pPr algn="l">
               <a:lnSpc>
                 <a:spcPct val="90000"/>
               </a:lnSpc>
@@ -27807,8 +27732,16 @@
               </a:spcAft>
             </a:pPr>
             <a:r>
-              <a:rPr lang="de-DE" sz="900"/>
-              <a:t>Leah Röser und Ann-Sofie Witfeld Studentinnen der Technischen Hochschule Köln In zusammenarbeit mit der G DATA Cyber Defense AG </a:t>
+              <a:rPr lang="de-DE" sz="900" dirty="0"/>
+              <a:t>Leah Röser und Ann-Sofie Witfeld Studentinnen der Technischen Hochschule Köln in Zusammenarbeit mit der G DATA </a:t>
+            </a:r>
+            <a:r>
+              <a:rPr lang="de-DE" sz="900" dirty="0" err="1"/>
+              <a:t>Cyber</a:t>
+            </a:r>
+            <a:r>
+              <a:rPr lang="de-DE" sz="900" dirty="0"/>
+              <a:t> Defense AG </a:t>
             </a:r>
           </a:p>
         </p:txBody>
@@ -27962,7 +27895,7 @@
           <p:cNvPr id="2" name="Titel 1">
             <a:extLst>
               <a:ext uri="{FF2B5EF4-FFF2-40B4-BE49-F238E27FC236}">
-                <a16:creationId xmlns:a16="http://schemas.microsoft.com/office/drawing/2014/main" id="{777CBBE2-CE48-4220-ACA0-665A1267D3FB}"/>
+                <a16:creationId xmlns:a16="http://schemas.microsoft.com/office/drawing/2014/main" id="{E2394AAA-CF58-4105-8166-E0960FCDE873}"/>
               </a:ext>
             </a:extLst>
           </p:cNvPr>
@@ -27988,7 +27921,7 @@
             <a:pPr algn="ctr"/>
             <a:r>
               <a:rPr lang="de-DE" sz="3200" dirty="0"/>
-              <a:t>Weitere Themenfelder</a:t>
+              <a:t>Forschungsfrage</a:t>
             </a:r>
           </a:p>
         </p:txBody>
@@ -28341,6 +28274,665 @@
           <p:cNvPr id="3" name="Inhaltsplatzhalter 2">
             <a:extLst>
               <a:ext uri="{FF2B5EF4-FFF2-40B4-BE49-F238E27FC236}">
+                <a16:creationId xmlns:a16="http://schemas.microsoft.com/office/drawing/2014/main" id="{7EB93276-DBB2-4062-97CC-D191153F8BD0}"/>
+              </a:ext>
+            </a:extLst>
+          </p:cNvPr>
+          <p:cNvSpPr>
+            <a:spLocks noGrp="1"/>
+          </p:cNvSpPr>
+          <p:nvPr>
+            <p:ph idx="1"/>
+          </p:nvPr>
+        </p:nvSpPr>
+        <p:spPr>
+          <a:xfrm>
+            <a:off x="5126418" y="552091"/>
+            <a:ext cx="6224335" cy="5431536"/>
+          </a:xfrm>
+        </p:spPr>
+        <p:txBody>
+          <a:bodyPr anchor="ctr">
+            <a:normAutofit/>
+          </a:bodyPr>
+          <a:lstStyle/>
+          <a:p>
+            <a:pPr marL="0" indent="0">
+              <a:buNone/>
+            </a:pPr>
+            <a:r>
+              <a:rPr lang="de-DE" sz="1800" dirty="0"/>
+              <a:t>„Wie könnte sich ein neues Design für die G DATA Windows Software, unter der Berücksichtigung von User Experience auf die User auswirken?“</a:t>
+            </a:r>
+            <a:endParaRPr lang="de-DE" sz="2400" dirty="0"/>
+          </a:p>
+        </p:txBody>
+      </p:sp>
+      <p:sp>
+        <p:nvSpPr>
+          <p:cNvPr id="4" name="Datumsplatzhalter 3">
+            <a:extLst>
+              <a:ext uri="{FF2B5EF4-FFF2-40B4-BE49-F238E27FC236}">
+                <a16:creationId xmlns:a16="http://schemas.microsoft.com/office/drawing/2014/main" id="{28FF7BEA-AAAD-4B58-ACC6-632A2CB62A4E}"/>
+              </a:ext>
+            </a:extLst>
+          </p:cNvPr>
+          <p:cNvSpPr>
+            <a:spLocks noGrp="1"/>
+          </p:cNvSpPr>
+          <p:nvPr>
+            <p:ph type="dt" sz="half" idx="10"/>
+          </p:nvPr>
+        </p:nvSpPr>
+        <p:spPr>
+          <a:xfrm>
+            <a:off x="838200" y="6356350"/>
+            <a:ext cx="2743200" cy="365125"/>
+          </a:xfrm>
+        </p:spPr>
+        <p:txBody>
+          <a:bodyPr>
+            <a:normAutofit/>
+          </a:bodyPr>
+          <a:lstStyle/>
+          <a:p>
+            <a:pPr>
+              <a:spcAft>
+                <a:spcPts val="600"/>
+              </a:spcAft>
+            </a:pPr>
+            <a:fld id="{645F39B9-3809-467E-8B5B-945AE22FF124}" type="datetime1">
+              <a:rPr lang="de-DE" smtClean="0"/>
+              <a:pPr>
+                <a:spcAft>
+                  <a:spcPts val="600"/>
+                </a:spcAft>
+              </a:pPr>
+              <a:t>07.12.2021</a:t>
+            </a:fld>
+            <a:endParaRPr lang="de-DE"/>
+          </a:p>
+        </p:txBody>
+      </p:sp>
+      <p:sp>
+        <p:nvSpPr>
+          <p:cNvPr id="5" name="Fußzeilenplatzhalter 4">
+            <a:extLst>
+              <a:ext uri="{FF2B5EF4-FFF2-40B4-BE49-F238E27FC236}">
+                <a16:creationId xmlns:a16="http://schemas.microsoft.com/office/drawing/2014/main" id="{36088364-DCD4-47B6-BE2A-81705D4D0EC9}"/>
+              </a:ext>
+            </a:extLst>
+          </p:cNvPr>
+          <p:cNvSpPr>
+            <a:spLocks noGrp="1"/>
+          </p:cNvSpPr>
+          <p:nvPr>
+            <p:ph type="ftr" sz="quarter" idx="11"/>
+          </p:nvPr>
+        </p:nvSpPr>
+        <p:spPr>
+          <a:xfrm>
+            <a:off x="4038600" y="6356350"/>
+            <a:ext cx="4114800" cy="365125"/>
+          </a:xfrm>
+        </p:spPr>
+        <p:txBody>
+          <a:bodyPr>
+            <a:normAutofit/>
+          </a:bodyPr>
+          <a:lstStyle/>
+          <a:p>
+            <a:pPr algn="l">
+              <a:lnSpc>
+                <a:spcPct val="90000"/>
+              </a:lnSpc>
+              <a:spcAft>
+                <a:spcPts val="600"/>
+              </a:spcAft>
+            </a:pPr>
+            <a:r>
+              <a:rPr lang="de-DE" sz="900" dirty="0"/>
+              <a:t>Leah Röser und Ann-Sofie Witfeld Studentinnen der Technischen Hochschule Köln in Zusammenarbeit mit der G DATA </a:t>
+            </a:r>
+            <a:r>
+              <a:rPr lang="de-DE" sz="900" dirty="0" err="1"/>
+              <a:t>Cyber</a:t>
+            </a:r>
+            <a:r>
+              <a:rPr lang="de-DE" sz="900" dirty="0"/>
+              <a:t> Defense AG </a:t>
+            </a:r>
+          </a:p>
+        </p:txBody>
+      </p:sp>
+      <p:sp>
+        <p:nvSpPr>
+          <p:cNvPr id="6" name="Foliennummernplatzhalter 5">
+            <a:extLst>
+              <a:ext uri="{FF2B5EF4-FFF2-40B4-BE49-F238E27FC236}">
+                <a16:creationId xmlns:a16="http://schemas.microsoft.com/office/drawing/2014/main" id="{83BB511F-B9A8-437B-AF29-DDB62E4A9B77}"/>
+              </a:ext>
+            </a:extLst>
+          </p:cNvPr>
+          <p:cNvSpPr>
+            <a:spLocks noGrp="1"/>
+          </p:cNvSpPr>
+          <p:nvPr>
+            <p:ph type="sldNum" sz="quarter" idx="12"/>
+          </p:nvPr>
+        </p:nvSpPr>
+        <p:spPr>
+          <a:xfrm>
+            <a:off x="8610600" y="6356350"/>
+            <a:ext cx="2743200" cy="365125"/>
+          </a:xfrm>
+        </p:spPr>
+        <p:txBody>
+          <a:bodyPr>
+            <a:normAutofit/>
+          </a:bodyPr>
+          <a:lstStyle/>
+          <a:p>
+            <a:pPr>
+              <a:spcAft>
+                <a:spcPts val="600"/>
+              </a:spcAft>
+            </a:pPr>
+            <a:fld id="{BA339110-3B6D-47C9-BD11-4F5D57F3A5D0}" type="slidenum">
+              <a:rPr lang="de-DE" smtClean="0"/>
+              <a:pPr>
+                <a:spcAft>
+                  <a:spcPts val="600"/>
+                </a:spcAft>
+              </a:pPr>
+              <a:t>30</a:t>
+            </a:fld>
+            <a:endParaRPr lang="de-DE"/>
+          </a:p>
+        </p:txBody>
+      </p:sp>
+    </p:spTree>
+    <p:extLst>
+      <p:ext uri="{BB962C8B-B14F-4D97-AF65-F5344CB8AC3E}">
+        <p14:creationId xmlns:p14="http://schemas.microsoft.com/office/powerpoint/2010/main" val="2053000094"/>
+      </p:ext>
+    </p:extLst>
+  </p:cSld>
+  <p:clrMapOvr>
+    <a:masterClrMapping/>
+  </p:clrMapOvr>
+</p:sld>
+</file>
+
+<file path=ppt/slides/slide31.xml><?xml version="1.0" encoding="utf-8"?>
+<p:sld xmlns:a="http://schemas.openxmlformats.org/drawingml/2006/main" xmlns:r="http://schemas.openxmlformats.org/officeDocument/2006/relationships" xmlns:p="http://schemas.openxmlformats.org/presentationml/2006/main">
+  <p:cSld>
+    <p:bg>
+      <p:bgPr>
+        <a:solidFill>
+          <a:schemeClr val="bg1"/>
+        </a:solidFill>
+        <a:effectLst/>
+      </p:bgPr>
+    </p:bg>
+    <p:spTree>
+      <p:nvGrpSpPr>
+        <p:cNvPr id="1" name=""/>
+        <p:cNvGrpSpPr/>
+        <p:nvPr/>
+      </p:nvGrpSpPr>
+      <p:grpSpPr>
+        <a:xfrm>
+          <a:off x="0" y="0"/>
+          <a:ext cx="0" cy="0"/>
+          <a:chOff x="0" y="0"/>
+          <a:chExt cx="0" cy="0"/>
+        </a:xfrm>
+      </p:grpSpPr>
+      <p:sp useBgFill="1">
+        <p:nvSpPr>
+          <p:cNvPr id="11" name="Rectangle 10">
+            <a:extLst>
+              <a:ext uri="{FF2B5EF4-FFF2-40B4-BE49-F238E27FC236}">
+                <a16:creationId xmlns:a16="http://schemas.microsoft.com/office/drawing/2014/main" id="{777A147A-9ED8-46B4-8660-1B3C2AA880B5}"/>
+              </a:ext>
+              <a:ext uri="{C183D7F6-B498-43B3-948B-1728B52AA6E4}">
+                <adec:decorative xmlns:adec="http://schemas.microsoft.com/office/drawing/2017/decorative" val="1"/>
+              </a:ext>
+            </a:extLst>
+          </p:cNvPr>
+          <p:cNvSpPr>
+            <a:spLocks noGrp="1" noRot="1" noChangeAspect="1" noMove="1" noResize="1" noEditPoints="1" noAdjustHandles="1" noChangeArrowheads="1" noChangeShapeType="1" noTextEdit="1"/>
+          </p:cNvSpPr>
+          <p:nvPr>
+            <p:extLst>
+              <p:ext uri="{386F3935-93C4-4BCD-93E2-E3B085C9AB24}">
+                <p16:designElem xmlns:p16="http://schemas.microsoft.com/office/powerpoint/2015/main" val="1"/>
+              </p:ext>
+            </p:extLst>
+          </p:nvPr>
+        </p:nvSpPr>
+        <p:spPr>
+          <a:xfrm>
+            <a:off x="0" y="0"/>
+            <a:ext cx="12188952" cy="6858000"/>
+          </a:xfrm>
+          <a:prstGeom prst="rect">
+            <a:avLst/>
+          </a:prstGeom>
+          <a:ln>
+            <a:noFill/>
+          </a:ln>
+        </p:spPr>
+        <p:style>
+          <a:lnRef idx="2">
+            <a:schemeClr val="accent1">
+              <a:shade val="50000"/>
+            </a:schemeClr>
+          </a:lnRef>
+          <a:fillRef idx="1">
+            <a:schemeClr val="accent1"/>
+          </a:fillRef>
+          <a:effectRef idx="0">
+            <a:schemeClr val="accent1"/>
+          </a:effectRef>
+          <a:fontRef idx="minor">
+            <a:schemeClr val="lt1"/>
+          </a:fontRef>
+        </p:style>
+        <p:txBody>
+          <a:bodyPr rtlCol="0" anchor="ctr"/>
+          <a:lstStyle/>
+          <a:p>
+            <a:pPr algn="ctr"/>
+            <a:endParaRPr lang="en-US"/>
+          </a:p>
+        </p:txBody>
+      </p:sp>
+      <p:sp>
+        <p:nvSpPr>
+          <p:cNvPr id="2" name="Titel 1">
+            <a:extLst>
+              <a:ext uri="{FF2B5EF4-FFF2-40B4-BE49-F238E27FC236}">
+                <a16:creationId xmlns:a16="http://schemas.microsoft.com/office/drawing/2014/main" id="{777CBBE2-CE48-4220-ACA0-665A1267D3FB}"/>
+              </a:ext>
+            </a:extLst>
+          </p:cNvPr>
+          <p:cNvSpPr>
+            <a:spLocks noGrp="1"/>
+          </p:cNvSpPr>
+          <p:nvPr>
+            <p:ph type="title"/>
+          </p:nvPr>
+        </p:nvSpPr>
+        <p:spPr>
+          <a:xfrm>
+            <a:off x="841248" y="548640"/>
+            <a:ext cx="3600860" cy="5431536"/>
+          </a:xfrm>
+        </p:spPr>
+        <p:txBody>
+          <a:bodyPr>
+            <a:normAutofit/>
+          </a:bodyPr>
+          <a:lstStyle/>
+          <a:p>
+            <a:pPr algn="ctr"/>
+            <a:r>
+              <a:rPr lang="de-DE" sz="3200" dirty="0"/>
+              <a:t>Weitere Themenfelder</a:t>
+            </a:r>
+          </a:p>
+        </p:txBody>
+      </p:sp>
+      <p:sp>
+        <p:nvSpPr>
+          <p:cNvPr id="13" name="sketch line">
+            <a:extLst>
+              <a:ext uri="{FF2B5EF4-FFF2-40B4-BE49-F238E27FC236}">
+                <a16:creationId xmlns:a16="http://schemas.microsoft.com/office/drawing/2014/main" id="{5D6C15A0-C087-4593-8414-2B4EC1CDC3DE}"/>
+              </a:ext>
+              <a:ext uri="{C183D7F6-B498-43B3-948B-1728B52AA6E4}">
+                <adec:decorative xmlns:adec="http://schemas.microsoft.com/office/drawing/2017/decorative" val="1"/>
+              </a:ext>
+            </a:extLst>
+          </p:cNvPr>
+          <p:cNvSpPr>
+            <a:spLocks noGrp="1" noRot="1" noChangeAspect="1" noMove="1" noResize="1" noEditPoints="1" noAdjustHandles="1" noChangeArrowheads="1" noChangeShapeType="1" noTextEdit="1"/>
+          </p:cNvSpPr>
+          <p:nvPr>
+            <p:extLst>
+              <p:ext uri="{386F3935-93C4-4BCD-93E2-E3B085C9AB24}">
+                <p16:designElem xmlns:p16="http://schemas.microsoft.com/office/powerpoint/2015/main" val="1"/>
+              </p:ext>
+            </p:extLst>
+          </p:nvPr>
+        </p:nvSpPr>
+        <p:spPr>
+          <a:xfrm rot="5400000">
+            <a:off x="2543983" y="3258715"/>
+            <a:ext cx="4480560" cy="18288"/>
+          </a:xfrm>
+          <a:custGeom>
+            <a:avLst/>
+            <a:gdLst>
+              <a:gd name="connsiteX0" fmla="*/ 0 w 4480560"/>
+              <a:gd name="connsiteY0" fmla="*/ 0 h 18288"/>
+              <a:gd name="connsiteX1" fmla="*/ 595274 w 4480560"/>
+              <a:gd name="connsiteY1" fmla="*/ 0 h 18288"/>
+              <a:gd name="connsiteX2" fmla="*/ 1100938 w 4480560"/>
+              <a:gd name="connsiteY2" fmla="*/ 0 h 18288"/>
+              <a:gd name="connsiteX3" fmla="*/ 1651406 w 4480560"/>
+              <a:gd name="connsiteY3" fmla="*/ 0 h 18288"/>
+              <a:gd name="connsiteX4" fmla="*/ 2336292 w 4480560"/>
+              <a:gd name="connsiteY4" fmla="*/ 0 h 18288"/>
+              <a:gd name="connsiteX5" fmla="*/ 2931566 w 4480560"/>
+              <a:gd name="connsiteY5" fmla="*/ 0 h 18288"/>
+              <a:gd name="connsiteX6" fmla="*/ 3482035 w 4480560"/>
+              <a:gd name="connsiteY6" fmla="*/ 0 h 18288"/>
+              <a:gd name="connsiteX7" fmla="*/ 4480560 w 4480560"/>
+              <a:gd name="connsiteY7" fmla="*/ 0 h 18288"/>
+              <a:gd name="connsiteX8" fmla="*/ 4480560 w 4480560"/>
+              <a:gd name="connsiteY8" fmla="*/ 18288 h 18288"/>
+              <a:gd name="connsiteX9" fmla="*/ 3840480 w 4480560"/>
+              <a:gd name="connsiteY9" fmla="*/ 18288 h 18288"/>
+              <a:gd name="connsiteX10" fmla="*/ 3290011 w 4480560"/>
+              <a:gd name="connsiteY10" fmla="*/ 18288 h 18288"/>
+              <a:gd name="connsiteX11" fmla="*/ 2560320 w 4480560"/>
+              <a:gd name="connsiteY11" fmla="*/ 18288 h 18288"/>
+              <a:gd name="connsiteX12" fmla="*/ 1965046 w 4480560"/>
+              <a:gd name="connsiteY12" fmla="*/ 18288 h 18288"/>
+              <a:gd name="connsiteX13" fmla="*/ 1459382 w 4480560"/>
+              <a:gd name="connsiteY13" fmla="*/ 18288 h 18288"/>
+              <a:gd name="connsiteX14" fmla="*/ 774497 w 4480560"/>
+              <a:gd name="connsiteY14" fmla="*/ 18288 h 18288"/>
+              <a:gd name="connsiteX15" fmla="*/ 0 w 4480560"/>
+              <a:gd name="connsiteY15" fmla="*/ 18288 h 18288"/>
+              <a:gd name="connsiteX16" fmla="*/ 0 w 4480560"/>
+              <a:gd name="connsiteY16" fmla="*/ 0 h 18288"/>
+            </a:gdLst>
+            <a:ahLst/>
+            <a:cxnLst>
+              <a:cxn ang="0">
+                <a:pos x="connsiteX0" y="connsiteY0"/>
+              </a:cxn>
+              <a:cxn ang="0">
+                <a:pos x="connsiteX1" y="connsiteY1"/>
+              </a:cxn>
+              <a:cxn ang="0">
+                <a:pos x="connsiteX2" y="connsiteY2"/>
+              </a:cxn>
+              <a:cxn ang="0">
+                <a:pos x="connsiteX3" y="connsiteY3"/>
+              </a:cxn>
+              <a:cxn ang="0">
+                <a:pos x="connsiteX4" y="connsiteY4"/>
+              </a:cxn>
+              <a:cxn ang="0">
+                <a:pos x="connsiteX5" y="connsiteY5"/>
+              </a:cxn>
+              <a:cxn ang="0">
+                <a:pos x="connsiteX6" y="connsiteY6"/>
+              </a:cxn>
+              <a:cxn ang="0">
+                <a:pos x="connsiteX7" y="connsiteY7"/>
+              </a:cxn>
+              <a:cxn ang="0">
+                <a:pos x="connsiteX8" y="connsiteY8"/>
+              </a:cxn>
+              <a:cxn ang="0">
+                <a:pos x="connsiteX9" y="connsiteY9"/>
+              </a:cxn>
+              <a:cxn ang="0">
+                <a:pos x="connsiteX10" y="connsiteY10"/>
+              </a:cxn>
+              <a:cxn ang="0">
+                <a:pos x="connsiteX11" y="connsiteY11"/>
+              </a:cxn>
+              <a:cxn ang="0">
+                <a:pos x="connsiteX12" y="connsiteY12"/>
+              </a:cxn>
+              <a:cxn ang="0">
+                <a:pos x="connsiteX13" y="connsiteY13"/>
+              </a:cxn>
+              <a:cxn ang="0">
+                <a:pos x="connsiteX14" y="connsiteY14"/>
+              </a:cxn>
+              <a:cxn ang="0">
+                <a:pos x="connsiteX15" y="connsiteY15"/>
+              </a:cxn>
+              <a:cxn ang="0">
+                <a:pos x="connsiteX16" y="connsiteY16"/>
+              </a:cxn>
+            </a:cxnLst>
+            <a:rect l="l" t="t" r="r" b="b"/>
+            <a:pathLst>
+              <a:path w="4480560" h="18288" fill="none" extrusionOk="0">
+                <a:moveTo>
+                  <a:pt x="0" y="0"/>
+                </a:moveTo>
+                <a:cubicBezTo>
+                  <a:pt x="267821" y="8731"/>
+                  <a:pt x="334105" y="2629"/>
+                  <a:pt x="595274" y="0"/>
+                </a:cubicBezTo>
+                <a:cubicBezTo>
+                  <a:pt x="856443" y="-2629"/>
+                  <a:pt x="863808" y="-13353"/>
+                  <a:pt x="1100938" y="0"/>
+                </a:cubicBezTo>
+                <a:cubicBezTo>
+                  <a:pt x="1338068" y="13353"/>
+                  <a:pt x="1431663" y="-25862"/>
+                  <a:pt x="1651406" y="0"/>
+                </a:cubicBezTo>
+                <a:cubicBezTo>
+                  <a:pt x="1871149" y="25862"/>
+                  <a:pt x="2173163" y="23827"/>
+                  <a:pt x="2336292" y="0"/>
+                </a:cubicBezTo>
+                <a:cubicBezTo>
+                  <a:pt x="2499421" y="-23827"/>
+                  <a:pt x="2720589" y="28148"/>
+                  <a:pt x="2931566" y="0"/>
+                </a:cubicBezTo>
+                <a:cubicBezTo>
+                  <a:pt x="3142543" y="-28148"/>
+                  <a:pt x="3323630" y="27022"/>
+                  <a:pt x="3482035" y="0"/>
+                </a:cubicBezTo>
+                <a:cubicBezTo>
+                  <a:pt x="3640440" y="-27022"/>
+                  <a:pt x="4012110" y="-20118"/>
+                  <a:pt x="4480560" y="0"/>
+                </a:cubicBezTo>
+                <a:cubicBezTo>
+                  <a:pt x="4480958" y="7429"/>
+                  <a:pt x="4480540" y="10822"/>
+                  <a:pt x="4480560" y="18288"/>
+                </a:cubicBezTo>
+                <a:cubicBezTo>
+                  <a:pt x="4314132" y="14924"/>
+                  <a:pt x="4028383" y="36632"/>
+                  <a:pt x="3840480" y="18288"/>
+                </a:cubicBezTo>
+                <a:cubicBezTo>
+                  <a:pt x="3652577" y="-56"/>
+                  <a:pt x="3547615" y="2848"/>
+                  <a:pt x="3290011" y="18288"/>
+                </a:cubicBezTo>
+                <a:cubicBezTo>
+                  <a:pt x="3032407" y="33728"/>
+                  <a:pt x="2830268" y="8719"/>
+                  <a:pt x="2560320" y="18288"/>
+                </a:cubicBezTo>
+                <a:cubicBezTo>
+                  <a:pt x="2290372" y="27857"/>
+                  <a:pt x="2147422" y="6728"/>
+                  <a:pt x="1965046" y="18288"/>
+                </a:cubicBezTo>
+                <a:cubicBezTo>
+                  <a:pt x="1782670" y="29848"/>
+                  <a:pt x="1689791" y="40680"/>
+                  <a:pt x="1459382" y="18288"/>
+                </a:cubicBezTo>
+                <a:cubicBezTo>
+                  <a:pt x="1228973" y="-4104"/>
+                  <a:pt x="915486" y="36501"/>
+                  <a:pt x="774497" y="18288"/>
+                </a:cubicBezTo>
+                <a:cubicBezTo>
+                  <a:pt x="633508" y="75"/>
+                  <a:pt x="361442" y="-11107"/>
+                  <a:pt x="0" y="18288"/>
+                </a:cubicBezTo>
+                <a:cubicBezTo>
+                  <a:pt x="-591" y="13205"/>
+                  <a:pt x="-663" y="6329"/>
+                  <a:pt x="0" y="0"/>
+                </a:cubicBezTo>
+                <a:close/>
+              </a:path>
+              <a:path w="4480560" h="18288" stroke="0" extrusionOk="0">
+                <a:moveTo>
+                  <a:pt x="0" y="0"/>
+                </a:moveTo>
+                <a:cubicBezTo>
+                  <a:pt x="285465" y="225"/>
+                  <a:pt x="322691" y="16223"/>
+                  <a:pt x="595274" y="0"/>
+                </a:cubicBezTo>
+                <a:cubicBezTo>
+                  <a:pt x="867857" y="-16223"/>
+                  <a:pt x="989129" y="-11242"/>
+                  <a:pt x="1100938" y="0"/>
+                </a:cubicBezTo>
+                <a:cubicBezTo>
+                  <a:pt x="1212747" y="11242"/>
+                  <a:pt x="1574350" y="-36410"/>
+                  <a:pt x="1830629" y="0"/>
+                </a:cubicBezTo>
+                <a:cubicBezTo>
+                  <a:pt x="2086908" y="36410"/>
+                  <a:pt x="2180922" y="4645"/>
+                  <a:pt x="2425903" y="0"/>
+                </a:cubicBezTo>
+                <a:cubicBezTo>
+                  <a:pt x="2670884" y="-4645"/>
+                  <a:pt x="2782024" y="22929"/>
+                  <a:pt x="3021178" y="0"/>
+                </a:cubicBezTo>
+                <a:cubicBezTo>
+                  <a:pt x="3260332" y="-22929"/>
+                  <a:pt x="3456982" y="-1586"/>
+                  <a:pt x="3750869" y="0"/>
+                </a:cubicBezTo>
+                <a:cubicBezTo>
+                  <a:pt x="4044756" y="1586"/>
+                  <a:pt x="4302726" y="17043"/>
+                  <a:pt x="4480560" y="0"/>
+                </a:cubicBezTo>
+                <a:cubicBezTo>
+                  <a:pt x="4479674" y="5429"/>
+                  <a:pt x="4481381" y="14046"/>
+                  <a:pt x="4480560" y="18288"/>
+                </a:cubicBezTo>
+                <a:cubicBezTo>
+                  <a:pt x="4279652" y="-6850"/>
+                  <a:pt x="4200762" y="41566"/>
+                  <a:pt x="3930091" y="18288"/>
+                </a:cubicBezTo>
+                <a:cubicBezTo>
+                  <a:pt x="3659420" y="-4990"/>
+                  <a:pt x="3456052" y="22294"/>
+                  <a:pt x="3290011" y="18288"/>
+                </a:cubicBezTo>
+                <a:cubicBezTo>
+                  <a:pt x="3123970" y="14282"/>
+                  <a:pt x="2882392" y="32818"/>
+                  <a:pt x="2649931" y="18288"/>
+                </a:cubicBezTo>
+                <a:cubicBezTo>
+                  <a:pt x="2417470" y="3758"/>
+                  <a:pt x="2238426" y="7337"/>
+                  <a:pt x="2054657" y="18288"/>
+                </a:cubicBezTo>
+                <a:cubicBezTo>
+                  <a:pt x="1870888" y="29239"/>
+                  <a:pt x="1566368" y="45040"/>
+                  <a:pt x="1324966" y="18288"/>
+                </a:cubicBezTo>
+                <a:cubicBezTo>
+                  <a:pt x="1083564" y="-8464"/>
+                  <a:pt x="787410" y="10946"/>
+                  <a:pt x="595274" y="18288"/>
+                </a:cubicBezTo>
+                <a:cubicBezTo>
+                  <a:pt x="403138" y="25630"/>
+                  <a:pt x="169622" y="10499"/>
+                  <a:pt x="0" y="18288"/>
+                </a:cubicBezTo>
+                <a:cubicBezTo>
+                  <a:pt x="668" y="13665"/>
+                  <a:pt x="578" y="5675"/>
+                  <a:pt x="0" y="0"/>
+                </a:cubicBezTo>
+                <a:close/>
+              </a:path>
+            </a:pathLst>
+          </a:custGeom>
+          <a:solidFill>
+            <a:schemeClr val="accent2"/>
+          </a:solidFill>
+          <a:ln w="41275" cap="rnd">
+            <a:solidFill>
+              <a:schemeClr val="accent2"/>
+            </a:solidFill>
+            <a:round/>
+            <a:extLst>
+              <a:ext uri="{C807C97D-BFC1-408E-A445-0C87EB9F89A2}">
+                <ask:lineSketchStyleProps xmlns:ask="http://schemas.microsoft.com/office/drawing/2018/sketchyshapes" sd="1219033472">
+                  <a:prstGeom prst="rect">
+                    <a:avLst/>
+                  </a:prstGeom>
+                  <ask:type>
+                    <ask:lineSketchFreehand/>
+                  </ask:type>
+                </ask:lineSketchStyleProps>
+              </a:ext>
+            </a:extLst>
+          </a:ln>
+        </p:spPr>
+        <p:style>
+          <a:lnRef idx="2">
+            <a:schemeClr val="accent1">
+              <a:shade val="50000"/>
+            </a:schemeClr>
+          </a:lnRef>
+          <a:fillRef idx="1">
+            <a:schemeClr val="accent1"/>
+          </a:fillRef>
+          <a:effectRef idx="0">
+            <a:schemeClr val="accent1"/>
+          </a:effectRef>
+          <a:fontRef idx="minor">
+            <a:schemeClr val="lt1"/>
+          </a:fontRef>
+        </p:style>
+        <p:txBody>
+          <a:bodyPr rtlCol="0" anchor="ctr"/>
+          <a:lstStyle/>
+          <a:p>
+            <a:pPr algn="ctr"/>
+            <a:endParaRPr lang="en-US"/>
+          </a:p>
+        </p:txBody>
+      </p:sp>
+      <p:sp>
+        <p:nvSpPr>
+          <p:cNvPr id="3" name="Inhaltsplatzhalter 2">
+            <a:extLst>
+              <a:ext uri="{FF2B5EF4-FFF2-40B4-BE49-F238E27FC236}">
                 <a16:creationId xmlns:a16="http://schemas.microsoft.com/office/drawing/2014/main" id="{7666D8B1-B04A-4696-A308-83BC7FF90059}"/>
               </a:ext>
             </a:extLst>
@@ -28432,7 +29024,7 @@
                   <a:spcPts val="600"/>
                 </a:spcAft>
               </a:pPr>
-              <a:t>06.12.2021</a:t>
+              <a:t>07.12.2021</a:t>
             </a:fld>
             <a:endParaRPr lang="de-DE"/>
           </a:p>
@@ -28466,7 +29058,7 @@
           </a:bodyPr>
           <a:lstStyle/>
           <a:p>
-            <a:pPr>
+            <a:pPr algn="l">
               <a:lnSpc>
                 <a:spcPct val="90000"/>
               </a:lnSpc>
@@ -28476,15 +29068,7 @@
             </a:pPr>
             <a:r>
               <a:rPr lang="de-DE" sz="900" dirty="0"/>
-              <a:t>Leah Röser und Ann-Sofie Witfeld Studentinnen der Technischen Hochschule Köln In </a:t>
-            </a:r>
-            <a:r>
-              <a:rPr lang="de-DE" sz="900" dirty="0" err="1"/>
-              <a:t>zusammenarbeit</a:t>
-            </a:r>
-            <a:r>
-              <a:rPr lang="de-DE" sz="900" dirty="0"/>
-              <a:t> mit der G DATA </a:t>
+              <a:t>Leah Röser und Ann-Sofie Witfeld Studentinnen der Technischen Hochschule Köln in Zusammenarbeit mit der G DATA </a:t>
             </a:r>
             <a:r>
               <a:rPr lang="de-DE" sz="900" dirty="0" err="1"/>
@@ -28537,7 +29121,7 @@
                   <a:spcPts val="600"/>
                 </a:spcAft>
               </a:pPr>
-              <a:t>30</a:t>
+              <a:t>31</a:t>
             </a:fld>
             <a:endParaRPr lang="de-DE"/>
           </a:p>
@@ -28556,7 +29140,7 @@
 </p:sld>
 </file>
 
-<file path=ppt/slides/slide31.xml><?xml version="1.0" encoding="utf-8"?>
+<file path=ppt/slides/slide32.xml><?xml version="1.0" encoding="utf-8"?>
 <p:sld xmlns:a="http://schemas.openxmlformats.org/drawingml/2006/main" xmlns:r="http://schemas.openxmlformats.org/officeDocument/2006/relationships" xmlns:p="http://schemas.openxmlformats.org/presentationml/2006/main">
   <p:cSld>
     <p:bg>
@@ -29239,7 +29823,7 @@
                   <a:spcPts val="600"/>
                 </a:spcAft>
               </a:pPr>
-              <a:t>12/6/2021</a:t>
+              <a:t>12/7/2021</a:t>
             </a:fld>
             <a:endParaRPr lang="en-US">
               <a:solidFill>
@@ -29281,7 +29865,7 @@
           </a:bodyPr>
           <a:lstStyle/>
           <a:p>
-            <a:pPr>
+            <a:pPr algn="l">
               <a:lnSpc>
                 <a:spcPct val="90000"/>
               </a:lnSpc>
@@ -29290,7 +29874,7 @@
               </a:spcAft>
             </a:pPr>
             <a:r>
-              <a:rPr lang="en-US" sz="900" kern="1200">
+              <a:rPr lang="en-US" sz="900" kern="1200" dirty="0">
                 <a:solidFill>
                   <a:schemeClr val="tx1">
                     <a:tint val="75000"/>
@@ -29300,7 +29884,149 @@
                 <a:ea typeface="+mn-ea"/>
                 <a:cs typeface="+mn-cs"/>
               </a:rPr>
-              <a:t>Leah Röser und Ann-Sofie Witfeld Studentinnen der Technischen Hochschule Köln In zusammenarbeit mit der G DATA Cyber Defense AG </a:t>
+              <a:t>Leah </a:t>
+            </a:r>
+            <a:r>
+              <a:rPr lang="en-US" sz="900" kern="1200" dirty="0" err="1">
+                <a:solidFill>
+                  <a:schemeClr val="tx1">
+                    <a:tint val="75000"/>
+                  </a:schemeClr>
+                </a:solidFill>
+                <a:latin typeface="+mn-lt"/>
+                <a:ea typeface="+mn-ea"/>
+                <a:cs typeface="+mn-cs"/>
+              </a:rPr>
+              <a:t>Röser</a:t>
+            </a:r>
+            <a:r>
+              <a:rPr lang="en-US" sz="900" kern="1200" dirty="0">
+                <a:solidFill>
+                  <a:schemeClr val="tx1">
+                    <a:tint val="75000"/>
+                  </a:schemeClr>
+                </a:solidFill>
+                <a:latin typeface="+mn-lt"/>
+                <a:ea typeface="+mn-ea"/>
+                <a:cs typeface="+mn-cs"/>
+              </a:rPr>
+              <a:t> und Ann-Sofie Witfeld </a:t>
+            </a:r>
+            <a:r>
+              <a:rPr lang="en-US" sz="900" kern="1200" dirty="0" err="1">
+                <a:solidFill>
+                  <a:schemeClr val="tx1">
+                    <a:tint val="75000"/>
+                  </a:schemeClr>
+                </a:solidFill>
+                <a:latin typeface="+mn-lt"/>
+                <a:ea typeface="+mn-ea"/>
+                <a:cs typeface="+mn-cs"/>
+              </a:rPr>
+              <a:t>Studentinnen</a:t>
+            </a:r>
+            <a:r>
+              <a:rPr lang="en-US" sz="900" kern="1200" dirty="0">
+                <a:solidFill>
+                  <a:schemeClr val="tx1">
+                    <a:tint val="75000"/>
+                  </a:schemeClr>
+                </a:solidFill>
+                <a:latin typeface="+mn-lt"/>
+                <a:ea typeface="+mn-ea"/>
+                <a:cs typeface="+mn-cs"/>
+              </a:rPr>
+              <a:t> der </a:t>
+            </a:r>
+            <a:r>
+              <a:rPr lang="en-US" sz="900" kern="1200" dirty="0" err="1">
+                <a:solidFill>
+                  <a:schemeClr val="tx1">
+                    <a:tint val="75000"/>
+                  </a:schemeClr>
+                </a:solidFill>
+                <a:latin typeface="+mn-lt"/>
+                <a:ea typeface="+mn-ea"/>
+                <a:cs typeface="+mn-cs"/>
+              </a:rPr>
+              <a:t>Technischen</a:t>
+            </a:r>
+            <a:r>
+              <a:rPr lang="en-US" sz="900" kern="1200" dirty="0">
+                <a:solidFill>
+                  <a:schemeClr val="tx1">
+                    <a:tint val="75000"/>
+                  </a:schemeClr>
+                </a:solidFill>
+                <a:latin typeface="+mn-lt"/>
+                <a:ea typeface="+mn-ea"/>
+                <a:cs typeface="+mn-cs"/>
+              </a:rPr>
+              <a:t> Hochschule Köln in </a:t>
+            </a:r>
+            <a:r>
+              <a:rPr lang="en-US" sz="900" dirty="0" err="1">
+                <a:solidFill>
+                  <a:schemeClr val="tx1">
+                    <a:tint val="75000"/>
+                  </a:schemeClr>
+                </a:solidFill>
+                <a:latin typeface="+mn-lt"/>
+                <a:cs typeface="+mn-cs"/>
+              </a:rPr>
+              <a:t>Z</a:t>
+            </a:r>
+            <a:r>
+              <a:rPr lang="en-US" sz="900" kern="1200" dirty="0" err="1">
+                <a:solidFill>
+                  <a:schemeClr val="tx1">
+                    <a:tint val="75000"/>
+                  </a:schemeClr>
+                </a:solidFill>
+                <a:latin typeface="+mn-lt"/>
+                <a:ea typeface="+mn-ea"/>
+                <a:cs typeface="+mn-cs"/>
+              </a:rPr>
+              <a:t>usammenarbeit</a:t>
+            </a:r>
+            <a:r>
+              <a:rPr lang="en-US" sz="900" kern="1200" dirty="0">
+                <a:solidFill>
+                  <a:schemeClr val="tx1">
+                    <a:tint val="75000"/>
+                  </a:schemeClr>
+                </a:solidFill>
+                <a:latin typeface="+mn-lt"/>
+                <a:ea typeface="+mn-ea"/>
+                <a:cs typeface="+mn-cs"/>
+              </a:rPr>
+              <a:t> </a:t>
+            </a:r>
+            <a:r>
+              <a:rPr lang="en-US" sz="900" kern="1200" dirty="0" err="1">
+                <a:solidFill>
+                  <a:schemeClr val="tx1">
+                    <a:tint val="75000"/>
+                  </a:schemeClr>
+                </a:solidFill>
+                <a:latin typeface="+mn-lt"/>
+                <a:ea typeface="+mn-ea"/>
+                <a:cs typeface="+mn-cs"/>
+              </a:rPr>
+              <a:t>mit</a:t>
+            </a:r>
+            <a:r>
+              <a:rPr lang="en-US" sz="900" kern="1200" dirty="0">
+                <a:solidFill>
+                  <a:schemeClr val="tx1">
+                    <a:tint val="75000"/>
+                  </a:schemeClr>
+                </a:solidFill>
+                <a:latin typeface="+mn-lt"/>
+                <a:ea typeface="+mn-ea"/>
+                <a:cs typeface="+mn-cs"/>
+              </a:rPr>
+              <a:t> der G DATA Cyber Defense AG </a:t>
             </a:r>
           </a:p>
         </p:txBody>
@@ -29353,7 +30079,7 @@
                   <a:spcPts val="600"/>
                 </a:spcAft>
               </a:pPr>
-              <a:t>31</a:t>
+              <a:t>32</a:t>
             </a:fld>
             <a:endParaRPr lang="en-US">
               <a:solidFill>
@@ -29955,7 +30681,7 @@
                   <a:spcPts val="600"/>
                 </a:spcAft>
               </a:pPr>
-              <a:t>06.12.2021</a:t>
+              <a:t>07.12.2021</a:t>
             </a:fld>
             <a:endParaRPr lang="de-DE"/>
           </a:p>
@@ -29989,7 +30715,7 @@
           </a:bodyPr>
           <a:lstStyle/>
           <a:p>
-            <a:pPr>
+            <a:pPr algn="l">
               <a:lnSpc>
                 <a:spcPct val="90000"/>
               </a:lnSpc>
@@ -29998,8 +30724,16 @@
               </a:spcAft>
             </a:pPr>
             <a:r>
-              <a:rPr lang="de-DE" sz="900"/>
-              <a:t>Leah Röser und Ann-Sofie Witfeld Studentinnen der Technischen Hochschule Köln In zusammenarbeit mit der G DATA Cyber Defense AG </a:t>
+              <a:rPr lang="de-DE" sz="900" dirty="0"/>
+              <a:t>Leah Röser und Ann-Sofie Witfeld Studentinnen der Technischen Hochschule Köln in Zusammenarbeit mit der G DATA </a:t>
+            </a:r>
+            <a:r>
+              <a:rPr lang="de-DE" sz="900" dirty="0" err="1"/>
+              <a:t>Cyber</a:t>
+            </a:r>
+            <a:r>
+              <a:rPr lang="de-DE" sz="900" dirty="0"/>
+              <a:t> Defense AG </a:t>
             </a:r>
           </a:p>
         </p:txBody>
@@ -31075,7 +31809,7 @@
                   <a:spcPts val="600"/>
                 </a:spcAft>
               </a:pPr>
-              <a:t>06.12.2021</a:t>
+              <a:t>07.12.2021</a:t>
             </a:fld>
             <a:endParaRPr lang="de-DE"/>
           </a:p>
@@ -31778,7 +32512,7 @@
                   <a:spcPts val="600"/>
                 </a:spcAft>
               </a:pPr>
-              <a:t>12/6/2021</a:t>
+              <a:t>12/7/2021</a:t>
             </a:fld>
             <a:endParaRPr lang="en-US">
               <a:latin typeface="+mn-lt"/>
@@ -32077,7 +32811,7 @@
                   <a:spcPts val="600"/>
                 </a:spcAft>
               </a:pPr>
-              <a:t>06.12.2021</a:t>
+              <a:t>07.12.2021</a:t>
             </a:fld>
             <a:endParaRPr lang="de-DE"/>
           </a:p>
@@ -32099,14 +32833,19 @@
             <p:ph type="ftr" sz="quarter" idx="11"/>
           </p:nvPr>
         </p:nvSpPr>
-        <p:spPr/>
+        <p:spPr>
+          <a:xfrm>
+            <a:off x="3230311" y="6105971"/>
+            <a:ext cx="5204389" cy="518870"/>
+          </a:xfrm>
+        </p:spPr>
         <p:txBody>
           <a:bodyPr>
             <a:normAutofit/>
           </a:bodyPr>
           <a:lstStyle/>
           <a:p>
-            <a:pPr>
+            <a:pPr algn="l">
               <a:lnSpc>
                 <a:spcPct val="90000"/>
               </a:lnSpc>
@@ -32115,8 +32854,16 @@
               </a:spcAft>
             </a:pPr>
             <a:r>
-              <a:rPr lang="de-DE" sz="900"/>
-              <a:t>Leah Röser und Ann-Sofie Witfeld Studentinnen der Technischen Hochschule Köln In zusammenarbeit mit der G DATA Cyber Defense AG </a:t>
+              <a:rPr lang="de-DE" sz="1050" dirty="0"/>
+              <a:t>Leah Röser und Ann-Sofie Witfeld Studentinnen der Technischen Hochschule Köln in Zusammenarbeit mit der G DATA </a:t>
+            </a:r>
+            <a:r>
+              <a:rPr lang="de-DE" sz="1050" dirty="0" err="1"/>
+              <a:t>Cyber</a:t>
+            </a:r>
+            <a:r>
+              <a:rPr lang="de-DE" sz="1050" dirty="0"/>
+              <a:t> Defense AG </a:t>
             </a:r>
           </a:p>
         </p:txBody>
@@ -32215,7 +32962,7 @@
           <a:p>
             <a:fld id="{9949B707-072E-4C1D-AE51-078DEC55C1F2}" type="datetime1">
               <a:rPr lang="de-DE" smtClean="0"/>
-              <a:t>06.12.2021</a:t>
+              <a:t>07.12.2021</a:t>
             </a:fld>
             <a:endParaRPr lang="de-DE"/>
           </a:p>
@@ -32237,16 +32984,29 @@
             <p:ph type="ftr" sz="quarter" idx="11"/>
           </p:nvPr>
         </p:nvSpPr>
-        <p:spPr/>
+        <p:spPr>
+          <a:xfrm>
+            <a:off x="3006852" y="5994052"/>
+            <a:ext cx="6178296" cy="615506"/>
+          </a:xfrm>
+        </p:spPr>
         <p:txBody>
           <a:bodyPr/>
           <a:lstStyle/>
           <a:p>
+            <a:pPr algn="l"/>
             <a:r>
-              <a:rPr lang="de-DE"/>
-              <a:t>Leah Röser und Ann-Sofie Witfeld Studentinnen der Technischen Hochschule Köln In zusammenarbeit mit der G DATA Cyber Defense AG </a:t>
+              <a:rPr lang="de-DE" sz="1050" dirty="0"/>
+              <a:t>Leah Röser und Ann-Sofie Witfeld Studentinnen der Technischen Hochschule Köln in Zusammenarbeit mit der G DATA </a:t>
             </a:r>
-            <a:endParaRPr lang="de-DE" dirty="0"/>
+            <a:r>
+              <a:rPr lang="de-DE" sz="1050" dirty="0" err="1"/>
+              <a:t>Cyber</a:t>
+            </a:r>
+            <a:r>
+              <a:rPr lang="de-DE" sz="1050" dirty="0"/>
+              <a:t> Defense AG </a:t>
+            </a:r>
           </a:p>
         </p:txBody>
       </p:sp>
@@ -32275,7 +33035,7 @@
               <a:rPr lang="de-DE" smtClean="0"/>
               <a:t>8</a:t>
             </a:fld>
-            <a:endParaRPr lang="de-DE"/>
+            <a:endParaRPr lang="de-DE" dirty="0"/>
           </a:p>
         </p:txBody>
       </p:sp>
@@ -32923,7 +33683,7 @@
                   <a:spcPts val="600"/>
                 </a:spcAft>
               </a:pPr>
-              <a:t>12/6/2021</a:t>
+              <a:t>12/7/2021</a:t>
             </a:fld>
             <a:endParaRPr lang="en-US">
               <a:latin typeface="+mn-lt"/>
@@ -32960,7 +33720,7 @@
           </a:bodyPr>
           <a:lstStyle/>
           <a:p>
-            <a:pPr>
+            <a:pPr algn="l">
               <a:lnSpc>
                 <a:spcPct val="90000"/>
               </a:lnSpc>
@@ -32969,12 +33729,99 @@
               </a:spcAft>
             </a:pPr>
             <a:r>
-              <a:rPr lang="en-US" sz="900" kern="1200">
+              <a:rPr lang="en-US" sz="900" kern="1200" dirty="0">
                 <a:latin typeface="+mn-lt"/>
                 <a:ea typeface="+mn-ea"/>
                 <a:cs typeface="+mn-cs"/>
               </a:rPr>
-              <a:t>Leah Röser und Ann-Sofie Witfeld Studentinnen der Technischen Hochschule Köln In zusammenarbeit mit der G DATA Cyber Defense AG </a:t>
+              <a:t>Leah </a:t>
+            </a:r>
+            <a:r>
+              <a:rPr lang="en-US" sz="900" kern="1200" dirty="0" err="1">
+                <a:latin typeface="+mn-lt"/>
+                <a:ea typeface="+mn-ea"/>
+                <a:cs typeface="+mn-cs"/>
+              </a:rPr>
+              <a:t>Röser</a:t>
+            </a:r>
+            <a:r>
+              <a:rPr lang="en-US" sz="900" kern="1200" dirty="0">
+                <a:latin typeface="+mn-lt"/>
+                <a:ea typeface="+mn-ea"/>
+                <a:cs typeface="+mn-cs"/>
+              </a:rPr>
+              <a:t> und Ann-Sofie Witfeld </a:t>
+            </a:r>
+            <a:r>
+              <a:rPr lang="en-US" sz="900" kern="1200" dirty="0" err="1">
+                <a:latin typeface="+mn-lt"/>
+                <a:ea typeface="+mn-ea"/>
+                <a:cs typeface="+mn-cs"/>
+              </a:rPr>
+              <a:t>Studentinnen</a:t>
+            </a:r>
+            <a:r>
+              <a:rPr lang="en-US" sz="900" kern="1200" dirty="0">
+                <a:latin typeface="+mn-lt"/>
+                <a:ea typeface="+mn-ea"/>
+                <a:cs typeface="+mn-cs"/>
+              </a:rPr>
+              <a:t> der </a:t>
+            </a:r>
+            <a:r>
+              <a:rPr lang="en-US" sz="900" kern="1200" dirty="0" err="1">
+                <a:latin typeface="+mn-lt"/>
+                <a:ea typeface="+mn-ea"/>
+                <a:cs typeface="+mn-cs"/>
+              </a:rPr>
+              <a:t>Technischen</a:t>
+            </a:r>
+            <a:r>
+              <a:rPr lang="en-US" sz="900" kern="1200" dirty="0">
+                <a:latin typeface="+mn-lt"/>
+                <a:ea typeface="+mn-ea"/>
+                <a:cs typeface="+mn-cs"/>
+              </a:rPr>
+              <a:t> Hochschule Köln in </a:t>
+            </a:r>
+            <a:r>
+              <a:rPr lang="en-US" sz="900" dirty="0" err="1">
+                <a:latin typeface="+mn-lt"/>
+                <a:cs typeface="+mn-cs"/>
+              </a:rPr>
+              <a:t>Z</a:t>
+            </a:r>
+            <a:r>
+              <a:rPr lang="en-US" sz="900" kern="1200" dirty="0" err="1">
+                <a:latin typeface="+mn-lt"/>
+                <a:ea typeface="+mn-ea"/>
+                <a:cs typeface="+mn-cs"/>
+              </a:rPr>
+              <a:t>usammenarbeit</a:t>
+            </a:r>
+            <a:r>
+              <a:rPr lang="en-US" sz="900" kern="1200" dirty="0">
+                <a:latin typeface="+mn-lt"/>
+                <a:ea typeface="+mn-ea"/>
+                <a:cs typeface="+mn-cs"/>
+              </a:rPr>
+              <a:t> </a:t>
+            </a:r>
+            <a:r>
+              <a:rPr lang="en-US" sz="900" kern="1200" dirty="0" err="1">
+                <a:latin typeface="+mn-lt"/>
+                <a:ea typeface="+mn-ea"/>
+                <a:cs typeface="+mn-cs"/>
+              </a:rPr>
+              <a:t>mit</a:t>
+            </a:r>
+            <a:r>
+              <a:rPr lang="en-US" sz="900" kern="1200" dirty="0">
+                <a:latin typeface="+mn-lt"/>
+                <a:ea typeface="+mn-ea"/>
+                <a:cs typeface="+mn-cs"/>
+              </a:rPr>
+              <a:t> der G DATA Cyber Defense AG </a:t>
             </a:r>
           </a:p>
         </p:txBody>

</xml_diff>